<commit_message>
manuscript and summary pt update
</commit_message>
<xml_diff>
--- a/Docs/Story_shaping.pptx
+++ b/Docs/Story_shaping.pptx
@@ -5,7 +5,7 @@
     <p:sldMasterId id="2147483648" r:id="rId4"/>
   </p:sldMasterIdLst>
   <p:notesMasterIdLst>
-    <p:notesMasterId r:id="rId21"/>
+    <p:notesMasterId r:id="rId24"/>
   </p:notesMasterIdLst>
   <p:sldIdLst>
     <p:sldId id="256" r:id="rId5"/>
@@ -19,11 +19,14 @@
     <p:sldId id="425" r:id="rId13"/>
     <p:sldId id="414" r:id="rId14"/>
     <p:sldId id="430" r:id="rId15"/>
-    <p:sldId id="428" r:id="rId16"/>
-    <p:sldId id="396" r:id="rId17"/>
-    <p:sldId id="426" r:id="rId18"/>
-    <p:sldId id="427" r:id="rId19"/>
-    <p:sldId id="429" r:id="rId20"/>
+    <p:sldId id="396" r:id="rId16"/>
+    <p:sldId id="428" r:id="rId17"/>
+    <p:sldId id="431" r:id="rId18"/>
+    <p:sldId id="432" r:id="rId19"/>
+    <p:sldId id="433" r:id="rId20"/>
+    <p:sldId id="426" r:id="rId21"/>
+    <p:sldId id="427" r:id="rId22"/>
+    <p:sldId id="429" r:id="rId23"/>
   </p:sldIdLst>
   <p:sldSz cx="12192000" cy="6858000"/>
   <p:notesSz cx="6858000" cy="9144000"/>
@@ -124,7 +127,7 @@
   </p:defaultTextStyle>
   <p:extLst>
     <p:ext uri="{EFAFB233-063F-42B5-8137-9DF3F51BA10A}">
-      <p15:sldGuideLst xmlns:p15="http://schemas.microsoft.com/office/powerpoint/2012/main"/>
+      <p15:sldGuideLst xmlns:p15="http://schemas.microsoft.com/office/powerpoint/2012/main" xmlns=""/>
     </p:ext>
   </p:extLst>
 </p:presentation>
@@ -1078,7 +1081,7 @@
           <a:p>
             <a:fld id="{733F0257-090F-4E54-B8AE-0024A9B41619}" type="datetimeFigureOut">
               <a:rPr lang="nl-NL" smtClean="0"/>
-              <a:t>17-8-2022</a:t>
+              <a:t>24-8-2022</a:t>
             </a:fld>
             <a:endParaRPr lang="nl-NL"/>
           </a:p>
@@ -1599,7 +1602,7 @@
           <a:p>
             <a:fld id="{62EB3775-9320-44DC-985D-F4ED38D180A1}" type="slidenum">
               <a:rPr lang="nl-NL" smtClean="0"/>
-              <a:t>14</a:t>
+              <a:t>17</a:t>
             </a:fld>
             <a:endParaRPr lang="nl-NL"/>
           </a:p>
@@ -1707,7 +1710,7 @@
           <a:p>
             <a:fld id="{62EB3775-9320-44DC-985D-F4ED38D180A1}" type="slidenum">
               <a:rPr lang="nl-NL" smtClean="0"/>
-              <a:t>15</a:t>
+              <a:t>18</a:t>
             </a:fld>
             <a:endParaRPr lang="nl-NL"/>
           </a:p>
@@ -1801,7 +1804,7 @@
           <a:p>
             <a:fld id="{62EB3775-9320-44DC-985D-F4ED38D180A1}" type="slidenum">
               <a:rPr lang="nl-NL" smtClean="0"/>
-              <a:t>16</a:t>
+              <a:t>19</a:t>
             </a:fld>
             <a:endParaRPr lang="nl-NL"/>
           </a:p>
@@ -1842,7 +1845,7 @@
           <p:cNvPr id="2" name="Title 1">
             <a:extLst>
               <a:ext uri="{FF2B5EF4-FFF2-40B4-BE49-F238E27FC236}">
-                <a16:creationId xmlns:a16="http://schemas.microsoft.com/office/drawing/2014/main" id="{F9F3B47A-DF8D-4813-AD3E-F5B3ABE32652}"/>
+                <a16:creationId xmlns:a16="http://schemas.microsoft.com/office/drawing/2014/main" xmlns="" id="{F9F3B47A-DF8D-4813-AD3E-F5B3ABE32652}"/>
               </a:ext>
             </a:extLst>
           </p:cNvPr>
@@ -1880,7 +1883,7 @@
           <p:cNvPr id="3" name="Subtitle 2">
             <a:extLst>
               <a:ext uri="{FF2B5EF4-FFF2-40B4-BE49-F238E27FC236}">
-                <a16:creationId xmlns:a16="http://schemas.microsoft.com/office/drawing/2014/main" id="{3A01F48F-8661-46A1-9D24-C0E8005DD276}"/>
+                <a16:creationId xmlns:a16="http://schemas.microsoft.com/office/drawing/2014/main" xmlns="" id="{3A01F48F-8661-46A1-9D24-C0E8005DD276}"/>
               </a:ext>
             </a:extLst>
           </p:cNvPr>
@@ -1951,7 +1954,7 @@
           <p:cNvPr id="4" name="Date Placeholder 3">
             <a:extLst>
               <a:ext uri="{FF2B5EF4-FFF2-40B4-BE49-F238E27FC236}">
-                <a16:creationId xmlns:a16="http://schemas.microsoft.com/office/drawing/2014/main" id="{381F8689-A923-4A2D-B746-A45E8B9FCEC8}"/>
+                <a16:creationId xmlns:a16="http://schemas.microsoft.com/office/drawing/2014/main" xmlns="" id="{381F8689-A923-4A2D-B746-A45E8B9FCEC8}"/>
               </a:ext>
             </a:extLst>
           </p:cNvPr>
@@ -1969,7 +1972,7 @@
           <a:p>
             <a:fld id="{6C0DA3B8-3DD8-4B6D-A5EE-2906BA4E1043}" type="datetimeFigureOut">
               <a:rPr lang="nl-NL" smtClean="0"/>
-              <a:t>17-8-2022</a:t>
+              <a:t>24-8-2022</a:t>
             </a:fld>
             <a:endParaRPr lang="nl-NL"/>
           </a:p>
@@ -1980,7 +1983,7 @@
           <p:cNvPr id="5" name="Footer Placeholder 4">
             <a:extLst>
               <a:ext uri="{FF2B5EF4-FFF2-40B4-BE49-F238E27FC236}">
-                <a16:creationId xmlns:a16="http://schemas.microsoft.com/office/drawing/2014/main" id="{B6C02A30-68E5-463F-B45F-278EBF40BB97}"/>
+                <a16:creationId xmlns:a16="http://schemas.microsoft.com/office/drawing/2014/main" xmlns="" id="{B6C02A30-68E5-463F-B45F-278EBF40BB97}"/>
               </a:ext>
             </a:extLst>
           </p:cNvPr>
@@ -2005,7 +2008,7 @@
           <p:cNvPr id="6" name="Slide Number Placeholder 5">
             <a:extLst>
               <a:ext uri="{FF2B5EF4-FFF2-40B4-BE49-F238E27FC236}">
-                <a16:creationId xmlns:a16="http://schemas.microsoft.com/office/drawing/2014/main" id="{7BC2D38A-3CBB-41C3-B08B-2E956EDEB478}"/>
+                <a16:creationId xmlns:a16="http://schemas.microsoft.com/office/drawing/2014/main" xmlns="" id="{7BC2D38A-3CBB-41C3-B08B-2E956EDEB478}"/>
               </a:ext>
             </a:extLst>
           </p:cNvPr>
@@ -2064,7 +2067,7 @@
           <p:cNvPr id="2" name="Title 1">
             <a:extLst>
               <a:ext uri="{FF2B5EF4-FFF2-40B4-BE49-F238E27FC236}">
-                <a16:creationId xmlns:a16="http://schemas.microsoft.com/office/drawing/2014/main" id="{892067BB-9E58-4609-A927-F4C8F470FCEF}"/>
+                <a16:creationId xmlns:a16="http://schemas.microsoft.com/office/drawing/2014/main" xmlns="" id="{892067BB-9E58-4609-A927-F4C8F470FCEF}"/>
               </a:ext>
             </a:extLst>
           </p:cNvPr>
@@ -2093,7 +2096,7 @@
           <p:cNvPr id="3" name="Vertical Text Placeholder 2">
             <a:extLst>
               <a:ext uri="{FF2B5EF4-FFF2-40B4-BE49-F238E27FC236}">
-                <a16:creationId xmlns:a16="http://schemas.microsoft.com/office/drawing/2014/main" id="{49EC08D8-B286-4BA2-B97C-C676D10CFE80}"/>
+                <a16:creationId xmlns:a16="http://schemas.microsoft.com/office/drawing/2014/main" xmlns="" id="{49EC08D8-B286-4BA2-B97C-C676D10CFE80}"/>
               </a:ext>
             </a:extLst>
           </p:cNvPr>
@@ -2151,7 +2154,7 @@
           <p:cNvPr id="4" name="Date Placeholder 3">
             <a:extLst>
               <a:ext uri="{FF2B5EF4-FFF2-40B4-BE49-F238E27FC236}">
-                <a16:creationId xmlns:a16="http://schemas.microsoft.com/office/drawing/2014/main" id="{3A017BD4-BA33-4E1C-BEC0-2B580C980E73}"/>
+                <a16:creationId xmlns:a16="http://schemas.microsoft.com/office/drawing/2014/main" xmlns="" id="{3A017BD4-BA33-4E1C-BEC0-2B580C980E73}"/>
               </a:ext>
             </a:extLst>
           </p:cNvPr>
@@ -2169,7 +2172,7 @@
           <a:p>
             <a:fld id="{6C0DA3B8-3DD8-4B6D-A5EE-2906BA4E1043}" type="datetimeFigureOut">
               <a:rPr lang="nl-NL" smtClean="0"/>
-              <a:t>17-8-2022</a:t>
+              <a:t>24-8-2022</a:t>
             </a:fld>
             <a:endParaRPr lang="nl-NL"/>
           </a:p>
@@ -2180,7 +2183,7 @@
           <p:cNvPr id="5" name="Footer Placeholder 4">
             <a:extLst>
               <a:ext uri="{FF2B5EF4-FFF2-40B4-BE49-F238E27FC236}">
-                <a16:creationId xmlns:a16="http://schemas.microsoft.com/office/drawing/2014/main" id="{2C439429-7A76-4CFC-B20F-092DD26C66EB}"/>
+                <a16:creationId xmlns:a16="http://schemas.microsoft.com/office/drawing/2014/main" xmlns="" id="{2C439429-7A76-4CFC-B20F-092DD26C66EB}"/>
               </a:ext>
             </a:extLst>
           </p:cNvPr>
@@ -2205,7 +2208,7 @@
           <p:cNvPr id="6" name="Slide Number Placeholder 5">
             <a:extLst>
               <a:ext uri="{FF2B5EF4-FFF2-40B4-BE49-F238E27FC236}">
-                <a16:creationId xmlns:a16="http://schemas.microsoft.com/office/drawing/2014/main" id="{7427FAFC-4E15-4C60-B5E6-93E2B3F6F6A5}"/>
+                <a16:creationId xmlns:a16="http://schemas.microsoft.com/office/drawing/2014/main" xmlns="" id="{7427FAFC-4E15-4C60-B5E6-93E2B3F6F6A5}"/>
               </a:ext>
             </a:extLst>
           </p:cNvPr>
@@ -2264,7 +2267,7 @@
           <p:cNvPr id="2" name="Vertical Title 1">
             <a:extLst>
               <a:ext uri="{FF2B5EF4-FFF2-40B4-BE49-F238E27FC236}">
-                <a16:creationId xmlns:a16="http://schemas.microsoft.com/office/drawing/2014/main" id="{09A2036D-A530-41C9-87F9-959C99CFCE42}"/>
+                <a16:creationId xmlns:a16="http://schemas.microsoft.com/office/drawing/2014/main" xmlns="" id="{09A2036D-A530-41C9-87F9-959C99CFCE42}"/>
               </a:ext>
             </a:extLst>
           </p:cNvPr>
@@ -2298,7 +2301,7 @@
           <p:cNvPr id="3" name="Vertical Text Placeholder 2">
             <a:extLst>
               <a:ext uri="{FF2B5EF4-FFF2-40B4-BE49-F238E27FC236}">
-                <a16:creationId xmlns:a16="http://schemas.microsoft.com/office/drawing/2014/main" id="{9DC51703-EFAA-4C2B-B3CC-A81633252FE4}"/>
+                <a16:creationId xmlns:a16="http://schemas.microsoft.com/office/drawing/2014/main" xmlns="" id="{9DC51703-EFAA-4C2B-B3CC-A81633252FE4}"/>
               </a:ext>
             </a:extLst>
           </p:cNvPr>
@@ -2361,7 +2364,7 @@
           <p:cNvPr id="4" name="Date Placeholder 3">
             <a:extLst>
               <a:ext uri="{FF2B5EF4-FFF2-40B4-BE49-F238E27FC236}">
-                <a16:creationId xmlns:a16="http://schemas.microsoft.com/office/drawing/2014/main" id="{C24B3951-E5AF-4B78-83DC-F490936DB1FB}"/>
+                <a16:creationId xmlns:a16="http://schemas.microsoft.com/office/drawing/2014/main" xmlns="" id="{C24B3951-E5AF-4B78-83DC-F490936DB1FB}"/>
               </a:ext>
             </a:extLst>
           </p:cNvPr>
@@ -2379,7 +2382,7 @@
           <a:p>
             <a:fld id="{6C0DA3B8-3DD8-4B6D-A5EE-2906BA4E1043}" type="datetimeFigureOut">
               <a:rPr lang="nl-NL" smtClean="0"/>
-              <a:t>17-8-2022</a:t>
+              <a:t>24-8-2022</a:t>
             </a:fld>
             <a:endParaRPr lang="nl-NL"/>
           </a:p>
@@ -2390,7 +2393,7 @@
           <p:cNvPr id="5" name="Footer Placeholder 4">
             <a:extLst>
               <a:ext uri="{FF2B5EF4-FFF2-40B4-BE49-F238E27FC236}">
-                <a16:creationId xmlns:a16="http://schemas.microsoft.com/office/drawing/2014/main" id="{6AD4677A-A026-46C1-A8E7-5A5CF032EB9E}"/>
+                <a16:creationId xmlns:a16="http://schemas.microsoft.com/office/drawing/2014/main" xmlns="" id="{6AD4677A-A026-46C1-A8E7-5A5CF032EB9E}"/>
               </a:ext>
             </a:extLst>
           </p:cNvPr>
@@ -2415,7 +2418,7 @@
           <p:cNvPr id="6" name="Slide Number Placeholder 5">
             <a:extLst>
               <a:ext uri="{FF2B5EF4-FFF2-40B4-BE49-F238E27FC236}">
-                <a16:creationId xmlns:a16="http://schemas.microsoft.com/office/drawing/2014/main" id="{BCF7729D-2B80-48C6-AF1A-AE0DDCD50337}"/>
+                <a16:creationId xmlns:a16="http://schemas.microsoft.com/office/drawing/2014/main" xmlns="" id="{BCF7729D-2B80-48C6-AF1A-AE0DDCD50337}"/>
               </a:ext>
             </a:extLst>
           </p:cNvPr>
@@ -2474,7 +2477,7 @@
           <p:cNvPr id="2" name="Title 1">
             <a:extLst>
               <a:ext uri="{FF2B5EF4-FFF2-40B4-BE49-F238E27FC236}">
-                <a16:creationId xmlns:a16="http://schemas.microsoft.com/office/drawing/2014/main" id="{B9F41E3B-886C-49ED-900C-1603C48D48C2}"/>
+                <a16:creationId xmlns:a16="http://schemas.microsoft.com/office/drawing/2014/main" xmlns="" id="{B9F41E3B-886C-49ED-900C-1603C48D48C2}"/>
               </a:ext>
             </a:extLst>
           </p:cNvPr>
@@ -2503,7 +2506,7 @@
           <p:cNvPr id="3" name="Content Placeholder 2">
             <a:extLst>
               <a:ext uri="{FF2B5EF4-FFF2-40B4-BE49-F238E27FC236}">
-                <a16:creationId xmlns:a16="http://schemas.microsoft.com/office/drawing/2014/main" id="{AAB00E77-9C11-497C-BE83-BCB4EE517C19}"/>
+                <a16:creationId xmlns:a16="http://schemas.microsoft.com/office/drawing/2014/main" xmlns="" id="{AAB00E77-9C11-497C-BE83-BCB4EE517C19}"/>
               </a:ext>
             </a:extLst>
           </p:cNvPr>
@@ -2561,7 +2564,7 @@
           <p:cNvPr id="4" name="Date Placeholder 3">
             <a:extLst>
               <a:ext uri="{FF2B5EF4-FFF2-40B4-BE49-F238E27FC236}">
-                <a16:creationId xmlns:a16="http://schemas.microsoft.com/office/drawing/2014/main" id="{F0FDDB26-DD0F-4C7F-85FB-8CA16DE304E5}"/>
+                <a16:creationId xmlns:a16="http://schemas.microsoft.com/office/drawing/2014/main" xmlns="" id="{F0FDDB26-DD0F-4C7F-85FB-8CA16DE304E5}"/>
               </a:ext>
             </a:extLst>
           </p:cNvPr>
@@ -2579,7 +2582,7 @@
           <a:p>
             <a:fld id="{6C0DA3B8-3DD8-4B6D-A5EE-2906BA4E1043}" type="datetimeFigureOut">
               <a:rPr lang="nl-NL" smtClean="0"/>
-              <a:t>17-8-2022</a:t>
+              <a:t>24-8-2022</a:t>
             </a:fld>
             <a:endParaRPr lang="nl-NL"/>
           </a:p>
@@ -2590,7 +2593,7 @@
           <p:cNvPr id="5" name="Footer Placeholder 4">
             <a:extLst>
               <a:ext uri="{FF2B5EF4-FFF2-40B4-BE49-F238E27FC236}">
-                <a16:creationId xmlns:a16="http://schemas.microsoft.com/office/drawing/2014/main" id="{6844E8A0-244C-4FB1-A8E5-8A885DB33B13}"/>
+                <a16:creationId xmlns:a16="http://schemas.microsoft.com/office/drawing/2014/main" xmlns="" id="{6844E8A0-244C-4FB1-A8E5-8A885DB33B13}"/>
               </a:ext>
             </a:extLst>
           </p:cNvPr>
@@ -2615,7 +2618,7 @@
           <p:cNvPr id="6" name="Slide Number Placeholder 5">
             <a:extLst>
               <a:ext uri="{FF2B5EF4-FFF2-40B4-BE49-F238E27FC236}">
-                <a16:creationId xmlns:a16="http://schemas.microsoft.com/office/drawing/2014/main" id="{E5E2B8D1-D986-4C4F-AC65-775B58DFC974}"/>
+                <a16:creationId xmlns:a16="http://schemas.microsoft.com/office/drawing/2014/main" xmlns="" id="{E5E2B8D1-D986-4C4F-AC65-775B58DFC974}"/>
               </a:ext>
             </a:extLst>
           </p:cNvPr>
@@ -2674,7 +2677,7 @@
           <p:cNvPr id="2" name="Title 1">
             <a:extLst>
               <a:ext uri="{FF2B5EF4-FFF2-40B4-BE49-F238E27FC236}">
-                <a16:creationId xmlns:a16="http://schemas.microsoft.com/office/drawing/2014/main" id="{A7ABA34D-7770-40FE-B96B-701703351BDB}"/>
+                <a16:creationId xmlns:a16="http://schemas.microsoft.com/office/drawing/2014/main" xmlns="" id="{A7ABA34D-7770-40FE-B96B-701703351BDB}"/>
               </a:ext>
             </a:extLst>
           </p:cNvPr>
@@ -2712,7 +2715,7 @@
           <p:cNvPr id="3" name="Text Placeholder 2">
             <a:extLst>
               <a:ext uri="{FF2B5EF4-FFF2-40B4-BE49-F238E27FC236}">
-                <a16:creationId xmlns:a16="http://schemas.microsoft.com/office/drawing/2014/main" id="{CA0A75DA-0215-4686-81B4-71AA64F96DCD}"/>
+                <a16:creationId xmlns:a16="http://schemas.microsoft.com/office/drawing/2014/main" xmlns="" id="{CA0A75DA-0215-4686-81B4-71AA64F96DCD}"/>
               </a:ext>
             </a:extLst>
           </p:cNvPr>
@@ -2837,7 +2840,7 @@
           <p:cNvPr id="4" name="Date Placeholder 3">
             <a:extLst>
               <a:ext uri="{FF2B5EF4-FFF2-40B4-BE49-F238E27FC236}">
-                <a16:creationId xmlns:a16="http://schemas.microsoft.com/office/drawing/2014/main" id="{D2982A2D-CDAB-44BB-BAE5-4DC1A2F51FF3}"/>
+                <a16:creationId xmlns:a16="http://schemas.microsoft.com/office/drawing/2014/main" xmlns="" id="{D2982A2D-CDAB-44BB-BAE5-4DC1A2F51FF3}"/>
               </a:ext>
             </a:extLst>
           </p:cNvPr>
@@ -2855,7 +2858,7 @@
           <a:p>
             <a:fld id="{6C0DA3B8-3DD8-4B6D-A5EE-2906BA4E1043}" type="datetimeFigureOut">
               <a:rPr lang="nl-NL" smtClean="0"/>
-              <a:t>17-8-2022</a:t>
+              <a:t>24-8-2022</a:t>
             </a:fld>
             <a:endParaRPr lang="nl-NL"/>
           </a:p>
@@ -2866,7 +2869,7 @@
           <p:cNvPr id="5" name="Footer Placeholder 4">
             <a:extLst>
               <a:ext uri="{FF2B5EF4-FFF2-40B4-BE49-F238E27FC236}">
-                <a16:creationId xmlns:a16="http://schemas.microsoft.com/office/drawing/2014/main" id="{0372C088-D2B7-4263-90B0-38C76B640B2B}"/>
+                <a16:creationId xmlns:a16="http://schemas.microsoft.com/office/drawing/2014/main" xmlns="" id="{0372C088-D2B7-4263-90B0-38C76B640B2B}"/>
               </a:ext>
             </a:extLst>
           </p:cNvPr>
@@ -2891,7 +2894,7 @@
           <p:cNvPr id="6" name="Slide Number Placeholder 5">
             <a:extLst>
               <a:ext uri="{FF2B5EF4-FFF2-40B4-BE49-F238E27FC236}">
-                <a16:creationId xmlns:a16="http://schemas.microsoft.com/office/drawing/2014/main" id="{5117CB58-3F57-4F6A-8FB5-289EDA39AB13}"/>
+                <a16:creationId xmlns:a16="http://schemas.microsoft.com/office/drawing/2014/main" xmlns="" id="{5117CB58-3F57-4F6A-8FB5-289EDA39AB13}"/>
               </a:ext>
             </a:extLst>
           </p:cNvPr>
@@ -2950,7 +2953,7 @@
           <p:cNvPr id="2" name="Title 1">
             <a:extLst>
               <a:ext uri="{FF2B5EF4-FFF2-40B4-BE49-F238E27FC236}">
-                <a16:creationId xmlns:a16="http://schemas.microsoft.com/office/drawing/2014/main" id="{58AE3280-2B43-4767-A771-DAD48B3FF540}"/>
+                <a16:creationId xmlns:a16="http://schemas.microsoft.com/office/drawing/2014/main" xmlns="" id="{58AE3280-2B43-4767-A771-DAD48B3FF540}"/>
               </a:ext>
             </a:extLst>
           </p:cNvPr>
@@ -2979,7 +2982,7 @@
           <p:cNvPr id="3" name="Content Placeholder 2">
             <a:extLst>
               <a:ext uri="{FF2B5EF4-FFF2-40B4-BE49-F238E27FC236}">
-                <a16:creationId xmlns:a16="http://schemas.microsoft.com/office/drawing/2014/main" id="{8948AA68-CC03-4B6A-9B0B-B71590E61799}"/>
+                <a16:creationId xmlns:a16="http://schemas.microsoft.com/office/drawing/2014/main" xmlns="" id="{8948AA68-CC03-4B6A-9B0B-B71590E61799}"/>
               </a:ext>
             </a:extLst>
           </p:cNvPr>
@@ -3042,7 +3045,7 @@
           <p:cNvPr id="4" name="Content Placeholder 3">
             <a:extLst>
               <a:ext uri="{FF2B5EF4-FFF2-40B4-BE49-F238E27FC236}">
-                <a16:creationId xmlns:a16="http://schemas.microsoft.com/office/drawing/2014/main" id="{044908F4-DE85-41F3-BDBC-A42B607367D1}"/>
+                <a16:creationId xmlns:a16="http://schemas.microsoft.com/office/drawing/2014/main" xmlns="" id="{044908F4-DE85-41F3-BDBC-A42B607367D1}"/>
               </a:ext>
             </a:extLst>
           </p:cNvPr>
@@ -3105,7 +3108,7 @@
           <p:cNvPr id="5" name="Date Placeholder 4">
             <a:extLst>
               <a:ext uri="{FF2B5EF4-FFF2-40B4-BE49-F238E27FC236}">
-                <a16:creationId xmlns:a16="http://schemas.microsoft.com/office/drawing/2014/main" id="{ADD1F80D-383F-43B2-80B7-884A51231708}"/>
+                <a16:creationId xmlns:a16="http://schemas.microsoft.com/office/drawing/2014/main" xmlns="" id="{ADD1F80D-383F-43B2-80B7-884A51231708}"/>
               </a:ext>
             </a:extLst>
           </p:cNvPr>
@@ -3123,7 +3126,7 @@
           <a:p>
             <a:fld id="{6C0DA3B8-3DD8-4B6D-A5EE-2906BA4E1043}" type="datetimeFigureOut">
               <a:rPr lang="nl-NL" smtClean="0"/>
-              <a:t>17-8-2022</a:t>
+              <a:t>24-8-2022</a:t>
             </a:fld>
             <a:endParaRPr lang="nl-NL"/>
           </a:p>
@@ -3134,7 +3137,7 @@
           <p:cNvPr id="6" name="Footer Placeholder 5">
             <a:extLst>
               <a:ext uri="{FF2B5EF4-FFF2-40B4-BE49-F238E27FC236}">
-                <a16:creationId xmlns:a16="http://schemas.microsoft.com/office/drawing/2014/main" id="{9C601B3D-B1A4-45A9-9F84-8F9C35F4DB27}"/>
+                <a16:creationId xmlns:a16="http://schemas.microsoft.com/office/drawing/2014/main" xmlns="" id="{9C601B3D-B1A4-45A9-9F84-8F9C35F4DB27}"/>
               </a:ext>
             </a:extLst>
           </p:cNvPr>
@@ -3159,7 +3162,7 @@
           <p:cNvPr id="7" name="Slide Number Placeholder 6">
             <a:extLst>
               <a:ext uri="{FF2B5EF4-FFF2-40B4-BE49-F238E27FC236}">
-                <a16:creationId xmlns:a16="http://schemas.microsoft.com/office/drawing/2014/main" id="{5E4D3D83-37CC-44B4-8C65-5715935D6432}"/>
+                <a16:creationId xmlns:a16="http://schemas.microsoft.com/office/drawing/2014/main" xmlns="" id="{5E4D3D83-37CC-44B4-8C65-5715935D6432}"/>
               </a:ext>
             </a:extLst>
           </p:cNvPr>
@@ -3218,7 +3221,7 @@
           <p:cNvPr id="2" name="Title 1">
             <a:extLst>
               <a:ext uri="{FF2B5EF4-FFF2-40B4-BE49-F238E27FC236}">
-                <a16:creationId xmlns:a16="http://schemas.microsoft.com/office/drawing/2014/main" id="{1DFAB05C-4C42-47AC-A062-989FE5E039EE}"/>
+                <a16:creationId xmlns:a16="http://schemas.microsoft.com/office/drawing/2014/main" xmlns="" id="{1DFAB05C-4C42-47AC-A062-989FE5E039EE}"/>
               </a:ext>
             </a:extLst>
           </p:cNvPr>
@@ -3252,7 +3255,7 @@
           <p:cNvPr id="3" name="Text Placeholder 2">
             <a:extLst>
               <a:ext uri="{FF2B5EF4-FFF2-40B4-BE49-F238E27FC236}">
-                <a16:creationId xmlns:a16="http://schemas.microsoft.com/office/drawing/2014/main" id="{D23F5791-E226-4CC9-9423-0E8CE288011A}"/>
+                <a16:creationId xmlns:a16="http://schemas.microsoft.com/office/drawing/2014/main" xmlns="" id="{D23F5791-E226-4CC9-9423-0E8CE288011A}"/>
               </a:ext>
             </a:extLst>
           </p:cNvPr>
@@ -3323,7 +3326,7 @@
           <p:cNvPr id="4" name="Content Placeholder 3">
             <a:extLst>
               <a:ext uri="{FF2B5EF4-FFF2-40B4-BE49-F238E27FC236}">
-                <a16:creationId xmlns:a16="http://schemas.microsoft.com/office/drawing/2014/main" id="{1FDBE125-277A-4A6E-99A2-2F41780741AD}"/>
+                <a16:creationId xmlns:a16="http://schemas.microsoft.com/office/drawing/2014/main" xmlns="" id="{1FDBE125-277A-4A6E-99A2-2F41780741AD}"/>
               </a:ext>
             </a:extLst>
           </p:cNvPr>
@@ -3386,7 +3389,7 @@
           <p:cNvPr id="5" name="Text Placeholder 4">
             <a:extLst>
               <a:ext uri="{FF2B5EF4-FFF2-40B4-BE49-F238E27FC236}">
-                <a16:creationId xmlns:a16="http://schemas.microsoft.com/office/drawing/2014/main" id="{83B76B92-C5ED-43BB-93EA-BED6FB8E52F8}"/>
+                <a16:creationId xmlns:a16="http://schemas.microsoft.com/office/drawing/2014/main" xmlns="" id="{83B76B92-C5ED-43BB-93EA-BED6FB8E52F8}"/>
               </a:ext>
             </a:extLst>
           </p:cNvPr>
@@ -3457,7 +3460,7 @@
           <p:cNvPr id="6" name="Content Placeholder 5">
             <a:extLst>
               <a:ext uri="{FF2B5EF4-FFF2-40B4-BE49-F238E27FC236}">
-                <a16:creationId xmlns:a16="http://schemas.microsoft.com/office/drawing/2014/main" id="{4C694D13-2F7D-4AD1-81D6-B92D48BE8DAE}"/>
+                <a16:creationId xmlns:a16="http://schemas.microsoft.com/office/drawing/2014/main" xmlns="" id="{4C694D13-2F7D-4AD1-81D6-B92D48BE8DAE}"/>
               </a:ext>
             </a:extLst>
           </p:cNvPr>
@@ -3520,7 +3523,7 @@
           <p:cNvPr id="7" name="Date Placeholder 6">
             <a:extLst>
               <a:ext uri="{FF2B5EF4-FFF2-40B4-BE49-F238E27FC236}">
-                <a16:creationId xmlns:a16="http://schemas.microsoft.com/office/drawing/2014/main" id="{158ED1AC-E16F-41FB-904B-845DBFEA9638}"/>
+                <a16:creationId xmlns:a16="http://schemas.microsoft.com/office/drawing/2014/main" xmlns="" id="{158ED1AC-E16F-41FB-904B-845DBFEA9638}"/>
               </a:ext>
             </a:extLst>
           </p:cNvPr>
@@ -3538,7 +3541,7 @@
           <a:p>
             <a:fld id="{6C0DA3B8-3DD8-4B6D-A5EE-2906BA4E1043}" type="datetimeFigureOut">
               <a:rPr lang="nl-NL" smtClean="0"/>
-              <a:t>17-8-2022</a:t>
+              <a:t>24-8-2022</a:t>
             </a:fld>
             <a:endParaRPr lang="nl-NL"/>
           </a:p>
@@ -3549,7 +3552,7 @@
           <p:cNvPr id="8" name="Footer Placeholder 7">
             <a:extLst>
               <a:ext uri="{FF2B5EF4-FFF2-40B4-BE49-F238E27FC236}">
-                <a16:creationId xmlns:a16="http://schemas.microsoft.com/office/drawing/2014/main" id="{969D9835-ADC9-4598-849B-5A875C2B1C19}"/>
+                <a16:creationId xmlns:a16="http://schemas.microsoft.com/office/drawing/2014/main" xmlns="" id="{969D9835-ADC9-4598-849B-5A875C2B1C19}"/>
               </a:ext>
             </a:extLst>
           </p:cNvPr>
@@ -3574,7 +3577,7 @@
           <p:cNvPr id="9" name="Slide Number Placeholder 8">
             <a:extLst>
               <a:ext uri="{FF2B5EF4-FFF2-40B4-BE49-F238E27FC236}">
-                <a16:creationId xmlns:a16="http://schemas.microsoft.com/office/drawing/2014/main" id="{6700C335-A364-458C-964C-B8D740C9FEAC}"/>
+                <a16:creationId xmlns:a16="http://schemas.microsoft.com/office/drawing/2014/main" xmlns="" id="{6700C335-A364-458C-964C-B8D740C9FEAC}"/>
               </a:ext>
             </a:extLst>
           </p:cNvPr>
@@ -3633,7 +3636,7 @@
           <p:cNvPr id="2" name="Title 1">
             <a:extLst>
               <a:ext uri="{FF2B5EF4-FFF2-40B4-BE49-F238E27FC236}">
-                <a16:creationId xmlns:a16="http://schemas.microsoft.com/office/drawing/2014/main" id="{1AD2FF1A-2813-4219-8911-F58F19B34142}"/>
+                <a16:creationId xmlns:a16="http://schemas.microsoft.com/office/drawing/2014/main" xmlns="" id="{1AD2FF1A-2813-4219-8911-F58F19B34142}"/>
               </a:ext>
             </a:extLst>
           </p:cNvPr>
@@ -3662,7 +3665,7 @@
           <p:cNvPr id="3" name="Date Placeholder 2">
             <a:extLst>
               <a:ext uri="{FF2B5EF4-FFF2-40B4-BE49-F238E27FC236}">
-                <a16:creationId xmlns:a16="http://schemas.microsoft.com/office/drawing/2014/main" id="{4EB8D8C4-DCD3-41D9-A570-B9355D1EA074}"/>
+                <a16:creationId xmlns:a16="http://schemas.microsoft.com/office/drawing/2014/main" xmlns="" id="{4EB8D8C4-DCD3-41D9-A570-B9355D1EA074}"/>
               </a:ext>
             </a:extLst>
           </p:cNvPr>
@@ -3680,7 +3683,7 @@
           <a:p>
             <a:fld id="{6C0DA3B8-3DD8-4B6D-A5EE-2906BA4E1043}" type="datetimeFigureOut">
               <a:rPr lang="nl-NL" smtClean="0"/>
-              <a:t>17-8-2022</a:t>
+              <a:t>24-8-2022</a:t>
             </a:fld>
             <a:endParaRPr lang="nl-NL"/>
           </a:p>
@@ -3691,7 +3694,7 @@
           <p:cNvPr id="4" name="Footer Placeholder 3">
             <a:extLst>
               <a:ext uri="{FF2B5EF4-FFF2-40B4-BE49-F238E27FC236}">
-                <a16:creationId xmlns:a16="http://schemas.microsoft.com/office/drawing/2014/main" id="{6CC9E5F6-7A2D-4A6F-91D7-D9936A40F4E8}"/>
+                <a16:creationId xmlns:a16="http://schemas.microsoft.com/office/drawing/2014/main" xmlns="" id="{6CC9E5F6-7A2D-4A6F-91D7-D9936A40F4E8}"/>
               </a:ext>
             </a:extLst>
           </p:cNvPr>
@@ -3716,7 +3719,7 @@
           <p:cNvPr id="5" name="Slide Number Placeholder 4">
             <a:extLst>
               <a:ext uri="{FF2B5EF4-FFF2-40B4-BE49-F238E27FC236}">
-                <a16:creationId xmlns:a16="http://schemas.microsoft.com/office/drawing/2014/main" id="{6066CC13-F0F6-41C6-886F-80F305AF232E}"/>
+                <a16:creationId xmlns:a16="http://schemas.microsoft.com/office/drawing/2014/main" xmlns="" id="{6066CC13-F0F6-41C6-886F-80F305AF232E}"/>
               </a:ext>
             </a:extLst>
           </p:cNvPr>
@@ -3775,7 +3778,7 @@
           <p:cNvPr id="2" name="Date Placeholder 1">
             <a:extLst>
               <a:ext uri="{FF2B5EF4-FFF2-40B4-BE49-F238E27FC236}">
-                <a16:creationId xmlns:a16="http://schemas.microsoft.com/office/drawing/2014/main" id="{3E62CCDA-BA54-4EEA-B415-6D535D19539F}"/>
+                <a16:creationId xmlns:a16="http://schemas.microsoft.com/office/drawing/2014/main" xmlns="" id="{3E62CCDA-BA54-4EEA-B415-6D535D19539F}"/>
               </a:ext>
             </a:extLst>
           </p:cNvPr>
@@ -3793,7 +3796,7 @@
           <a:p>
             <a:fld id="{6C0DA3B8-3DD8-4B6D-A5EE-2906BA4E1043}" type="datetimeFigureOut">
               <a:rPr lang="nl-NL" smtClean="0"/>
-              <a:t>17-8-2022</a:t>
+              <a:t>24-8-2022</a:t>
             </a:fld>
             <a:endParaRPr lang="nl-NL"/>
           </a:p>
@@ -3804,7 +3807,7 @@
           <p:cNvPr id="3" name="Footer Placeholder 2">
             <a:extLst>
               <a:ext uri="{FF2B5EF4-FFF2-40B4-BE49-F238E27FC236}">
-                <a16:creationId xmlns:a16="http://schemas.microsoft.com/office/drawing/2014/main" id="{A8DED4CE-2351-479E-A86F-3435807AC05A}"/>
+                <a16:creationId xmlns:a16="http://schemas.microsoft.com/office/drawing/2014/main" xmlns="" id="{A8DED4CE-2351-479E-A86F-3435807AC05A}"/>
               </a:ext>
             </a:extLst>
           </p:cNvPr>
@@ -3829,7 +3832,7 @@
           <p:cNvPr id="4" name="Slide Number Placeholder 3">
             <a:extLst>
               <a:ext uri="{FF2B5EF4-FFF2-40B4-BE49-F238E27FC236}">
-                <a16:creationId xmlns:a16="http://schemas.microsoft.com/office/drawing/2014/main" id="{0782D148-9281-4365-AC4E-5570A875B096}"/>
+                <a16:creationId xmlns:a16="http://schemas.microsoft.com/office/drawing/2014/main" xmlns="" id="{0782D148-9281-4365-AC4E-5570A875B096}"/>
               </a:ext>
             </a:extLst>
           </p:cNvPr>
@@ -3888,7 +3891,7 @@
           <p:cNvPr id="2" name="Title 1">
             <a:extLst>
               <a:ext uri="{FF2B5EF4-FFF2-40B4-BE49-F238E27FC236}">
-                <a16:creationId xmlns:a16="http://schemas.microsoft.com/office/drawing/2014/main" id="{D6A21F2E-1D24-4A5D-9489-4B2296D17857}"/>
+                <a16:creationId xmlns:a16="http://schemas.microsoft.com/office/drawing/2014/main" xmlns="" id="{D6A21F2E-1D24-4A5D-9489-4B2296D17857}"/>
               </a:ext>
             </a:extLst>
           </p:cNvPr>
@@ -3926,7 +3929,7 @@
           <p:cNvPr id="3" name="Content Placeholder 2">
             <a:extLst>
               <a:ext uri="{FF2B5EF4-FFF2-40B4-BE49-F238E27FC236}">
-                <a16:creationId xmlns:a16="http://schemas.microsoft.com/office/drawing/2014/main" id="{3B32E0BB-A4E1-4D18-A8BB-370DDB5FB5A3}"/>
+                <a16:creationId xmlns:a16="http://schemas.microsoft.com/office/drawing/2014/main" xmlns="" id="{3B32E0BB-A4E1-4D18-A8BB-370DDB5FB5A3}"/>
               </a:ext>
             </a:extLst>
           </p:cNvPr>
@@ -4017,7 +4020,7 @@
           <p:cNvPr id="4" name="Text Placeholder 3">
             <a:extLst>
               <a:ext uri="{FF2B5EF4-FFF2-40B4-BE49-F238E27FC236}">
-                <a16:creationId xmlns:a16="http://schemas.microsoft.com/office/drawing/2014/main" id="{62A3C5C7-EC75-44EA-B121-6422E8B4E4ED}"/>
+                <a16:creationId xmlns:a16="http://schemas.microsoft.com/office/drawing/2014/main" xmlns="" id="{62A3C5C7-EC75-44EA-B121-6422E8B4E4ED}"/>
               </a:ext>
             </a:extLst>
           </p:cNvPr>
@@ -4088,7 +4091,7 @@
           <p:cNvPr id="5" name="Date Placeholder 4">
             <a:extLst>
               <a:ext uri="{FF2B5EF4-FFF2-40B4-BE49-F238E27FC236}">
-                <a16:creationId xmlns:a16="http://schemas.microsoft.com/office/drawing/2014/main" id="{15D3CDB4-4F54-474F-81ED-F9EFB351EA0A}"/>
+                <a16:creationId xmlns:a16="http://schemas.microsoft.com/office/drawing/2014/main" xmlns="" id="{15D3CDB4-4F54-474F-81ED-F9EFB351EA0A}"/>
               </a:ext>
             </a:extLst>
           </p:cNvPr>
@@ -4106,7 +4109,7 @@
           <a:p>
             <a:fld id="{6C0DA3B8-3DD8-4B6D-A5EE-2906BA4E1043}" type="datetimeFigureOut">
               <a:rPr lang="nl-NL" smtClean="0"/>
-              <a:t>17-8-2022</a:t>
+              <a:t>24-8-2022</a:t>
             </a:fld>
             <a:endParaRPr lang="nl-NL"/>
           </a:p>
@@ -4117,7 +4120,7 @@
           <p:cNvPr id="6" name="Footer Placeholder 5">
             <a:extLst>
               <a:ext uri="{FF2B5EF4-FFF2-40B4-BE49-F238E27FC236}">
-                <a16:creationId xmlns:a16="http://schemas.microsoft.com/office/drawing/2014/main" id="{498FE285-7613-4E2A-8476-FE7F0E35C9CE}"/>
+                <a16:creationId xmlns:a16="http://schemas.microsoft.com/office/drawing/2014/main" xmlns="" id="{498FE285-7613-4E2A-8476-FE7F0E35C9CE}"/>
               </a:ext>
             </a:extLst>
           </p:cNvPr>
@@ -4142,7 +4145,7 @@
           <p:cNvPr id="7" name="Slide Number Placeholder 6">
             <a:extLst>
               <a:ext uri="{FF2B5EF4-FFF2-40B4-BE49-F238E27FC236}">
-                <a16:creationId xmlns:a16="http://schemas.microsoft.com/office/drawing/2014/main" id="{04C8AD1F-4CAF-4F41-9A8D-77A46059457C}"/>
+                <a16:creationId xmlns:a16="http://schemas.microsoft.com/office/drawing/2014/main" xmlns="" id="{04C8AD1F-4CAF-4F41-9A8D-77A46059457C}"/>
               </a:ext>
             </a:extLst>
           </p:cNvPr>
@@ -4201,7 +4204,7 @@
           <p:cNvPr id="2" name="Title 1">
             <a:extLst>
               <a:ext uri="{FF2B5EF4-FFF2-40B4-BE49-F238E27FC236}">
-                <a16:creationId xmlns:a16="http://schemas.microsoft.com/office/drawing/2014/main" id="{1AD2344D-C0AE-4D5E-B717-99A1C6DFBCF2}"/>
+                <a16:creationId xmlns:a16="http://schemas.microsoft.com/office/drawing/2014/main" xmlns="" id="{1AD2344D-C0AE-4D5E-B717-99A1C6DFBCF2}"/>
               </a:ext>
             </a:extLst>
           </p:cNvPr>
@@ -4239,7 +4242,7 @@
           <p:cNvPr id="3" name="Picture Placeholder 2">
             <a:extLst>
               <a:ext uri="{FF2B5EF4-FFF2-40B4-BE49-F238E27FC236}">
-                <a16:creationId xmlns:a16="http://schemas.microsoft.com/office/drawing/2014/main" id="{58629E33-758F-4980-BCA2-A01A4C4B8E42}"/>
+                <a16:creationId xmlns:a16="http://schemas.microsoft.com/office/drawing/2014/main" xmlns="" id="{58629E33-758F-4980-BCA2-A01A4C4B8E42}"/>
               </a:ext>
             </a:extLst>
           </p:cNvPr>
@@ -4306,7 +4309,7 @@
           <p:cNvPr id="4" name="Text Placeholder 3">
             <a:extLst>
               <a:ext uri="{FF2B5EF4-FFF2-40B4-BE49-F238E27FC236}">
-                <a16:creationId xmlns:a16="http://schemas.microsoft.com/office/drawing/2014/main" id="{F06AF7DF-B996-4317-B513-DD04EC0D9BFB}"/>
+                <a16:creationId xmlns:a16="http://schemas.microsoft.com/office/drawing/2014/main" xmlns="" id="{F06AF7DF-B996-4317-B513-DD04EC0D9BFB}"/>
               </a:ext>
             </a:extLst>
           </p:cNvPr>
@@ -4377,7 +4380,7 @@
           <p:cNvPr id="5" name="Date Placeholder 4">
             <a:extLst>
               <a:ext uri="{FF2B5EF4-FFF2-40B4-BE49-F238E27FC236}">
-                <a16:creationId xmlns:a16="http://schemas.microsoft.com/office/drawing/2014/main" id="{AFEB1D17-6FAB-4A6C-B5DC-3A95F18359A4}"/>
+                <a16:creationId xmlns:a16="http://schemas.microsoft.com/office/drawing/2014/main" xmlns="" id="{AFEB1D17-6FAB-4A6C-B5DC-3A95F18359A4}"/>
               </a:ext>
             </a:extLst>
           </p:cNvPr>
@@ -4395,7 +4398,7 @@
           <a:p>
             <a:fld id="{6C0DA3B8-3DD8-4B6D-A5EE-2906BA4E1043}" type="datetimeFigureOut">
               <a:rPr lang="nl-NL" smtClean="0"/>
-              <a:t>17-8-2022</a:t>
+              <a:t>24-8-2022</a:t>
             </a:fld>
             <a:endParaRPr lang="nl-NL"/>
           </a:p>
@@ -4406,7 +4409,7 @@
           <p:cNvPr id="6" name="Footer Placeholder 5">
             <a:extLst>
               <a:ext uri="{FF2B5EF4-FFF2-40B4-BE49-F238E27FC236}">
-                <a16:creationId xmlns:a16="http://schemas.microsoft.com/office/drawing/2014/main" id="{3F776414-910A-4B05-9ACE-02A0559B3990}"/>
+                <a16:creationId xmlns:a16="http://schemas.microsoft.com/office/drawing/2014/main" xmlns="" id="{3F776414-910A-4B05-9ACE-02A0559B3990}"/>
               </a:ext>
             </a:extLst>
           </p:cNvPr>
@@ -4431,7 +4434,7 @@
           <p:cNvPr id="7" name="Slide Number Placeholder 6">
             <a:extLst>
               <a:ext uri="{FF2B5EF4-FFF2-40B4-BE49-F238E27FC236}">
-                <a16:creationId xmlns:a16="http://schemas.microsoft.com/office/drawing/2014/main" id="{C8B0C92F-161B-431F-AF1E-5BB66DA7620B}"/>
+                <a16:creationId xmlns:a16="http://schemas.microsoft.com/office/drawing/2014/main" xmlns="" id="{C8B0C92F-161B-431F-AF1E-5BB66DA7620B}"/>
               </a:ext>
             </a:extLst>
           </p:cNvPr>
@@ -4495,7 +4498,7 @@
           <p:cNvPr id="2" name="Title Placeholder 1">
             <a:extLst>
               <a:ext uri="{FF2B5EF4-FFF2-40B4-BE49-F238E27FC236}">
-                <a16:creationId xmlns:a16="http://schemas.microsoft.com/office/drawing/2014/main" id="{8EB962D6-40C9-4896-B7F2-A32C1820D5F9}"/>
+                <a16:creationId xmlns:a16="http://schemas.microsoft.com/office/drawing/2014/main" xmlns="" id="{8EB962D6-40C9-4896-B7F2-A32C1820D5F9}"/>
               </a:ext>
             </a:extLst>
           </p:cNvPr>
@@ -4534,7 +4537,7 @@
           <p:cNvPr id="3" name="Text Placeholder 2">
             <a:extLst>
               <a:ext uri="{FF2B5EF4-FFF2-40B4-BE49-F238E27FC236}">
-                <a16:creationId xmlns:a16="http://schemas.microsoft.com/office/drawing/2014/main" id="{B65EEA1D-62A8-4179-B9D3-067F82B880C8}"/>
+                <a16:creationId xmlns:a16="http://schemas.microsoft.com/office/drawing/2014/main" xmlns="" id="{B65EEA1D-62A8-4179-B9D3-067F82B880C8}"/>
               </a:ext>
             </a:extLst>
           </p:cNvPr>
@@ -4602,7 +4605,7 @@
           <p:cNvPr id="4" name="Date Placeholder 3">
             <a:extLst>
               <a:ext uri="{FF2B5EF4-FFF2-40B4-BE49-F238E27FC236}">
-                <a16:creationId xmlns:a16="http://schemas.microsoft.com/office/drawing/2014/main" id="{FCAAB73B-54AE-4A3F-8FC3-045D871A4923}"/>
+                <a16:creationId xmlns:a16="http://schemas.microsoft.com/office/drawing/2014/main" xmlns="" id="{FCAAB73B-54AE-4A3F-8FC3-045D871A4923}"/>
               </a:ext>
             </a:extLst>
           </p:cNvPr>
@@ -4638,7 +4641,7 @@
           <a:p>
             <a:fld id="{6C0DA3B8-3DD8-4B6D-A5EE-2906BA4E1043}" type="datetimeFigureOut">
               <a:rPr lang="nl-NL" smtClean="0"/>
-              <a:t>17-8-2022</a:t>
+              <a:t>24-8-2022</a:t>
             </a:fld>
             <a:endParaRPr lang="nl-NL"/>
           </a:p>
@@ -4649,7 +4652,7 @@
           <p:cNvPr id="5" name="Footer Placeholder 4">
             <a:extLst>
               <a:ext uri="{FF2B5EF4-FFF2-40B4-BE49-F238E27FC236}">
-                <a16:creationId xmlns:a16="http://schemas.microsoft.com/office/drawing/2014/main" id="{4426DB2C-0A36-492B-B695-185D984A3AB2}"/>
+                <a16:creationId xmlns:a16="http://schemas.microsoft.com/office/drawing/2014/main" xmlns="" id="{4426DB2C-0A36-492B-B695-185D984A3AB2}"/>
               </a:ext>
             </a:extLst>
           </p:cNvPr>
@@ -4692,7 +4695,7 @@
           <p:cNvPr id="6" name="Slide Number Placeholder 5">
             <a:extLst>
               <a:ext uri="{FF2B5EF4-FFF2-40B4-BE49-F238E27FC236}">
-                <a16:creationId xmlns:a16="http://schemas.microsoft.com/office/drawing/2014/main" id="{0570EC9A-2F96-4B3D-A85E-E6DE51D42BBC}"/>
+                <a16:creationId xmlns:a16="http://schemas.microsoft.com/office/drawing/2014/main" xmlns="" id="{0570EC9A-2F96-4B3D-A85E-E6DE51D42BBC}"/>
               </a:ext>
             </a:extLst>
           </p:cNvPr>
@@ -5060,7 +5063,7 @@
           <p:cNvPr id="2" name="TextBox 1">
             <a:extLst>
               <a:ext uri="{FF2B5EF4-FFF2-40B4-BE49-F238E27FC236}">
-                <a16:creationId xmlns:a16="http://schemas.microsoft.com/office/drawing/2014/main" id="{4370BD45-40C1-42D8-B1D0-91787879A43E}"/>
+                <a16:creationId xmlns:a16="http://schemas.microsoft.com/office/drawing/2014/main" xmlns="" id="{4370BD45-40C1-42D8-B1D0-91787879A43E}"/>
               </a:ext>
             </a:extLst>
           </p:cNvPr>
@@ -5108,7 +5111,7 @@
           <p:cNvPr id="4" name="TextBox 3">
             <a:extLst>
               <a:ext uri="{FF2B5EF4-FFF2-40B4-BE49-F238E27FC236}">
-                <a16:creationId xmlns:a16="http://schemas.microsoft.com/office/drawing/2014/main" id="{DFCF37F3-2606-4812-AC52-CE416CAB2236}"/>
+                <a16:creationId xmlns:a16="http://schemas.microsoft.com/office/drawing/2014/main" xmlns="" id="{DFCF37F3-2606-4812-AC52-CE416CAB2236}"/>
               </a:ext>
             </a:extLst>
           </p:cNvPr>
@@ -5148,7 +5151,7 @@
           <p:cNvPr id="5" name="TextBox 4">
             <a:extLst>
               <a:ext uri="{FF2B5EF4-FFF2-40B4-BE49-F238E27FC236}">
-                <a16:creationId xmlns:a16="http://schemas.microsoft.com/office/drawing/2014/main" id="{DA956427-117D-48F8-B957-BF2642A12032}"/>
+                <a16:creationId xmlns:a16="http://schemas.microsoft.com/office/drawing/2014/main" xmlns="" id="{DA956427-117D-48F8-B957-BF2642A12032}"/>
               </a:ext>
             </a:extLst>
           </p:cNvPr>
@@ -5188,7 +5191,7 @@
           <p:cNvPr id="6" name="TextBox 5">
             <a:extLst>
               <a:ext uri="{FF2B5EF4-FFF2-40B4-BE49-F238E27FC236}">
-                <a16:creationId xmlns:a16="http://schemas.microsoft.com/office/drawing/2014/main" id="{398D87DD-1397-4242-980B-EED820DC3720}"/>
+                <a16:creationId xmlns:a16="http://schemas.microsoft.com/office/drawing/2014/main" xmlns="" id="{398D87DD-1397-4242-980B-EED820DC3720}"/>
               </a:ext>
             </a:extLst>
           </p:cNvPr>
@@ -5228,7 +5231,7 @@
           <p:cNvPr id="7" name="TextBox 6">
             <a:extLst>
               <a:ext uri="{FF2B5EF4-FFF2-40B4-BE49-F238E27FC236}">
-                <a16:creationId xmlns:a16="http://schemas.microsoft.com/office/drawing/2014/main" id="{4BB759B9-3468-40FE-B54B-A55A9BF051D4}"/>
+                <a16:creationId xmlns:a16="http://schemas.microsoft.com/office/drawing/2014/main" xmlns="" id="{4BB759B9-3468-40FE-B54B-A55A9BF051D4}"/>
               </a:ext>
             </a:extLst>
           </p:cNvPr>
@@ -5290,7 +5293,7 @@
           <p:cNvPr id="8" name="TextBox 7">
             <a:extLst>
               <a:ext uri="{FF2B5EF4-FFF2-40B4-BE49-F238E27FC236}">
-                <a16:creationId xmlns:a16="http://schemas.microsoft.com/office/drawing/2014/main" id="{D1FC59B1-F920-45E4-ACD1-1D9F01B02AD9}"/>
+                <a16:creationId xmlns:a16="http://schemas.microsoft.com/office/drawing/2014/main" xmlns="" id="{D1FC59B1-F920-45E4-ACD1-1D9F01B02AD9}"/>
               </a:ext>
             </a:extLst>
           </p:cNvPr>
@@ -5330,7 +5333,7 @@
           <p:cNvPr id="9" name="TextBox 8">
             <a:extLst>
               <a:ext uri="{FF2B5EF4-FFF2-40B4-BE49-F238E27FC236}">
-                <a16:creationId xmlns:a16="http://schemas.microsoft.com/office/drawing/2014/main" id="{7C136895-64F2-4CB8-AE4F-6C001175E12A}"/>
+                <a16:creationId xmlns:a16="http://schemas.microsoft.com/office/drawing/2014/main" xmlns="" id="{7C136895-64F2-4CB8-AE4F-6C001175E12A}"/>
               </a:ext>
             </a:extLst>
           </p:cNvPr>
@@ -5909,7 +5912,7 @@
           <p:cNvPr id="13" name="Rectangle 12">
             <a:extLst>
               <a:ext uri="{FF2B5EF4-FFF2-40B4-BE49-F238E27FC236}">
-                <a16:creationId xmlns:a16="http://schemas.microsoft.com/office/drawing/2014/main" id="{42D559EF-1DA9-4296-8248-AF3FB28E401D}"/>
+                <a16:creationId xmlns:a16="http://schemas.microsoft.com/office/drawing/2014/main" xmlns="" id="{42D559EF-1DA9-4296-8248-AF3FB28E401D}"/>
               </a:ext>
             </a:extLst>
           </p:cNvPr>
@@ -5988,7 +5991,7 @@
           <p:cNvPr id="2" name="Picture 10">
             <a:extLst>
               <a:ext uri="{FF2B5EF4-FFF2-40B4-BE49-F238E27FC236}">
-                <a16:creationId xmlns:a16="http://schemas.microsoft.com/office/drawing/2014/main" id="{D899251A-83A7-440A-AC37-111B2A3E0842}"/>
+                <a16:creationId xmlns:a16="http://schemas.microsoft.com/office/drawing/2014/main" xmlns="" id="{D899251A-83A7-440A-AC37-111B2A3E0842}"/>
               </a:ext>
             </a:extLst>
           </p:cNvPr>
@@ -6058,7 +6061,7 @@
           <p:cNvPr id="3" name="Picture 2">
             <a:extLst>
               <a:ext uri="{FF2B5EF4-FFF2-40B4-BE49-F238E27FC236}">
-                <a16:creationId xmlns:a16="http://schemas.microsoft.com/office/drawing/2014/main" id="{FC31F305-83F3-4F00-A32B-877C9488B49E}"/>
+                <a16:creationId xmlns:a16="http://schemas.microsoft.com/office/drawing/2014/main" xmlns="" id="{FC31F305-83F3-4F00-A32B-877C9488B49E}"/>
               </a:ext>
             </a:extLst>
           </p:cNvPr>
@@ -6128,7 +6131,7 @@
           <p:cNvPr id="4" name="Rectangle 3">
             <a:extLst>
               <a:ext uri="{FF2B5EF4-FFF2-40B4-BE49-F238E27FC236}">
-                <a16:creationId xmlns:a16="http://schemas.microsoft.com/office/drawing/2014/main" id="{8C5C0BFB-D74C-4558-B5AB-EACF84239088}"/>
+                <a16:creationId xmlns:a16="http://schemas.microsoft.com/office/drawing/2014/main" xmlns="" id="{8C5C0BFB-D74C-4558-B5AB-EACF84239088}"/>
               </a:ext>
             </a:extLst>
           </p:cNvPr>
@@ -6178,7 +6181,7 @@
           <p:cNvPr id="5" name="Rectangle 4">
             <a:extLst>
               <a:ext uri="{FF2B5EF4-FFF2-40B4-BE49-F238E27FC236}">
-                <a16:creationId xmlns:a16="http://schemas.microsoft.com/office/drawing/2014/main" id="{DDF4018F-E335-4C6C-8646-89BB88D4B762}"/>
+                <a16:creationId xmlns:a16="http://schemas.microsoft.com/office/drawing/2014/main" xmlns="" id="{DDF4018F-E335-4C6C-8646-89BB88D4B762}"/>
               </a:ext>
             </a:extLst>
           </p:cNvPr>
@@ -6222,7 +6225,7 @@
           <p:cNvPr id="6" name="TextBox 5">
             <a:extLst>
               <a:ext uri="{FF2B5EF4-FFF2-40B4-BE49-F238E27FC236}">
-                <a16:creationId xmlns:a16="http://schemas.microsoft.com/office/drawing/2014/main" id="{12D877CE-3653-4D53-8F17-10CAC26C3924}"/>
+                <a16:creationId xmlns:a16="http://schemas.microsoft.com/office/drawing/2014/main" xmlns="" id="{12D877CE-3653-4D53-8F17-10CAC26C3924}"/>
               </a:ext>
             </a:extLst>
           </p:cNvPr>
@@ -6258,7 +6261,7 @@
           <p:cNvPr id="7" name="TextBox 6">
             <a:extLst>
               <a:ext uri="{FF2B5EF4-FFF2-40B4-BE49-F238E27FC236}">
-                <a16:creationId xmlns:a16="http://schemas.microsoft.com/office/drawing/2014/main" id="{72AC6800-8B12-4F44-883C-957DCF4B44A1}"/>
+                <a16:creationId xmlns:a16="http://schemas.microsoft.com/office/drawing/2014/main" xmlns="" id="{72AC6800-8B12-4F44-883C-957DCF4B44A1}"/>
               </a:ext>
             </a:extLst>
           </p:cNvPr>
@@ -6302,7 +6305,7 @@
           <p:cNvPr id="8" name="TextBox 7">
             <a:extLst>
               <a:ext uri="{FF2B5EF4-FFF2-40B4-BE49-F238E27FC236}">
-                <a16:creationId xmlns:a16="http://schemas.microsoft.com/office/drawing/2014/main" id="{5034443D-234E-4241-9CFC-83B20C303BDE}"/>
+                <a16:creationId xmlns:a16="http://schemas.microsoft.com/office/drawing/2014/main" xmlns="" id="{5034443D-234E-4241-9CFC-83B20C303BDE}"/>
               </a:ext>
             </a:extLst>
           </p:cNvPr>
@@ -6346,7 +6349,7 @@
           <p:cNvPr id="9" name="Rectangle 8">
             <a:extLst>
               <a:ext uri="{FF2B5EF4-FFF2-40B4-BE49-F238E27FC236}">
-                <a16:creationId xmlns:a16="http://schemas.microsoft.com/office/drawing/2014/main" id="{5C91C041-0D4C-47F8-A126-CB30CDD08E6A}"/>
+                <a16:creationId xmlns:a16="http://schemas.microsoft.com/office/drawing/2014/main" xmlns="" id="{5C91C041-0D4C-47F8-A126-CB30CDD08E6A}"/>
               </a:ext>
             </a:extLst>
           </p:cNvPr>
@@ -6404,72 +6407,6 @@
 </file>
 
 <file path=ppt/slides/slide12.xml><?xml version="1.0" encoding="utf-8"?>
-<p:sld xmlns:a="http://schemas.openxmlformats.org/drawingml/2006/main" xmlns:r="http://schemas.openxmlformats.org/officeDocument/2006/relationships" xmlns:p="http://schemas.openxmlformats.org/presentationml/2006/main">
-  <p:cSld>
-    <p:spTree>
-      <p:nvGrpSpPr>
-        <p:cNvPr id="1" name=""/>
-        <p:cNvGrpSpPr/>
-        <p:nvPr/>
-      </p:nvGrpSpPr>
-      <p:grpSpPr>
-        <a:xfrm>
-          <a:off x="0" y="0"/>
-          <a:ext cx="0" cy="0"/>
-          <a:chOff x="0" y="0"/>
-          <a:chExt cx="0" cy="0"/>
-        </a:xfrm>
-      </p:grpSpPr>
-      <p:sp>
-        <p:nvSpPr>
-          <p:cNvPr id="2" name="TextBox 1">
-            <a:extLst>
-              <a:ext uri="{FF2B5EF4-FFF2-40B4-BE49-F238E27FC236}">
-                <a16:creationId xmlns:a16="http://schemas.microsoft.com/office/drawing/2014/main" id="{9E979118-AB36-4BCC-8E5B-F6913895758B}"/>
-              </a:ext>
-            </a:extLst>
-          </p:cNvPr>
-          <p:cNvSpPr txBox="1"/>
-          <p:nvPr/>
-        </p:nvSpPr>
-        <p:spPr>
-          <a:xfrm>
-            <a:off x="4318654" y="2794000"/>
-            <a:ext cx="3637855" cy="523220"/>
-          </a:xfrm>
-          <a:prstGeom prst="rect">
-            <a:avLst/>
-          </a:prstGeom>
-          <a:noFill/>
-        </p:spPr>
-        <p:txBody>
-          <a:bodyPr wrap="none" rtlCol="0">
-            <a:spAutoFit/>
-          </a:bodyPr>
-          <a:lstStyle/>
-          <a:p>
-            <a:r>
-              <a:rPr lang="en-US" sz="2800" b="1" dirty="0"/>
-              <a:t>Supplementary figures </a:t>
-            </a:r>
-            <a:endParaRPr lang="nl-NL" sz="2800" b="1" dirty="0"/>
-          </a:p>
-        </p:txBody>
-      </p:sp>
-    </p:spTree>
-    <p:extLst>
-      <p:ext uri="{BB962C8B-B14F-4D97-AF65-F5344CB8AC3E}">
-        <p14:creationId xmlns:p14="http://schemas.microsoft.com/office/powerpoint/2010/main" val="4108119478"/>
-      </p:ext>
-    </p:extLst>
-  </p:cSld>
-  <p:clrMapOvr>
-    <a:masterClrMapping/>
-  </p:clrMapOvr>
-</p:sld>
-</file>
-
-<file path=ppt/slides/slide13.xml><?xml version="1.0" encoding="utf-8"?>
 <p:sld xmlns:a="http://schemas.openxmlformats.org/drawingml/2006/main" xmlns:r="http://schemas.openxmlformats.org/officeDocument/2006/relationships" xmlns:p="http://schemas.openxmlformats.org/presentationml/2006/main">
   <p:cSld>
     <p:spTree>
@@ -6600,7 +6537,7 @@
           <p:cNvPr id="10" name="Rectangle 9">
             <a:extLst>
               <a:ext uri="{FF2B5EF4-FFF2-40B4-BE49-F238E27FC236}">
-                <a16:creationId xmlns:a16="http://schemas.microsoft.com/office/drawing/2014/main" id="{1EA3EC18-9178-470C-A43D-5D2442990E9A}"/>
+                <a16:creationId xmlns:a16="http://schemas.microsoft.com/office/drawing/2014/main" xmlns="" id="{1EA3EC18-9178-470C-A43D-5D2442990E9A}"/>
               </a:ext>
             </a:extLst>
           </p:cNvPr>
@@ -6641,6 +6578,249 @@
     <p:extLst>
       <p:ext uri="{BB962C8B-B14F-4D97-AF65-F5344CB8AC3E}">
         <p14:creationId xmlns:p14="http://schemas.microsoft.com/office/powerpoint/2010/main" val="2264298664"/>
+      </p:ext>
+    </p:extLst>
+  </p:cSld>
+  <p:clrMapOvr>
+    <a:masterClrMapping/>
+  </p:clrMapOvr>
+</p:sld>
+</file>
+
+<file path=ppt/slides/slide13.xml><?xml version="1.0" encoding="utf-8"?>
+<p:sld xmlns:a="http://schemas.openxmlformats.org/drawingml/2006/main" xmlns:r="http://schemas.openxmlformats.org/officeDocument/2006/relationships" xmlns:p="http://schemas.openxmlformats.org/presentationml/2006/main">
+  <p:cSld>
+    <p:spTree>
+      <p:nvGrpSpPr>
+        <p:cNvPr id="1" name=""/>
+        <p:cNvGrpSpPr/>
+        <p:nvPr/>
+      </p:nvGrpSpPr>
+      <p:grpSpPr>
+        <a:xfrm>
+          <a:off x="0" y="0"/>
+          <a:ext cx="0" cy="0"/>
+          <a:chOff x="0" y="0"/>
+          <a:chExt cx="0" cy="0"/>
+        </a:xfrm>
+      </p:grpSpPr>
+      <p:sp>
+        <p:nvSpPr>
+          <p:cNvPr id="2" name="TextBox 1">
+            <a:extLst>
+              <a:ext uri="{FF2B5EF4-FFF2-40B4-BE49-F238E27FC236}">
+                <a16:creationId xmlns:a16="http://schemas.microsoft.com/office/drawing/2014/main" xmlns="" id="{9E979118-AB36-4BCC-8E5B-F6913895758B}"/>
+              </a:ext>
+            </a:extLst>
+          </p:cNvPr>
+          <p:cNvSpPr txBox="1"/>
+          <p:nvPr/>
+        </p:nvSpPr>
+        <p:spPr>
+          <a:xfrm>
+            <a:off x="3177980" y="1619766"/>
+            <a:ext cx="5966505" cy="523220"/>
+          </a:xfrm>
+          <a:prstGeom prst="rect">
+            <a:avLst/>
+          </a:prstGeom>
+          <a:noFill/>
+        </p:spPr>
+        <p:txBody>
+          <a:bodyPr wrap="none" rtlCol="0">
+            <a:spAutoFit/>
+          </a:bodyPr>
+          <a:lstStyle/>
+          <a:p>
+            <a:r>
+              <a:rPr lang="en-US" sz="2800" b="1" dirty="0" smtClean="0"/>
+              <a:t>Paper outline – </a:t>
+            </a:r>
+            <a:r>
+              <a:rPr lang="en-US" sz="2800" b="1" dirty="0" err="1" smtClean="0"/>
+              <a:t>ppt</a:t>
+            </a:r>
+            <a:r>
+              <a:rPr lang="en-US" sz="2800" b="1" dirty="0" smtClean="0"/>
+              <a:t> presentation mode</a:t>
+            </a:r>
+            <a:endParaRPr lang="nl-NL" sz="2800" b="1" dirty="0"/>
+          </a:p>
+        </p:txBody>
+      </p:sp>
+      <p:sp>
+        <p:nvSpPr>
+          <p:cNvPr id="3" name="TextBox 2"/>
+          <p:cNvSpPr txBox="1"/>
+          <p:nvPr/>
+        </p:nvSpPr>
+        <p:spPr>
+          <a:xfrm>
+            <a:off x="1387513" y="2431201"/>
+            <a:ext cx="9282221" cy="369332"/>
+          </a:xfrm>
+          <a:prstGeom prst="rect">
+            <a:avLst/>
+          </a:prstGeom>
+          <a:noFill/>
+        </p:spPr>
+        <p:txBody>
+          <a:bodyPr wrap="none" rtlCol="0">
+            <a:spAutoFit/>
+          </a:bodyPr>
+          <a:lstStyle/>
+          <a:p>
+            <a:r>
+              <a:rPr lang="en-US" dirty="0" smtClean="0"/>
+              <a:t>We will show the outline we have for the paper, and then all figures and tables section by section</a:t>
+            </a:r>
+            <a:endParaRPr lang="en-US" dirty="0"/>
+          </a:p>
+        </p:txBody>
+      </p:sp>
+      <p:sp>
+        <p:nvSpPr>
+          <p:cNvPr id="4" name="TextBox 3"/>
+          <p:cNvSpPr txBox="1"/>
+          <p:nvPr/>
+        </p:nvSpPr>
+        <p:spPr>
+          <a:xfrm>
+            <a:off x="834323" y="3331175"/>
+            <a:ext cx="10388600" cy="1754326"/>
+          </a:xfrm>
+          <a:prstGeom prst="rect">
+            <a:avLst/>
+          </a:prstGeom>
+          <a:noFill/>
+        </p:spPr>
+        <p:txBody>
+          <a:bodyPr wrap="square" rtlCol="0">
+            <a:spAutoFit/>
+          </a:bodyPr>
+          <a:lstStyle/>
+          <a:p>
+            <a:r>
+              <a:rPr lang="en-US" dirty="0" err="1" smtClean="0"/>
+              <a:t>Ultimatetly</a:t>
+            </a:r>
+            <a:r>
+              <a:rPr lang="en-US" dirty="0" smtClean="0"/>
+              <a:t>, our research shows </a:t>
+            </a:r>
+            <a:r>
+              <a:rPr lang="en-US" dirty="0" err="1" smtClean="0"/>
+              <a:t>Comamonadaceae</a:t>
+            </a:r>
+            <a:r>
+              <a:rPr lang="en-US" dirty="0" smtClean="0"/>
+              <a:t> is overly present in lists of ASVs that were defined as relevant by different methods. This is consistent across plant species and plant compartments</a:t>
+            </a:r>
+          </a:p>
+          <a:p>
+            <a:endParaRPr lang="en-US" dirty="0"/>
+          </a:p>
+          <a:p>
+            <a:r>
+              <a:rPr lang="en-US" dirty="0" smtClean="0"/>
+              <a:t>One of the reasons </a:t>
+            </a:r>
+            <a:r>
+              <a:rPr lang="en-US" dirty="0" err="1" smtClean="0"/>
+              <a:t>Comamonadaceae</a:t>
+            </a:r>
+            <a:r>
+              <a:rPr lang="en-US" dirty="0" smtClean="0"/>
+              <a:t> can be important is because they are also present and functional in the gut of herbivorous insects. Our research helps to blur the (artificial) line that divides plant microbiome from insect microbiome, while focusing new efforts in a specific group of microbes.</a:t>
+            </a:r>
+            <a:endParaRPr lang="en-US" dirty="0"/>
+          </a:p>
+        </p:txBody>
+      </p:sp>
+      <p:sp>
+        <p:nvSpPr>
+          <p:cNvPr id="5" name="Rectangle 4"/>
+          <p:cNvSpPr/>
+          <p:nvPr/>
+        </p:nvSpPr>
+        <p:spPr>
+          <a:xfrm>
+            <a:off x="77002" y="182880"/>
+            <a:ext cx="11903242" cy="1264919"/>
+          </a:xfrm>
+          <a:prstGeom prst="rect">
+            <a:avLst/>
+          </a:prstGeom>
+        </p:spPr>
+        <p:style>
+          <a:lnRef idx="2">
+            <a:schemeClr val="accent1">
+              <a:shade val="50000"/>
+            </a:schemeClr>
+          </a:lnRef>
+          <a:fillRef idx="1">
+            <a:schemeClr val="accent1"/>
+          </a:fillRef>
+          <a:effectRef idx="0">
+            <a:schemeClr val="accent1"/>
+          </a:effectRef>
+          <a:fontRef idx="minor">
+            <a:schemeClr val="lt1"/>
+          </a:fontRef>
+        </p:style>
+        <p:txBody>
+          <a:bodyPr rtlCol="0" anchor="ctr"/>
+          <a:lstStyle/>
+          <a:p>
+            <a:pPr algn="ctr"/>
+            <a:endParaRPr lang="en-US"/>
+          </a:p>
+        </p:txBody>
+      </p:sp>
+      <p:sp>
+        <p:nvSpPr>
+          <p:cNvPr id="6" name="Rectangle 5"/>
+          <p:cNvSpPr/>
+          <p:nvPr/>
+        </p:nvSpPr>
+        <p:spPr>
+          <a:xfrm>
+            <a:off x="77002" y="5245101"/>
+            <a:ext cx="11903242" cy="1540710"/>
+          </a:xfrm>
+          <a:prstGeom prst="rect">
+            <a:avLst/>
+          </a:prstGeom>
+        </p:spPr>
+        <p:style>
+          <a:lnRef idx="2">
+            <a:schemeClr val="accent1">
+              <a:shade val="50000"/>
+            </a:schemeClr>
+          </a:lnRef>
+          <a:fillRef idx="1">
+            <a:schemeClr val="accent1"/>
+          </a:fillRef>
+          <a:effectRef idx="0">
+            <a:schemeClr val="accent1"/>
+          </a:effectRef>
+          <a:fontRef idx="minor">
+            <a:schemeClr val="lt1"/>
+          </a:fontRef>
+        </p:style>
+        <p:txBody>
+          <a:bodyPr rtlCol="0" anchor="ctr"/>
+          <a:lstStyle/>
+          <a:p>
+            <a:pPr algn="ctr"/>
+            <a:endParaRPr lang="en-US" dirty="0"/>
+          </a:p>
+        </p:txBody>
+      </p:sp>
+    </p:spTree>
+    <p:extLst>
+      <p:ext uri="{BB962C8B-B14F-4D97-AF65-F5344CB8AC3E}">
+        <p14:creationId xmlns:p14="http://schemas.microsoft.com/office/powerpoint/2010/main" val="4108119478"/>
       </p:ext>
     </p:extLst>
   </p:cSld>
@@ -6667,10 +6847,707 @@
           <a:chExt cx="0" cy="0"/>
         </a:xfrm>
       </p:grpSpPr>
+      <p:sp>
+        <p:nvSpPr>
+          <p:cNvPr id="2" name="Rectangle 1"/>
+          <p:cNvSpPr/>
+          <p:nvPr/>
+        </p:nvSpPr>
+        <p:spPr>
+          <a:xfrm>
+            <a:off x="0" y="0"/>
+            <a:ext cx="6096000" cy="6001643"/>
+          </a:xfrm>
+          <a:prstGeom prst="rect">
+            <a:avLst/>
+          </a:prstGeom>
+        </p:spPr>
+        <p:txBody>
+          <a:bodyPr>
+            <a:spAutoFit/>
+          </a:bodyPr>
+          <a:lstStyle/>
+          <a:p>
+            <a:r>
+              <a:rPr lang="en-US" sz="1200" b="1" i="1" u="sng" dirty="0"/>
+              <a:t>Essential paper outline</a:t>
+            </a:r>
+            <a:endParaRPr lang="en-US" sz="1200" dirty="0"/>
+          </a:p>
+          <a:p>
+            <a:r>
+              <a:rPr lang="en-US" sz="1200" b="1" dirty="0"/>
+              <a:t>Introduction</a:t>
+            </a:r>
+            <a:r>
+              <a:rPr lang="en-US" sz="1200" dirty="0"/>
+              <a:t> </a:t>
+            </a:r>
+          </a:p>
+          <a:p>
+            <a:pPr lvl="0"/>
+            <a:r>
+              <a:rPr lang="en-US" sz="1200" dirty="0"/>
+              <a:t>plant-insect-microbe interaction</a:t>
+            </a:r>
+          </a:p>
+          <a:p>
+            <a:pPr lvl="0"/>
+            <a:r>
+              <a:rPr lang="en-US" sz="1200" dirty="0" err="1"/>
+              <a:t>Holobiont</a:t>
+            </a:r>
+            <a:r>
+              <a:rPr lang="en-US" sz="1200" dirty="0"/>
+              <a:t> </a:t>
+            </a:r>
+          </a:p>
+          <a:p>
+            <a:pPr lvl="0"/>
+            <a:r>
+              <a:rPr lang="en-US" sz="1200" dirty="0"/>
+              <a:t>data </a:t>
+            </a:r>
+            <a:r>
+              <a:rPr lang="en-US" sz="1200" dirty="0" smtClean="0"/>
+              <a:t>deluge</a:t>
+            </a:r>
+          </a:p>
+          <a:p>
+            <a:pPr lvl="0"/>
+            <a:endParaRPr lang="en-US" sz="1200" dirty="0"/>
+          </a:p>
+          <a:p>
+            <a:r>
+              <a:rPr lang="en-US" sz="1200" b="1" dirty="0"/>
+              <a:t>Results</a:t>
+            </a:r>
+            <a:endParaRPr lang="en-US" sz="1200" dirty="0"/>
+          </a:p>
+          <a:p>
+            <a:pPr lvl="0"/>
+            <a:r>
+              <a:rPr lang="en-US" sz="1200" dirty="0"/>
+              <a:t>Plant growth &amp; </a:t>
+            </a:r>
+            <a:r>
+              <a:rPr lang="en-US" sz="1200" dirty="0" err="1"/>
+              <a:t>qPCR</a:t>
+            </a:r>
+            <a:r>
+              <a:rPr lang="en-US" sz="1200" dirty="0"/>
+              <a:t> (show plants were stressed)</a:t>
+            </a:r>
+          </a:p>
+          <a:p>
+            <a:pPr lvl="1"/>
+            <a:r>
+              <a:rPr lang="en-US" sz="1200" dirty="0"/>
+              <a:t>1 figure with 4 </a:t>
+            </a:r>
+            <a:r>
+              <a:rPr lang="en-US" sz="1200" dirty="0" err="1"/>
+              <a:t>pannels</a:t>
+            </a:r>
+            <a:r>
+              <a:rPr lang="en-US" sz="1200" dirty="0"/>
+              <a:t>, raw plant biomass values [SUP or MAIN?]</a:t>
+            </a:r>
+          </a:p>
+          <a:p>
+            <a:pPr lvl="1"/>
+            <a:r>
+              <a:rPr lang="en-US" sz="1200" dirty="0"/>
+              <a:t>1 figure, Cohen’s D effect size across </a:t>
+            </a:r>
+            <a:r>
+              <a:rPr lang="en-US" sz="1200" dirty="0" err="1"/>
+              <a:t>pecies</a:t>
+            </a:r>
+            <a:r>
+              <a:rPr lang="en-US" sz="1200" dirty="0"/>
+              <a:t> and variables [SUP or MAIN?]</a:t>
+            </a:r>
+          </a:p>
+          <a:p>
+            <a:pPr lvl="1"/>
+            <a:r>
+              <a:rPr lang="en-US" sz="1200" dirty="0"/>
+              <a:t>1 figure, </a:t>
+            </a:r>
+            <a:r>
+              <a:rPr lang="en-US" sz="1200" dirty="0" err="1"/>
+              <a:t>qPCR</a:t>
+            </a:r>
+            <a:r>
+              <a:rPr lang="en-US" sz="1200" dirty="0"/>
+              <a:t> plot [ SUP]</a:t>
+            </a:r>
+          </a:p>
+          <a:p>
+            <a:pPr lvl="0"/>
+            <a:r>
+              <a:rPr lang="en-US" sz="1200" dirty="0"/>
+              <a:t>Beta &amp; alpha diversity (Basic analysis present in any paper)</a:t>
+            </a:r>
+          </a:p>
+          <a:p>
+            <a:pPr lvl="1"/>
+            <a:r>
+              <a:rPr lang="en-US" sz="1200" dirty="0"/>
+              <a:t>1 Figure, rarefaction curve [SUP]</a:t>
+            </a:r>
+          </a:p>
+          <a:p>
+            <a:pPr lvl="1"/>
+            <a:r>
+              <a:rPr lang="en-US" sz="1200" dirty="0"/>
+              <a:t>1 Figure, full community beta diversity [MAIN]</a:t>
+            </a:r>
+          </a:p>
+          <a:p>
+            <a:pPr lvl="2"/>
+            <a:r>
+              <a:rPr lang="en-US" sz="1200" dirty="0"/>
+              <a:t>3 tables, PERMANOVAs and pairwise comparison [3 SUP]</a:t>
+            </a:r>
+          </a:p>
+          <a:p>
+            <a:pPr lvl="1"/>
+            <a:r>
+              <a:rPr lang="en-US" sz="1200" dirty="0"/>
+              <a:t>1 figure, full community Shannon diversity [MAIN]</a:t>
+            </a:r>
+          </a:p>
+          <a:p>
+            <a:pPr lvl="2"/>
+            <a:r>
+              <a:rPr lang="en-US" sz="1200" dirty="0"/>
+              <a:t>2 tables, ANOVA and post-hoc [2 SUP]</a:t>
+            </a:r>
+          </a:p>
+          <a:p>
+            <a:pPr lvl="0"/>
+            <a:r>
+              <a:rPr lang="en-US" sz="1200" dirty="0"/>
+              <a:t>Neutral models [3 figures, 2 sup tables]: </a:t>
+            </a:r>
+          </a:p>
+          <a:p>
+            <a:pPr lvl="1"/>
+            <a:r>
+              <a:rPr lang="en-US" sz="1200" dirty="0"/>
+              <a:t>1 Figure with 6 </a:t>
+            </a:r>
+            <a:r>
+              <a:rPr lang="en-US" sz="1200" dirty="0" err="1"/>
+              <a:t>pannels</a:t>
+            </a:r>
+            <a:r>
+              <a:rPr lang="en-US" sz="1200" dirty="0"/>
+              <a:t>: full rhizosphere ordination + Neutral model fits + above-expected rhizosphere ordination re-plotting [MAIN]</a:t>
+            </a:r>
+          </a:p>
+          <a:p>
+            <a:pPr lvl="2"/>
+            <a:r>
+              <a:rPr lang="en-US" sz="1200" dirty="0"/>
+              <a:t>2 tables, PERMANOVA table and pairwise comparisons [2 SUP]</a:t>
+            </a:r>
+          </a:p>
+          <a:p>
+            <a:pPr lvl="2"/>
+            <a:r>
+              <a:rPr lang="en-US" sz="1200" dirty="0"/>
+              <a:t>1 table, 100 PERMANOVAs bootstrapping to Check artifacts [SUP]</a:t>
+            </a:r>
+          </a:p>
+          <a:p>
+            <a:pPr lvl="1"/>
+            <a:r>
+              <a:rPr lang="en-US" sz="1200" dirty="0"/>
+              <a:t>Above-expected differential </a:t>
+            </a:r>
+            <a:r>
+              <a:rPr lang="en-US" sz="1200" dirty="0" err="1"/>
+              <a:t>abudances</a:t>
+            </a:r>
+            <a:r>
+              <a:rPr lang="en-US" sz="1200" dirty="0"/>
+              <a:t> (heat tree focus on </a:t>
+            </a:r>
+            <a:r>
+              <a:rPr lang="en-US" sz="1200" dirty="0" err="1"/>
+              <a:t>comamonadaceae</a:t>
+            </a:r>
+            <a:r>
+              <a:rPr lang="en-US" sz="1200" dirty="0"/>
+              <a:t>)</a:t>
+            </a:r>
+          </a:p>
+          <a:p>
+            <a:pPr lvl="2"/>
+            <a:r>
+              <a:rPr lang="en-US" sz="1200" dirty="0"/>
+              <a:t>1 figure with 2 </a:t>
+            </a:r>
+            <a:r>
+              <a:rPr lang="en-US" sz="1200" dirty="0" err="1"/>
+              <a:t>pannels</a:t>
+            </a:r>
+            <a:r>
+              <a:rPr lang="en-US" sz="1200" dirty="0"/>
+              <a:t>, has complex matrix of heat trees [MAIN]</a:t>
+            </a:r>
+          </a:p>
+          <a:p>
+            <a:pPr lvl="1"/>
+            <a:r>
+              <a:rPr lang="en-US" sz="1200" dirty="0"/>
+              <a:t>Alpha diversity regression (focus on </a:t>
+            </a:r>
+            <a:r>
+              <a:rPr lang="en-US" sz="1200" dirty="0" err="1"/>
+              <a:t>comamonadaceae</a:t>
+            </a:r>
+            <a:r>
+              <a:rPr lang="en-US" sz="1200" dirty="0"/>
+              <a:t>)</a:t>
+            </a:r>
+          </a:p>
+          <a:p>
+            <a:pPr lvl="2"/>
+            <a:r>
+              <a:rPr lang="en-US" sz="1200" dirty="0"/>
+              <a:t>1 figure with 6 </a:t>
+            </a:r>
+            <a:r>
+              <a:rPr lang="en-US" sz="1200" dirty="0" err="1"/>
+              <a:t>pannels</a:t>
+            </a:r>
+            <a:r>
+              <a:rPr lang="en-US" sz="1200" dirty="0"/>
+              <a:t> (observed, Shannon and </a:t>
+            </a:r>
+            <a:r>
+              <a:rPr lang="en-US" sz="1200" dirty="0" err="1"/>
+              <a:t>simpson</a:t>
+            </a:r>
+            <a:r>
+              <a:rPr lang="en-US" sz="1200" dirty="0"/>
+              <a:t> diversity at Family level for BO and AT) [MAIN]</a:t>
+            </a:r>
+          </a:p>
+          <a:p>
+            <a:pPr lvl="2"/>
+            <a:r>
+              <a:rPr lang="en-US" sz="1200" dirty="0"/>
+              <a:t>2 figures with 6 </a:t>
+            </a:r>
+            <a:r>
+              <a:rPr lang="en-US" sz="1200" dirty="0" err="1"/>
+              <a:t>pannels</a:t>
+            </a:r>
+            <a:r>
+              <a:rPr lang="en-US" sz="1200" dirty="0"/>
+              <a:t> each (observed, Shannon and </a:t>
+            </a:r>
+            <a:r>
+              <a:rPr lang="en-US" sz="1200" dirty="0" err="1"/>
+              <a:t>simpson</a:t>
+            </a:r>
+            <a:r>
+              <a:rPr lang="en-US" sz="1200" dirty="0"/>
+              <a:t> </a:t>
+            </a:r>
+            <a:r>
+              <a:rPr lang="en-US" sz="1200" dirty="0" err="1"/>
+              <a:t>diversty</a:t>
+            </a:r>
+            <a:r>
+              <a:rPr lang="en-US" sz="1200" dirty="0"/>
+              <a:t> at Family level for BO and AT) [2 SUP]</a:t>
+            </a:r>
+          </a:p>
+          <a:p>
+            <a:pPr lvl="0"/>
+            <a:r>
+              <a:rPr lang="en-US" sz="1200" dirty="0"/>
+              <a:t>Random forest (show ASVs that matter on prediction)</a:t>
+            </a:r>
+          </a:p>
+          <a:p>
+            <a:pPr lvl="1"/>
+            <a:r>
+              <a:rPr lang="en-US" sz="1200" dirty="0"/>
+              <a:t>1 Figure with 4 panels, ASV abundance per treatment [MAIN or SUP?]</a:t>
+            </a:r>
+          </a:p>
+          <a:p>
+            <a:pPr lvl="1"/>
+            <a:r>
+              <a:rPr lang="en-US" sz="1200" dirty="0"/>
+              <a:t>3 tables: sample size + precision + kappa, confusion matrix, ASV taxonomies [3 SUP</a:t>
+            </a:r>
+            <a:r>
+              <a:rPr lang="en-US" sz="1200" dirty="0" smtClean="0"/>
+              <a:t>]</a:t>
+            </a:r>
+            <a:endParaRPr lang="en-US" sz="1200" dirty="0"/>
+          </a:p>
+        </p:txBody>
+      </p:sp>
+      <p:sp>
+        <p:nvSpPr>
+          <p:cNvPr id="3" name="Rectangle 2"/>
+          <p:cNvSpPr/>
+          <p:nvPr/>
+        </p:nvSpPr>
+        <p:spPr>
+          <a:xfrm>
+            <a:off x="6096000" y="0"/>
+            <a:ext cx="6096000" cy="6555641"/>
+          </a:xfrm>
+          <a:prstGeom prst="rect">
+            <a:avLst/>
+          </a:prstGeom>
+        </p:spPr>
+        <p:txBody>
+          <a:bodyPr>
+            <a:spAutoFit/>
+          </a:bodyPr>
+          <a:lstStyle/>
+          <a:p>
+            <a:pPr lvl="0"/>
+            <a:r>
+              <a:rPr lang="en-US" sz="1200" dirty="0"/>
+              <a:t>Network analysis (describe networks, ASVs with importance tags, Leave module discussion on supplementary text)</a:t>
+            </a:r>
+          </a:p>
+          <a:p>
+            <a:pPr lvl="1"/>
+            <a:r>
+              <a:rPr lang="en-US" sz="1200" dirty="0"/>
+              <a:t>1 figure with 4 panels showing the networks [MAIN or SUP?]</a:t>
+            </a:r>
+          </a:p>
+          <a:p>
+            <a:pPr lvl="1"/>
+            <a:r>
+              <a:rPr lang="en-US" sz="1200" dirty="0"/>
+              <a:t>1 table showing differences to 1000 random networks [SUP]</a:t>
+            </a:r>
+          </a:p>
+          <a:p>
+            <a:pPr lvl="1"/>
+            <a:r>
+              <a:rPr lang="en-US" sz="1200" dirty="0"/>
+              <a:t>1 figure showing PCA of network metrics [SUP]</a:t>
+            </a:r>
+          </a:p>
+          <a:p>
+            <a:pPr lvl="1"/>
+            <a:r>
+              <a:rPr lang="en-US" sz="1200" dirty="0"/>
+              <a:t>1 figure with 4 panels showing module correlation to metadata [SUP]</a:t>
+            </a:r>
+          </a:p>
+          <a:p>
+            <a:pPr lvl="0"/>
+            <a:r>
+              <a:rPr lang="en-US" sz="1200" dirty="0"/>
+              <a:t>Differential abundance (keep </a:t>
+            </a:r>
+            <a:r>
+              <a:rPr lang="en-US" sz="1200" i="1" dirty="0"/>
+              <a:t>very</a:t>
+            </a:r>
+            <a:r>
+              <a:rPr lang="en-US" sz="1200" dirty="0"/>
+              <a:t> short)</a:t>
+            </a:r>
+          </a:p>
+          <a:p>
+            <a:pPr lvl="1"/>
+            <a:r>
+              <a:rPr lang="en-US" sz="1200" dirty="0"/>
+              <a:t>1 Fig, bi-plot </a:t>
+            </a:r>
+            <a:r>
+              <a:rPr lang="en-US" sz="1200" dirty="0" err="1"/>
+              <a:t>heatmap</a:t>
+            </a:r>
+            <a:r>
+              <a:rPr lang="en-US" sz="1200" dirty="0"/>
+              <a:t> [SUP or MAIN?]</a:t>
+            </a:r>
+          </a:p>
+          <a:p>
+            <a:pPr lvl="0"/>
+            <a:r>
+              <a:rPr lang="en-US" sz="1200" dirty="0"/>
+              <a:t>Fisher Summary (describe figure, highlight </a:t>
+            </a:r>
+            <a:r>
+              <a:rPr lang="en-US" sz="1200" dirty="0" err="1"/>
+              <a:t>comamonadaceae</a:t>
+            </a:r>
+            <a:r>
+              <a:rPr lang="en-US" sz="1200" dirty="0"/>
+              <a:t>)</a:t>
+            </a:r>
+          </a:p>
+          <a:p>
+            <a:pPr lvl="1"/>
+            <a:r>
+              <a:rPr lang="en-US" sz="1200" dirty="0"/>
+              <a:t>1 figure with 4 </a:t>
+            </a:r>
+            <a:r>
+              <a:rPr lang="en-US" sz="1200" dirty="0" err="1"/>
+              <a:t>pannels</a:t>
+            </a:r>
+            <a:r>
+              <a:rPr lang="en-US" sz="1200" dirty="0"/>
+              <a:t>, showing fisher results on tree</a:t>
+            </a:r>
+          </a:p>
+          <a:p>
+            <a:r>
+              <a:rPr lang="en-US" sz="1200" b="1" dirty="0"/>
+              <a:t>Discussion</a:t>
+            </a:r>
+            <a:endParaRPr lang="en-US" sz="1200" dirty="0"/>
+          </a:p>
+          <a:p>
+            <a:r>
+              <a:rPr lang="en-US" sz="1200" i="1" dirty="0"/>
+              <a:t>Methyl </a:t>
+            </a:r>
+            <a:r>
+              <a:rPr lang="en-US" sz="1200" i="1" dirty="0" err="1"/>
+              <a:t>Jasmonate</a:t>
+            </a:r>
+            <a:r>
+              <a:rPr lang="en-US" sz="1200" i="1" dirty="0"/>
+              <a:t> triggers plant defense</a:t>
+            </a:r>
+            <a:endParaRPr lang="en-US" sz="1200" dirty="0"/>
+          </a:p>
+          <a:p>
+            <a:pPr lvl="0"/>
+            <a:r>
+              <a:rPr lang="en-US" sz="1200" dirty="0"/>
+              <a:t>Validate Experimental approach</a:t>
+            </a:r>
+          </a:p>
+          <a:p>
+            <a:pPr lvl="1"/>
+            <a:r>
+              <a:rPr lang="en-US" sz="1200" dirty="0" err="1"/>
+              <a:t>MeJA</a:t>
+            </a:r>
+            <a:r>
+              <a:rPr lang="en-US" sz="1200" dirty="0"/>
+              <a:t> impacts the microbial community similarly to Oral Secretion, thus </a:t>
+            </a:r>
+            <a:r>
+              <a:rPr lang="en-US" sz="1200" dirty="0" err="1"/>
+              <a:t>MeJA</a:t>
+            </a:r>
+            <a:r>
+              <a:rPr lang="en-US" sz="1200" dirty="0"/>
+              <a:t> can be used in place of real insects</a:t>
+            </a:r>
+          </a:p>
+          <a:p>
+            <a:pPr lvl="1"/>
+            <a:r>
+              <a:rPr lang="en-US" sz="1200" dirty="0"/>
+              <a:t>Compare base alpha and beta diversity to other references</a:t>
+            </a:r>
+          </a:p>
+          <a:p>
+            <a:r>
+              <a:rPr lang="en-US" sz="1200" i="1" dirty="0"/>
+              <a:t>Stress treatments were subtle on the structure of the full community but clear on the taxa </a:t>
+            </a:r>
+            <a:r>
+              <a:rPr lang="en-US" sz="1200" i="1" dirty="0" err="1"/>
+              <a:t>occuring</a:t>
+            </a:r>
+            <a:r>
+              <a:rPr lang="en-US" sz="1200" i="1" dirty="0"/>
+              <a:t> above </a:t>
+            </a:r>
+            <a:r>
+              <a:rPr lang="en-US" sz="1200" i="1" dirty="0" err="1"/>
+              <a:t>neutraility</a:t>
+            </a:r>
+            <a:endParaRPr lang="en-US" sz="1200" dirty="0"/>
+          </a:p>
+          <a:p>
+            <a:pPr lvl="0"/>
+            <a:r>
+              <a:rPr lang="en-US" sz="1200" dirty="0"/>
+              <a:t>Advantages Methodological approach </a:t>
+            </a:r>
+          </a:p>
+          <a:p>
+            <a:pPr lvl="1"/>
+            <a:r>
+              <a:rPr lang="en-US" sz="1200" dirty="0"/>
+              <a:t>the neutral </a:t>
+            </a:r>
+            <a:r>
+              <a:rPr lang="en-US" sz="1200" dirty="0" err="1"/>
+              <a:t>spliting</a:t>
+            </a:r>
+            <a:r>
+              <a:rPr lang="en-US" sz="1200" dirty="0"/>
+              <a:t>-and-joining can help see subtle treatment effects ;</a:t>
+            </a:r>
+          </a:p>
+          <a:p>
+            <a:pPr lvl="1"/>
+            <a:r>
+              <a:rPr lang="en-US" sz="1200" dirty="0"/>
+              <a:t>the neutral tree can help locate a diversity hotspot (mention </a:t>
+            </a:r>
+            <a:r>
+              <a:rPr lang="en-US" sz="1200" dirty="0" err="1"/>
+              <a:t>rhizobiales</a:t>
+            </a:r>
+            <a:r>
+              <a:rPr lang="en-US" sz="1200" dirty="0"/>
+              <a:t> but limit discussion)</a:t>
+            </a:r>
+          </a:p>
+          <a:p>
+            <a:r>
+              <a:rPr lang="en-US" sz="1200" i="1" dirty="0"/>
+              <a:t>“Fishing” with Fisher: 1 out of 1.111 taxa highlighted by 3 different methods</a:t>
+            </a:r>
+            <a:endParaRPr lang="en-US" sz="1200" dirty="0"/>
+          </a:p>
+          <a:p>
+            <a:pPr lvl="1"/>
+            <a:r>
+              <a:rPr lang="en-US" sz="1200" dirty="0"/>
+              <a:t>Show how the excess of information complicates analysis</a:t>
+            </a:r>
+          </a:p>
+          <a:p>
+            <a:pPr lvl="1"/>
+            <a:r>
+              <a:rPr lang="en-US" sz="1200" dirty="0"/>
+              <a:t>Show that after using several methods we still have a complex dataset</a:t>
+            </a:r>
+          </a:p>
+          <a:p>
+            <a:pPr lvl="1"/>
+            <a:r>
+              <a:rPr lang="en-US" sz="1200" dirty="0"/>
+              <a:t>the fisher test in a heat tree helps summarizing findings (approach to data deluge)</a:t>
+            </a:r>
+          </a:p>
+          <a:p>
+            <a:r>
+              <a:rPr lang="en-US" sz="1200" dirty="0"/>
+              <a:t> </a:t>
+            </a:r>
+          </a:p>
+          <a:p>
+            <a:r>
+              <a:rPr lang="en-US" sz="1200" i="1" dirty="0"/>
+              <a:t>Family </a:t>
+            </a:r>
+            <a:r>
+              <a:rPr lang="en-US" sz="1200" i="1" dirty="0" err="1"/>
+              <a:t>Commonadaceae</a:t>
+            </a:r>
+            <a:r>
+              <a:rPr lang="en-US" sz="1200" i="1" dirty="0"/>
+              <a:t> was relevant across treatments, plant species, sample types, and analysis methods</a:t>
+            </a:r>
+            <a:endParaRPr lang="en-US" sz="1200" dirty="0"/>
+          </a:p>
+          <a:p>
+            <a:pPr lvl="1"/>
+            <a:r>
+              <a:rPr lang="en-US" sz="1200" dirty="0"/>
+              <a:t>show that </a:t>
+            </a:r>
+            <a:r>
+              <a:rPr lang="en-US" sz="1200" dirty="0" err="1"/>
+              <a:t>comamonadaceae</a:t>
+            </a:r>
+            <a:r>
+              <a:rPr lang="en-US" sz="1200" dirty="0"/>
+              <a:t> was highlighted independently in both approaches</a:t>
+            </a:r>
+          </a:p>
+          <a:p>
+            <a:pPr lvl="1"/>
+            <a:r>
+              <a:rPr lang="en-US" sz="1200" dirty="0"/>
+              <a:t>Show how common they are on the roots</a:t>
+            </a:r>
+          </a:p>
+          <a:p>
+            <a:pPr lvl="1"/>
+            <a:r>
+              <a:rPr lang="en-US" sz="1200" dirty="0"/>
+              <a:t>Show how common they are in the insect gut</a:t>
+            </a:r>
+          </a:p>
+          <a:p>
+            <a:pPr lvl="1"/>
+            <a:r>
+              <a:rPr lang="en-US" sz="1200" dirty="0"/>
+              <a:t>Fit them in the </a:t>
+            </a:r>
+            <a:r>
+              <a:rPr lang="en-US" sz="1200" dirty="0" err="1"/>
+              <a:t>holobiont</a:t>
+            </a:r>
+            <a:r>
+              <a:rPr lang="en-US" sz="1200" dirty="0"/>
+              <a:t> approach (insects do more than giving a ride to </a:t>
+            </a:r>
+            <a:r>
+              <a:rPr lang="en-US" sz="1200" dirty="0" err="1"/>
+              <a:t>Bac</a:t>
+            </a:r>
+            <a:r>
+              <a:rPr lang="en-US" sz="1200" dirty="0"/>
+              <a:t>)</a:t>
+            </a:r>
+          </a:p>
+          <a:p>
+            <a:r>
+              <a:rPr lang="en-US" sz="1200" dirty="0"/>
+              <a:t>CONCLUSION: </a:t>
+            </a:r>
+          </a:p>
+          <a:p>
+            <a:pPr lvl="1"/>
+            <a:r>
+              <a:rPr lang="en-US" sz="1200" dirty="0" err="1"/>
+              <a:t>Comamonadaceae</a:t>
+            </a:r>
+            <a:r>
+              <a:rPr lang="en-US" sz="1200" dirty="0"/>
+              <a:t> are important in insect-plant interactions</a:t>
+            </a:r>
+            <a:endParaRPr lang="en-US" sz="1200" dirty="0"/>
+          </a:p>
+        </p:txBody>
+      </p:sp>
     </p:spTree>
     <p:extLst>
       <p:ext uri="{BB962C8B-B14F-4D97-AF65-F5344CB8AC3E}">
-        <p14:creationId xmlns:p14="http://schemas.microsoft.com/office/powerpoint/2010/main" val="3131997891"/>
+        <p14:creationId xmlns:p14="http://schemas.microsoft.com/office/powerpoint/2010/main" val="2062753287"/>
       </p:ext>
     </p:extLst>
   </p:cSld>
@@ -6697,10 +7574,163 @@
           <a:chExt cx="0" cy="0"/>
         </a:xfrm>
       </p:grpSpPr>
+      <p:sp>
+        <p:nvSpPr>
+          <p:cNvPr id="2" name="TextBox 1"/>
+          <p:cNvSpPr txBox="1"/>
+          <p:nvPr/>
+        </p:nvSpPr>
+        <p:spPr>
+          <a:xfrm>
+            <a:off x="317501" y="406399"/>
+            <a:ext cx="9372599" cy="4801314"/>
+          </a:xfrm>
+          <a:prstGeom prst="rect">
+            <a:avLst/>
+          </a:prstGeom>
+          <a:noFill/>
+        </p:spPr>
+        <p:txBody>
+          <a:bodyPr wrap="square" rtlCol="0">
+            <a:spAutoFit/>
+          </a:bodyPr>
+          <a:lstStyle/>
+          <a:p>
+            <a:r>
+              <a:rPr lang="en-US" b="1" dirty="0" smtClean="0"/>
+              <a:t>Introduction</a:t>
+            </a:r>
+          </a:p>
+          <a:p>
+            <a:pPr marL="285750" indent="-285750">
+              <a:buFont typeface="Arial" pitchFamily="34" charset="0"/>
+              <a:buChar char="•"/>
+            </a:pPr>
+            <a:endParaRPr lang="en-US" dirty="0"/>
+          </a:p>
+          <a:p>
+            <a:pPr marL="285750" indent="-285750">
+              <a:buFont typeface="Arial" pitchFamily="34" charset="0"/>
+              <a:buChar char="•"/>
+            </a:pPr>
+            <a:r>
+              <a:rPr lang="en-US" dirty="0" smtClean="0"/>
+              <a:t>Not started yet!</a:t>
+            </a:r>
+          </a:p>
+          <a:p>
+            <a:pPr marL="285750" indent="-285750">
+              <a:buFont typeface="Arial" pitchFamily="34" charset="0"/>
+              <a:buChar char="•"/>
+            </a:pPr>
+            <a:endParaRPr lang="en-US" dirty="0"/>
+          </a:p>
+          <a:p>
+            <a:pPr marL="285750" indent="-285750">
+              <a:buFont typeface="Arial" pitchFamily="34" charset="0"/>
+              <a:buChar char="•"/>
+            </a:pPr>
+            <a:r>
+              <a:rPr lang="en-US" dirty="0" smtClean="0"/>
+              <a:t>Give the basic overview of plant-insect-</a:t>
+            </a:r>
+            <a:r>
+              <a:rPr lang="en-US" dirty="0" err="1" smtClean="0"/>
+              <a:t>mirobe</a:t>
+            </a:r>
+            <a:r>
+              <a:rPr lang="en-US" dirty="0" smtClean="0"/>
+              <a:t> interaction</a:t>
+            </a:r>
+          </a:p>
+          <a:p>
+            <a:pPr marL="285750" indent="-285750">
+              <a:buFont typeface="Arial" pitchFamily="34" charset="0"/>
+              <a:buChar char="•"/>
+            </a:pPr>
+            <a:r>
+              <a:rPr lang="en-US" dirty="0" smtClean="0"/>
+              <a:t>Frame it in the concept of the </a:t>
+            </a:r>
+            <a:r>
+              <a:rPr lang="en-US" dirty="0" err="1" smtClean="0"/>
+              <a:t>holobiont</a:t>
+            </a:r>
+            <a:r>
+              <a:rPr lang="en-US" dirty="0" smtClean="0"/>
+              <a:t>, groups of microbes</a:t>
+            </a:r>
+          </a:p>
+          <a:p>
+            <a:pPr marL="285750" indent="-285750">
+              <a:buFont typeface="Arial" pitchFamily="34" charset="0"/>
+              <a:buChar char="•"/>
+            </a:pPr>
+            <a:r>
+              <a:rPr lang="en-US" dirty="0" smtClean="0"/>
+              <a:t>Show how the excess of information can hinder analysis and decisions (data deluge)</a:t>
+            </a:r>
+          </a:p>
+          <a:p>
+            <a:pPr marL="285750" indent="-285750">
+              <a:buFont typeface="Arial" pitchFamily="34" charset="0"/>
+              <a:buChar char="•"/>
+            </a:pPr>
+            <a:endParaRPr lang="en-US" dirty="0" smtClean="0"/>
+          </a:p>
+          <a:p>
+            <a:pPr marL="742950" lvl="1" indent="-285750">
+              <a:buFont typeface="Arial" pitchFamily="34" charset="0"/>
+              <a:buChar char="•"/>
+            </a:pPr>
+            <a:r>
+              <a:rPr lang="en-US" dirty="0" smtClean="0"/>
+              <a:t>Maybe compare tools and targets of old microbiome research with new microbiome research because…</a:t>
+            </a:r>
+          </a:p>
+          <a:p>
+            <a:pPr marL="1200150" lvl="2" indent="-285750">
+              <a:buFont typeface="Arial" pitchFamily="34" charset="0"/>
+              <a:buChar char="•"/>
+            </a:pPr>
+            <a:r>
+              <a:rPr lang="en-US" dirty="0" smtClean="0"/>
+              <a:t>Old methods (differential abundance, alpha/beta diversity) do not account for group of ASVs (like in RF or networks). </a:t>
+            </a:r>
+          </a:p>
+          <a:p>
+            <a:pPr marL="1200150" lvl="2" indent="-285750">
+              <a:buFont typeface="Arial" pitchFamily="34" charset="0"/>
+              <a:buChar char="•"/>
+            </a:pPr>
+            <a:r>
+              <a:rPr lang="en-US" dirty="0" smtClean="0"/>
+              <a:t>Most references stop at differential abundance, while ASV prevalence in multiple samples, network degree, prediction importance can be largely independent of number of sequences</a:t>
+            </a:r>
+          </a:p>
+          <a:p>
+            <a:pPr marL="1200150" lvl="2" indent="-285750">
+              <a:buFont typeface="Arial" pitchFamily="34" charset="0"/>
+              <a:buChar char="•"/>
+            </a:pPr>
+            <a:r>
+              <a:rPr lang="en-US" dirty="0" smtClean="0"/>
+              <a:t>Popularization of code-based analysis favors development of new pipelines</a:t>
+            </a:r>
+          </a:p>
+          <a:p>
+            <a:pPr marL="285750" indent="-285750">
+              <a:buFont typeface="Arial" pitchFamily="34" charset="0"/>
+              <a:buChar char="•"/>
+            </a:pPr>
+            <a:endParaRPr lang="en-US" dirty="0"/>
+          </a:p>
+        </p:txBody>
+      </p:sp>
     </p:spTree>
     <p:extLst>
       <p:ext uri="{BB962C8B-B14F-4D97-AF65-F5344CB8AC3E}">
-        <p14:creationId xmlns:p14="http://schemas.microsoft.com/office/powerpoint/2010/main" val="2802047034"/>
+        <p14:creationId xmlns:p14="http://schemas.microsoft.com/office/powerpoint/2010/main" val="3306661435"/>
       </p:ext>
     </p:extLst>
   </p:cSld>
@@ -6727,6 +7757,634 @@
           <a:chExt cx="0" cy="0"/>
         </a:xfrm>
       </p:grpSpPr>
+      <p:sp>
+        <p:nvSpPr>
+          <p:cNvPr id="2" name="Rectangle 1"/>
+          <p:cNvSpPr/>
+          <p:nvPr/>
+        </p:nvSpPr>
+        <p:spPr>
+          <a:xfrm>
+            <a:off x="0" y="169"/>
+            <a:ext cx="6096000" cy="1015663"/>
+          </a:xfrm>
+          <a:prstGeom prst="rect">
+            <a:avLst/>
+          </a:prstGeom>
+        </p:spPr>
+        <p:txBody>
+          <a:bodyPr>
+            <a:spAutoFit/>
+          </a:bodyPr>
+          <a:lstStyle/>
+          <a:p>
+            <a:r>
+              <a:rPr lang="en-US" sz="1200" b="1" dirty="0"/>
+              <a:t>Results</a:t>
+            </a:r>
+            <a:endParaRPr lang="en-US" sz="1200" dirty="0"/>
+          </a:p>
+          <a:p>
+            <a:pPr lvl="0"/>
+            <a:r>
+              <a:rPr lang="en-US" sz="1200" dirty="0"/>
+              <a:t>Plant growth &amp; </a:t>
+            </a:r>
+            <a:r>
+              <a:rPr lang="en-US" sz="1200" dirty="0" err="1"/>
+              <a:t>qPCR</a:t>
+            </a:r>
+            <a:r>
+              <a:rPr lang="en-US" sz="1200" dirty="0"/>
+              <a:t> (show plants were stressed)</a:t>
+            </a:r>
+          </a:p>
+          <a:p>
+            <a:pPr lvl="1"/>
+            <a:r>
+              <a:rPr lang="en-US" sz="1200" dirty="0"/>
+              <a:t>1 figure with 4 </a:t>
+            </a:r>
+            <a:r>
+              <a:rPr lang="en-US" sz="1200" dirty="0" err="1"/>
+              <a:t>pannels</a:t>
+            </a:r>
+            <a:r>
+              <a:rPr lang="en-US" sz="1200" dirty="0"/>
+              <a:t>, raw plant biomass values [SUP or MAIN?]</a:t>
+            </a:r>
+          </a:p>
+          <a:p>
+            <a:pPr lvl="1"/>
+            <a:r>
+              <a:rPr lang="en-US" sz="1200" dirty="0"/>
+              <a:t>1 figure, Cohen’s D effect size across </a:t>
+            </a:r>
+            <a:r>
+              <a:rPr lang="en-US" sz="1200" dirty="0" err="1"/>
+              <a:t>pecies</a:t>
+            </a:r>
+            <a:r>
+              <a:rPr lang="en-US" sz="1200" dirty="0"/>
+              <a:t> and variables [SUP or MAIN?]</a:t>
+            </a:r>
+          </a:p>
+          <a:p>
+            <a:pPr lvl="1"/>
+            <a:r>
+              <a:rPr lang="en-US" sz="1200" dirty="0"/>
+              <a:t>1 figure, </a:t>
+            </a:r>
+            <a:r>
+              <a:rPr lang="en-US" sz="1200" dirty="0" err="1"/>
+              <a:t>qPCR</a:t>
+            </a:r>
+            <a:r>
+              <a:rPr lang="en-US" sz="1200" dirty="0"/>
+              <a:t> plot [ SUP]</a:t>
+            </a:r>
+            <a:endParaRPr lang="en-US" sz="1200" dirty="0"/>
+          </a:p>
+        </p:txBody>
+      </p:sp>
+      <p:pic>
+        <p:nvPicPr>
+          <p:cNvPr id="3" name="Picture 3"/>
+          <p:cNvPicPr>
+            <a:picLocks noChangeAspect="1" noChangeArrowheads="1"/>
+          </p:cNvPicPr>
+          <p:nvPr/>
+        </p:nvPicPr>
+        <p:blipFill>
+          <a:blip r:embed="rId2">
+            <a:extLst>
+              <a:ext uri="{28A0092B-C50C-407E-A947-70E740481C1C}">
+                <a14:useLocalDpi xmlns:a14="http://schemas.microsoft.com/office/drawing/2010/main" val="0"/>
+              </a:ext>
+            </a:extLst>
+          </a:blip>
+          <a:srcRect/>
+          <a:stretch>
+            <a:fillRect/>
+          </a:stretch>
+        </p:blipFill>
+        <p:spPr bwMode="auto">
+          <a:xfrm>
+            <a:off x="5943599" y="431914"/>
+            <a:ext cx="3047999" cy="2947860"/>
+          </a:xfrm>
+          <a:prstGeom prst="rect">
+            <a:avLst/>
+          </a:prstGeom>
+          <a:noFill/>
+          <a:ln>
+            <a:noFill/>
+          </a:ln>
+          <a:effectLst/>
+          <a:extLst>
+            <a:ext uri="{909E8E84-426E-40DD-AFC4-6F175D3DCCD1}">
+              <a14:hiddenFill xmlns:a14="http://schemas.microsoft.com/office/drawing/2010/main">
+                <a:solidFill>
+                  <a:schemeClr val="accent1"/>
+                </a:solidFill>
+              </a14:hiddenFill>
+            </a:ext>
+            <a:ext uri="{91240B29-F687-4F45-9708-019B960494DF}">
+              <a14:hiddenLine xmlns:a14="http://schemas.microsoft.com/office/drawing/2010/main" w="9525">
+                <a:solidFill>
+                  <a:schemeClr val="tx1"/>
+                </a:solidFill>
+                <a:miter lim="800000"/>
+                <a:headEnd/>
+                <a:tailEnd/>
+              </a14:hiddenLine>
+            </a:ext>
+            <a:ext uri="{AF507438-7753-43E0-B8FC-AC1667EBCBE1}">
+              <a14:hiddenEffects xmlns:a14="http://schemas.microsoft.com/office/drawing/2010/main">
+                <a:effectLst>
+                  <a:outerShdw dist="35921" dir="2700000" algn="ctr" rotWithShape="0">
+                    <a:schemeClr val="bg2"/>
+                  </a:outerShdw>
+                </a:effectLst>
+              </a14:hiddenEffects>
+            </a:ext>
+          </a:extLst>
+        </p:spPr>
+      </p:pic>
+      <p:pic>
+        <p:nvPicPr>
+          <p:cNvPr id="4" name="Picture 4"/>
+          <p:cNvPicPr>
+            <a:picLocks noChangeAspect="1" noChangeArrowheads="1"/>
+          </p:cNvPicPr>
+          <p:nvPr/>
+        </p:nvPicPr>
+        <p:blipFill>
+          <a:blip r:embed="rId3">
+            <a:extLst>
+              <a:ext uri="{28A0092B-C50C-407E-A947-70E740481C1C}">
+                <a14:useLocalDpi xmlns:a14="http://schemas.microsoft.com/office/drawing/2010/main" val="0"/>
+              </a:ext>
+            </a:extLst>
+          </a:blip>
+          <a:srcRect/>
+          <a:stretch>
+            <a:fillRect/>
+          </a:stretch>
+        </p:blipFill>
+        <p:spPr bwMode="auto">
+          <a:xfrm>
+            <a:off x="9106579" y="395722"/>
+            <a:ext cx="3085421" cy="2984052"/>
+          </a:xfrm>
+          <a:prstGeom prst="rect">
+            <a:avLst/>
+          </a:prstGeom>
+          <a:noFill/>
+          <a:ln>
+            <a:noFill/>
+          </a:ln>
+          <a:effectLst/>
+          <a:extLst>
+            <a:ext uri="{909E8E84-426E-40DD-AFC4-6F175D3DCCD1}">
+              <a14:hiddenFill xmlns:a14="http://schemas.microsoft.com/office/drawing/2010/main">
+                <a:solidFill>
+                  <a:schemeClr val="accent1"/>
+                </a:solidFill>
+              </a14:hiddenFill>
+            </a:ext>
+            <a:ext uri="{91240B29-F687-4F45-9708-019B960494DF}">
+              <a14:hiddenLine xmlns:a14="http://schemas.microsoft.com/office/drawing/2010/main" w="9525">
+                <a:solidFill>
+                  <a:schemeClr val="tx1"/>
+                </a:solidFill>
+                <a:miter lim="800000"/>
+                <a:headEnd/>
+                <a:tailEnd/>
+              </a14:hiddenLine>
+            </a:ext>
+            <a:ext uri="{AF507438-7753-43E0-B8FC-AC1667EBCBE1}">
+              <a14:hiddenEffects xmlns:a14="http://schemas.microsoft.com/office/drawing/2010/main">
+                <a:effectLst>
+                  <a:outerShdw dist="35921" dir="2700000" algn="ctr" rotWithShape="0">
+                    <a:schemeClr val="bg2"/>
+                  </a:outerShdw>
+                </a:effectLst>
+              </a14:hiddenEffects>
+            </a:ext>
+          </a:extLst>
+        </p:spPr>
+      </p:pic>
+    </p:spTree>
+    <p:extLst>
+      <p:ext uri="{BB962C8B-B14F-4D97-AF65-F5344CB8AC3E}">
+        <p14:creationId xmlns:p14="http://schemas.microsoft.com/office/powerpoint/2010/main" val="2257895428"/>
+      </p:ext>
+    </p:extLst>
+  </p:cSld>
+  <p:clrMapOvr>
+    <a:masterClrMapping/>
+  </p:clrMapOvr>
+</p:sld>
+</file>
+
+<file path=ppt/slides/slide17.xml><?xml version="1.0" encoding="utf-8"?>
+<p:sld xmlns:a="http://schemas.openxmlformats.org/drawingml/2006/main" xmlns:r="http://schemas.openxmlformats.org/officeDocument/2006/relationships" xmlns:p="http://schemas.openxmlformats.org/presentationml/2006/main">
+  <p:cSld>
+    <p:spTree>
+      <p:nvGrpSpPr>
+        <p:cNvPr id="1" name=""/>
+        <p:cNvGrpSpPr/>
+        <p:nvPr/>
+      </p:nvGrpSpPr>
+      <p:grpSpPr>
+        <a:xfrm>
+          <a:off x="0" y="0"/>
+          <a:ext cx="0" cy="0"/>
+          <a:chOff x="0" y="0"/>
+          <a:chExt cx="0" cy="0"/>
+        </a:xfrm>
+      </p:grpSpPr>
+      <p:sp>
+        <p:nvSpPr>
+          <p:cNvPr id="2" name="Rectangle 1"/>
+          <p:cNvSpPr/>
+          <p:nvPr/>
+        </p:nvSpPr>
+        <p:spPr>
+          <a:xfrm>
+            <a:off x="0" y="0"/>
+            <a:ext cx="6096000" cy="1384995"/>
+          </a:xfrm>
+          <a:prstGeom prst="rect">
+            <a:avLst/>
+          </a:prstGeom>
+        </p:spPr>
+        <p:txBody>
+          <a:bodyPr>
+            <a:spAutoFit/>
+          </a:bodyPr>
+          <a:lstStyle/>
+          <a:p>
+            <a:r>
+              <a:rPr lang="en-US" sz="1200" b="1" dirty="0"/>
+              <a:t>Results</a:t>
+            </a:r>
+            <a:endParaRPr lang="en-US" sz="1200" dirty="0"/>
+          </a:p>
+          <a:p>
+            <a:pPr lvl="0"/>
+            <a:r>
+              <a:rPr lang="en-US" sz="1200" dirty="0" smtClean="0"/>
+              <a:t>Beta </a:t>
+            </a:r>
+            <a:r>
+              <a:rPr lang="en-US" sz="1200" dirty="0"/>
+              <a:t>&amp; alpha diversity (Basic analysis present in any paper)</a:t>
+            </a:r>
+          </a:p>
+          <a:p>
+            <a:pPr lvl="1"/>
+            <a:r>
+              <a:rPr lang="en-US" sz="1200" dirty="0"/>
+              <a:t>1 Figure, rarefaction curve [SUP]</a:t>
+            </a:r>
+          </a:p>
+          <a:p>
+            <a:pPr lvl="1"/>
+            <a:r>
+              <a:rPr lang="en-US" sz="1200" dirty="0"/>
+              <a:t>1 Figure, full community beta diversity [MAIN]</a:t>
+            </a:r>
+          </a:p>
+          <a:p>
+            <a:pPr lvl="2"/>
+            <a:r>
+              <a:rPr lang="en-US" sz="1200" dirty="0"/>
+              <a:t>3 tables, PERMANOVAs and pairwise comparison [3 SUP]</a:t>
+            </a:r>
+          </a:p>
+          <a:p>
+            <a:pPr lvl="1"/>
+            <a:r>
+              <a:rPr lang="en-US" sz="1200" dirty="0"/>
+              <a:t>1 figure, full community Shannon diversity [MAIN]</a:t>
+            </a:r>
+          </a:p>
+          <a:p>
+            <a:pPr lvl="2"/>
+            <a:r>
+              <a:rPr lang="en-US" sz="1200" dirty="0"/>
+              <a:t>2 tables, ANOVA and post-hoc [2 SUP</a:t>
+            </a:r>
+            <a:r>
+              <a:rPr lang="en-US" sz="1200" dirty="0" smtClean="0"/>
+              <a:t>]</a:t>
+            </a:r>
+            <a:endParaRPr lang="en-US" sz="1200" dirty="0"/>
+          </a:p>
+        </p:txBody>
+      </p:sp>
+    </p:spTree>
+    <p:extLst>
+      <p:ext uri="{BB962C8B-B14F-4D97-AF65-F5344CB8AC3E}">
+        <p14:creationId xmlns:p14="http://schemas.microsoft.com/office/powerpoint/2010/main" val="3131997891"/>
+      </p:ext>
+    </p:extLst>
+  </p:cSld>
+  <p:clrMapOvr>
+    <a:masterClrMapping/>
+  </p:clrMapOvr>
+</p:sld>
+</file>
+
+<file path=ppt/slides/slide18.xml><?xml version="1.0" encoding="utf-8"?>
+<p:sld xmlns:a="http://schemas.openxmlformats.org/drawingml/2006/main" xmlns:r="http://schemas.openxmlformats.org/officeDocument/2006/relationships" xmlns:p="http://schemas.openxmlformats.org/presentationml/2006/main">
+  <p:cSld>
+    <p:spTree>
+      <p:nvGrpSpPr>
+        <p:cNvPr id="1" name=""/>
+        <p:cNvGrpSpPr/>
+        <p:nvPr/>
+      </p:nvGrpSpPr>
+      <p:grpSpPr>
+        <a:xfrm>
+          <a:off x="0" y="0"/>
+          <a:ext cx="0" cy="0"/>
+          <a:chOff x="0" y="0"/>
+          <a:chExt cx="0" cy="0"/>
+        </a:xfrm>
+      </p:grpSpPr>
+      <p:sp>
+        <p:nvSpPr>
+          <p:cNvPr id="2" name="Rectangle 1"/>
+          <p:cNvSpPr/>
+          <p:nvPr/>
+        </p:nvSpPr>
+        <p:spPr>
+          <a:xfrm>
+            <a:off x="0" y="0"/>
+            <a:ext cx="10960100" cy="1938992"/>
+          </a:xfrm>
+          <a:prstGeom prst="rect">
+            <a:avLst/>
+          </a:prstGeom>
+        </p:spPr>
+        <p:txBody>
+          <a:bodyPr wrap="square">
+            <a:spAutoFit/>
+          </a:bodyPr>
+          <a:lstStyle/>
+          <a:p>
+            <a:r>
+              <a:rPr lang="en-US" sz="1200" b="1" dirty="0"/>
+              <a:t>Results</a:t>
+            </a:r>
+            <a:endParaRPr lang="en-US" sz="1200" dirty="0"/>
+          </a:p>
+          <a:p>
+            <a:pPr lvl="0"/>
+            <a:r>
+              <a:rPr lang="en-US" sz="1200" dirty="0" smtClean="0"/>
+              <a:t>Neutral </a:t>
+            </a:r>
+            <a:r>
+              <a:rPr lang="en-US" sz="1200" dirty="0"/>
+              <a:t>models </a:t>
+            </a:r>
+          </a:p>
+          <a:p>
+            <a:pPr lvl="0"/>
+            <a:r>
+              <a:rPr lang="en-US" sz="1200" dirty="0" smtClean="0"/>
+              <a:t>	1 </a:t>
+            </a:r>
+            <a:r>
+              <a:rPr lang="en-US" sz="1200" dirty="0"/>
+              <a:t>Figure with 6 </a:t>
+            </a:r>
+            <a:r>
+              <a:rPr lang="en-US" sz="1200" dirty="0" err="1"/>
+              <a:t>pannels</a:t>
+            </a:r>
+            <a:r>
+              <a:rPr lang="en-US" sz="1200" dirty="0"/>
+              <a:t>: full rhizosphere ordination + Neutral model fits + above-expected rhizosphere ordination re-plotting [MAIN]</a:t>
+            </a:r>
+          </a:p>
+          <a:p>
+            <a:pPr lvl="2"/>
+            <a:r>
+              <a:rPr lang="en-US" sz="1200" dirty="0"/>
+              <a:t>2 tables, PERMANOVA table and pairwise comparisons [2 SUP]</a:t>
+            </a:r>
+          </a:p>
+          <a:p>
+            <a:pPr lvl="2"/>
+            <a:r>
+              <a:rPr lang="en-US" sz="1200" dirty="0"/>
+              <a:t>1 table, 100 PERMANOVAs bootstrapping to Check artifacts [SUP]</a:t>
+            </a:r>
+          </a:p>
+          <a:p>
+            <a:pPr lvl="1"/>
+            <a:r>
+              <a:rPr lang="en-US" sz="1200" dirty="0"/>
+              <a:t>Above-expected differential </a:t>
+            </a:r>
+            <a:r>
+              <a:rPr lang="en-US" sz="1200" dirty="0" err="1"/>
+              <a:t>abudances</a:t>
+            </a:r>
+            <a:r>
+              <a:rPr lang="en-US" sz="1200" dirty="0"/>
+              <a:t> (heat tree focus on </a:t>
+            </a:r>
+            <a:r>
+              <a:rPr lang="en-US" sz="1200" dirty="0" err="1"/>
+              <a:t>comamonadaceae</a:t>
+            </a:r>
+            <a:r>
+              <a:rPr lang="en-US" sz="1200" dirty="0"/>
+              <a:t>)</a:t>
+            </a:r>
+          </a:p>
+          <a:p>
+            <a:pPr lvl="2"/>
+            <a:r>
+              <a:rPr lang="en-US" sz="1200" dirty="0"/>
+              <a:t>1 figure with 2 </a:t>
+            </a:r>
+            <a:r>
+              <a:rPr lang="en-US" sz="1200" dirty="0" err="1"/>
+              <a:t>pannels</a:t>
+            </a:r>
+            <a:r>
+              <a:rPr lang="en-US" sz="1200" dirty="0"/>
+              <a:t>, has complex matrix of heat trees [MAIN]</a:t>
+            </a:r>
+          </a:p>
+          <a:p>
+            <a:pPr lvl="1"/>
+            <a:r>
+              <a:rPr lang="en-US" sz="1200" dirty="0"/>
+              <a:t>Alpha diversity regression (focus on </a:t>
+            </a:r>
+            <a:r>
+              <a:rPr lang="en-US" sz="1200" dirty="0" err="1"/>
+              <a:t>comamonadaceae</a:t>
+            </a:r>
+            <a:r>
+              <a:rPr lang="en-US" sz="1200" dirty="0"/>
+              <a:t>)</a:t>
+            </a:r>
+          </a:p>
+          <a:p>
+            <a:pPr lvl="2"/>
+            <a:r>
+              <a:rPr lang="en-US" sz="1200" dirty="0"/>
+              <a:t>1 figure with 6 </a:t>
+            </a:r>
+            <a:r>
+              <a:rPr lang="en-US" sz="1200" dirty="0" err="1"/>
+              <a:t>pannels</a:t>
+            </a:r>
+            <a:r>
+              <a:rPr lang="en-US" sz="1200" dirty="0"/>
+              <a:t> (observed, Shannon and </a:t>
+            </a:r>
+            <a:r>
+              <a:rPr lang="en-US" sz="1200" dirty="0" err="1"/>
+              <a:t>simpson</a:t>
+            </a:r>
+            <a:r>
+              <a:rPr lang="en-US" sz="1200" dirty="0"/>
+              <a:t> diversity at Family level for BO and AT) [MAIN]</a:t>
+            </a:r>
+          </a:p>
+          <a:p>
+            <a:pPr lvl="2"/>
+            <a:r>
+              <a:rPr lang="en-US" sz="1200" dirty="0"/>
+              <a:t>2 figures with 6 </a:t>
+            </a:r>
+            <a:r>
+              <a:rPr lang="en-US" sz="1200" dirty="0" err="1"/>
+              <a:t>pannels</a:t>
+            </a:r>
+            <a:r>
+              <a:rPr lang="en-US" sz="1200" dirty="0"/>
+              <a:t> each (observed, Shannon and </a:t>
+            </a:r>
+            <a:r>
+              <a:rPr lang="en-US" sz="1200" dirty="0" err="1"/>
+              <a:t>simpson</a:t>
+            </a:r>
+            <a:r>
+              <a:rPr lang="en-US" sz="1200" dirty="0"/>
+              <a:t> </a:t>
+            </a:r>
+            <a:r>
+              <a:rPr lang="en-US" sz="1200" dirty="0" err="1"/>
+              <a:t>diversty</a:t>
+            </a:r>
+            <a:r>
+              <a:rPr lang="en-US" sz="1200" dirty="0"/>
+              <a:t> at Family level for BO and AT) [2 SUP</a:t>
+            </a:r>
+            <a:r>
+              <a:rPr lang="en-US" sz="1200" dirty="0" smtClean="0"/>
+              <a:t>]</a:t>
+            </a:r>
+            <a:endParaRPr lang="en-US" sz="1200" dirty="0"/>
+          </a:p>
+        </p:txBody>
+      </p:sp>
+    </p:spTree>
+    <p:extLst>
+      <p:ext uri="{BB962C8B-B14F-4D97-AF65-F5344CB8AC3E}">
+        <p14:creationId xmlns:p14="http://schemas.microsoft.com/office/powerpoint/2010/main" val="2802047034"/>
+      </p:ext>
+    </p:extLst>
+  </p:cSld>
+  <p:clrMapOvr>
+    <a:masterClrMapping/>
+  </p:clrMapOvr>
+</p:sld>
+</file>
+
+<file path=ppt/slides/slide19.xml><?xml version="1.0" encoding="utf-8"?>
+<p:sld xmlns:a="http://schemas.openxmlformats.org/drawingml/2006/main" xmlns:r="http://schemas.openxmlformats.org/officeDocument/2006/relationships" xmlns:p="http://schemas.openxmlformats.org/presentationml/2006/main">
+  <p:cSld>
+    <p:spTree>
+      <p:nvGrpSpPr>
+        <p:cNvPr id="1" name=""/>
+        <p:cNvGrpSpPr/>
+        <p:nvPr/>
+      </p:nvGrpSpPr>
+      <p:grpSpPr>
+        <a:xfrm>
+          <a:off x="0" y="0"/>
+          <a:ext cx="0" cy="0"/>
+          <a:chOff x="0" y="0"/>
+          <a:chExt cx="0" cy="0"/>
+        </a:xfrm>
+      </p:grpSpPr>
+      <p:sp>
+        <p:nvSpPr>
+          <p:cNvPr id="2" name="Rectangle 1"/>
+          <p:cNvSpPr/>
+          <p:nvPr/>
+        </p:nvSpPr>
+        <p:spPr>
+          <a:xfrm>
+            <a:off x="0" y="-21123"/>
+            <a:ext cx="6096000" cy="830997"/>
+          </a:xfrm>
+          <a:prstGeom prst="rect">
+            <a:avLst/>
+          </a:prstGeom>
+        </p:spPr>
+        <p:txBody>
+          <a:bodyPr>
+            <a:spAutoFit/>
+          </a:bodyPr>
+          <a:lstStyle/>
+          <a:p>
+            <a:r>
+              <a:rPr lang="en-US" sz="1200" b="1" dirty="0"/>
+              <a:t>Results</a:t>
+            </a:r>
+            <a:endParaRPr lang="en-US" sz="1200" dirty="0"/>
+          </a:p>
+          <a:p>
+            <a:pPr lvl="0"/>
+            <a:r>
+              <a:rPr lang="en-US" sz="1200" dirty="0" smtClean="0"/>
+              <a:t>Random </a:t>
+            </a:r>
+            <a:r>
+              <a:rPr lang="en-US" sz="1200" dirty="0"/>
+              <a:t>forest (show ASVs that matter on prediction)</a:t>
+            </a:r>
+          </a:p>
+          <a:p>
+            <a:pPr lvl="1"/>
+            <a:r>
+              <a:rPr lang="en-US" sz="1200" dirty="0"/>
+              <a:t>1 Figure with 4 panels, ASV abundance per treatment [MAIN or SUP?]</a:t>
+            </a:r>
+          </a:p>
+          <a:p>
+            <a:pPr lvl="1"/>
+            <a:r>
+              <a:rPr lang="en-US" sz="1200" dirty="0"/>
+              <a:t>3 tables: sample size + precision + kappa, confusion matrix, ASV taxonomies [3 SUP]</a:t>
+            </a:r>
+            <a:endParaRPr lang="en-US" sz="1200" dirty="0"/>
+          </a:p>
+        </p:txBody>
+      </p:sp>
     </p:spTree>
     <p:extLst>
       <p:ext uri="{BB962C8B-B14F-4D97-AF65-F5344CB8AC3E}">
@@ -6762,7 +8420,7 @@
           <p:cNvPr id="2" name="TextBox 1">
             <a:extLst>
               <a:ext uri="{FF2B5EF4-FFF2-40B4-BE49-F238E27FC236}">
-                <a16:creationId xmlns:a16="http://schemas.microsoft.com/office/drawing/2014/main" id="{0C962064-B1D5-436E-81D4-2009E7EC0061}"/>
+                <a16:creationId xmlns:a16="http://schemas.microsoft.com/office/drawing/2014/main" xmlns="" id="{0C962064-B1D5-436E-81D4-2009E7EC0061}"/>
               </a:ext>
             </a:extLst>
           </p:cNvPr>
@@ -6812,7 +8470,7 @@
           <p:cNvPr id="3" name="TextBox 2">
             <a:extLst>
               <a:ext uri="{FF2B5EF4-FFF2-40B4-BE49-F238E27FC236}">
-                <a16:creationId xmlns:a16="http://schemas.microsoft.com/office/drawing/2014/main" id="{DD3EE2F9-9CFE-4194-B991-BDC08CD2AECC}"/>
+                <a16:creationId xmlns:a16="http://schemas.microsoft.com/office/drawing/2014/main" xmlns="" id="{DD3EE2F9-9CFE-4194-B991-BDC08CD2AECC}"/>
               </a:ext>
             </a:extLst>
           </p:cNvPr>
@@ -6852,7 +8510,7 @@
           <p:cNvPr id="4" name="TextBox 3">
             <a:extLst>
               <a:ext uri="{FF2B5EF4-FFF2-40B4-BE49-F238E27FC236}">
-                <a16:creationId xmlns:a16="http://schemas.microsoft.com/office/drawing/2014/main" id="{6FE928B5-9074-4D53-96DB-F18857EFB92A}"/>
+                <a16:creationId xmlns:a16="http://schemas.microsoft.com/office/drawing/2014/main" xmlns="" id="{6FE928B5-9074-4D53-96DB-F18857EFB92A}"/>
               </a:ext>
             </a:extLst>
           </p:cNvPr>
@@ -6888,7 +8546,7 @@
           <p:cNvPr id="5" name="TextBox 4">
             <a:extLst>
               <a:ext uri="{FF2B5EF4-FFF2-40B4-BE49-F238E27FC236}">
-                <a16:creationId xmlns:a16="http://schemas.microsoft.com/office/drawing/2014/main" id="{E31F930A-1C63-4906-B09E-0EF4A0E958F9}"/>
+                <a16:creationId xmlns:a16="http://schemas.microsoft.com/office/drawing/2014/main" xmlns="" id="{E31F930A-1C63-4906-B09E-0EF4A0E958F9}"/>
               </a:ext>
             </a:extLst>
           </p:cNvPr>
@@ -6958,7 +8616,7 @@
           <p:cNvPr id="3" name="Group 2">
             <a:extLst>
               <a:ext uri="{FF2B5EF4-FFF2-40B4-BE49-F238E27FC236}">
-                <a16:creationId xmlns:a16="http://schemas.microsoft.com/office/drawing/2014/main" id="{ED38D672-3462-460A-A284-6B7452CFC238}"/>
+                <a16:creationId xmlns:a16="http://schemas.microsoft.com/office/drawing/2014/main" xmlns="" id="{ED38D672-3462-460A-A284-6B7452CFC238}"/>
               </a:ext>
             </a:extLst>
           </p:cNvPr>
@@ -6978,7 +8636,7 @@
             <p:cNvPr id="4" name="Picture 3" descr="Chart, box and whisker chart&#10;&#10;Description automatically generated">
               <a:extLst>
                 <a:ext uri="{FF2B5EF4-FFF2-40B4-BE49-F238E27FC236}">
-                  <a16:creationId xmlns:a16="http://schemas.microsoft.com/office/drawing/2014/main" id="{8AC0CBD0-EEE5-4C6F-AF7E-02295E180EBF}"/>
+                  <a16:creationId xmlns:a16="http://schemas.microsoft.com/office/drawing/2014/main" xmlns="" id="{8AC0CBD0-EEE5-4C6F-AF7E-02295E180EBF}"/>
                 </a:ext>
               </a:extLst>
             </p:cNvPr>
@@ -7013,7 +8671,7 @@
             <p:cNvPr id="5" name="Picture 4" descr="Chart, box and whisker chart&#10;&#10;Description automatically generated">
               <a:extLst>
                 <a:ext uri="{FF2B5EF4-FFF2-40B4-BE49-F238E27FC236}">
-                  <a16:creationId xmlns:a16="http://schemas.microsoft.com/office/drawing/2014/main" id="{77DFEE77-5CB3-40CF-87FF-C9BFB227EE47}"/>
+                  <a16:creationId xmlns:a16="http://schemas.microsoft.com/office/drawing/2014/main" xmlns="" id="{77DFEE77-5CB3-40CF-87FF-C9BFB227EE47}"/>
                 </a:ext>
               </a:extLst>
             </p:cNvPr>
@@ -7049,7 +8707,7 @@
           <p:cNvPr id="6" name="Picture 5" descr="Chart, box and whisker chart&#10;&#10;Description automatically generated">
             <a:extLst>
               <a:ext uri="{FF2B5EF4-FFF2-40B4-BE49-F238E27FC236}">
-                <a16:creationId xmlns:a16="http://schemas.microsoft.com/office/drawing/2014/main" id="{066817FD-0346-4022-B509-DF2786764A94}"/>
+                <a16:creationId xmlns:a16="http://schemas.microsoft.com/office/drawing/2014/main" xmlns="" id="{066817FD-0346-4022-B509-DF2786764A94}"/>
               </a:ext>
             </a:extLst>
           </p:cNvPr>
@@ -7084,7 +8742,7 @@
           <p:cNvPr id="7" name="Group 6">
             <a:extLst>
               <a:ext uri="{FF2B5EF4-FFF2-40B4-BE49-F238E27FC236}">
-                <a16:creationId xmlns:a16="http://schemas.microsoft.com/office/drawing/2014/main" id="{7907B658-83C5-4484-8658-5B0816AF7CFC}"/>
+                <a16:creationId xmlns:a16="http://schemas.microsoft.com/office/drawing/2014/main" xmlns="" id="{7907B658-83C5-4484-8658-5B0816AF7CFC}"/>
               </a:ext>
             </a:extLst>
           </p:cNvPr>
@@ -7104,7 +8762,7 @@
             <p:cNvPr id="8" name="Picture 7">
               <a:extLst>
                 <a:ext uri="{FF2B5EF4-FFF2-40B4-BE49-F238E27FC236}">
-                  <a16:creationId xmlns:a16="http://schemas.microsoft.com/office/drawing/2014/main" id="{5C87B5E3-D68A-4ECF-9F1C-4875B7F3C873}"/>
+                  <a16:creationId xmlns:a16="http://schemas.microsoft.com/office/drawing/2014/main" xmlns="" id="{5C87B5E3-D68A-4ECF-9F1C-4875B7F3C873}"/>
                 </a:ext>
               </a:extLst>
             </p:cNvPr>
@@ -7139,7 +8797,7 @@
             <p:cNvPr id="9" name="Picture 8" descr="Chart, box and whisker chart&#10;&#10;Description automatically generated">
               <a:extLst>
                 <a:ext uri="{FF2B5EF4-FFF2-40B4-BE49-F238E27FC236}">
-                  <a16:creationId xmlns:a16="http://schemas.microsoft.com/office/drawing/2014/main" id="{417EB252-E3A3-49DC-A6C8-F1C96D525621}"/>
+                  <a16:creationId xmlns:a16="http://schemas.microsoft.com/office/drawing/2014/main" xmlns="" id="{417EB252-E3A3-49DC-A6C8-F1C96D525621}"/>
                 </a:ext>
               </a:extLst>
             </p:cNvPr>
@@ -7204,7 +8862,7 @@
           <p:cNvPr id="11" name="Picture 10" descr="Chart, box and whisker chart&#10;&#10;Description automatically generated">
             <a:extLst>
               <a:ext uri="{FF2B5EF4-FFF2-40B4-BE49-F238E27FC236}">
-                <a16:creationId xmlns:a16="http://schemas.microsoft.com/office/drawing/2014/main" id="{2773CDF8-0F66-48A8-AF14-0478D8A07CFE}"/>
+                <a16:creationId xmlns:a16="http://schemas.microsoft.com/office/drawing/2014/main" xmlns="" id="{2773CDF8-0F66-48A8-AF14-0478D8A07CFE}"/>
               </a:ext>
             </a:extLst>
           </p:cNvPr>
@@ -7239,7 +8897,7 @@
           <p:cNvPr id="12" name="Picture 11" descr="Chart, box and whisker chart&#10;&#10;Description automatically generated">
             <a:extLst>
               <a:ext uri="{FF2B5EF4-FFF2-40B4-BE49-F238E27FC236}">
-                <a16:creationId xmlns:a16="http://schemas.microsoft.com/office/drawing/2014/main" id="{E4C5F41F-FE88-4443-9557-8B77B52F3087}"/>
+                <a16:creationId xmlns:a16="http://schemas.microsoft.com/office/drawing/2014/main" xmlns="" id="{E4C5F41F-FE88-4443-9557-8B77B52F3087}"/>
               </a:ext>
             </a:extLst>
           </p:cNvPr>
@@ -7274,7 +8932,7 @@
           <p:cNvPr id="13" name="Picture 12">
             <a:extLst>
               <a:ext uri="{FF2B5EF4-FFF2-40B4-BE49-F238E27FC236}">
-                <a16:creationId xmlns:a16="http://schemas.microsoft.com/office/drawing/2014/main" id="{CDB0DFC0-A2E6-424A-9CCA-DD769147B7B5}"/>
+                <a16:creationId xmlns:a16="http://schemas.microsoft.com/office/drawing/2014/main" xmlns="" id="{CDB0DFC0-A2E6-424A-9CCA-DD769147B7B5}"/>
               </a:ext>
             </a:extLst>
           </p:cNvPr>
@@ -7304,7 +8962,7 @@
           <p:cNvPr id="14" name="Picture 13">
             <a:extLst>
               <a:ext uri="{FF2B5EF4-FFF2-40B4-BE49-F238E27FC236}">
-                <a16:creationId xmlns:a16="http://schemas.microsoft.com/office/drawing/2014/main" id="{4BF76F47-E1C2-40B3-BF76-5185093D44AC}"/>
+                <a16:creationId xmlns:a16="http://schemas.microsoft.com/office/drawing/2014/main" xmlns="" id="{4BF76F47-E1C2-40B3-BF76-5185093D44AC}"/>
               </a:ext>
             </a:extLst>
           </p:cNvPr>
@@ -7334,7 +8992,7 @@
           <p:cNvPr id="15" name="Picture 14">
             <a:extLst>
               <a:ext uri="{FF2B5EF4-FFF2-40B4-BE49-F238E27FC236}">
-                <a16:creationId xmlns:a16="http://schemas.microsoft.com/office/drawing/2014/main" id="{5C7A365A-E6FA-446C-8D12-F3CA9F07A85A}"/>
+                <a16:creationId xmlns:a16="http://schemas.microsoft.com/office/drawing/2014/main" xmlns="" id="{5C7A365A-E6FA-446C-8D12-F3CA9F07A85A}"/>
               </a:ext>
             </a:extLst>
           </p:cNvPr>
@@ -7364,7 +9022,7 @@
           <p:cNvPr id="16" name="Picture 15">
             <a:extLst>
               <a:ext uri="{FF2B5EF4-FFF2-40B4-BE49-F238E27FC236}">
-                <a16:creationId xmlns:a16="http://schemas.microsoft.com/office/drawing/2014/main" id="{1CA2191E-CCA1-4969-A77C-DF27DD9D81D2}"/>
+                <a16:creationId xmlns:a16="http://schemas.microsoft.com/office/drawing/2014/main" xmlns="" id="{1CA2191E-CCA1-4969-A77C-DF27DD9D81D2}"/>
               </a:ext>
             </a:extLst>
           </p:cNvPr>
@@ -7394,7 +9052,7 @@
           <p:cNvPr id="17" name="Picture 16">
             <a:extLst>
               <a:ext uri="{FF2B5EF4-FFF2-40B4-BE49-F238E27FC236}">
-                <a16:creationId xmlns:a16="http://schemas.microsoft.com/office/drawing/2014/main" id="{10AD3474-D5E8-47F2-93C8-DA6C7A5EBC33}"/>
+                <a16:creationId xmlns:a16="http://schemas.microsoft.com/office/drawing/2014/main" xmlns="" id="{10AD3474-D5E8-47F2-93C8-DA6C7A5EBC33}"/>
               </a:ext>
             </a:extLst>
           </p:cNvPr>
@@ -7424,7 +9082,7 @@
           <p:cNvPr id="18" name="Picture 17">
             <a:extLst>
               <a:ext uri="{FF2B5EF4-FFF2-40B4-BE49-F238E27FC236}">
-                <a16:creationId xmlns:a16="http://schemas.microsoft.com/office/drawing/2014/main" id="{ADB54E00-E596-4944-8E79-16443E76E721}"/>
+                <a16:creationId xmlns:a16="http://schemas.microsoft.com/office/drawing/2014/main" xmlns="" id="{ADB54E00-E596-4944-8E79-16443E76E721}"/>
               </a:ext>
             </a:extLst>
           </p:cNvPr>
@@ -7599,7 +9257,7 @@
           <p:cNvPr id="24" name="Group 23">
             <a:extLst>
               <a:ext uri="{FF2B5EF4-FFF2-40B4-BE49-F238E27FC236}">
-                <a16:creationId xmlns:a16="http://schemas.microsoft.com/office/drawing/2014/main" id="{3115E684-2FDA-4CEF-B9C7-741BBF0C842C}"/>
+                <a16:creationId xmlns:a16="http://schemas.microsoft.com/office/drawing/2014/main" xmlns="" id="{3115E684-2FDA-4CEF-B9C7-741BBF0C842C}"/>
               </a:ext>
             </a:extLst>
           </p:cNvPr>
@@ -7619,7 +9277,7 @@
             <p:cNvPr id="25" name="Picture 24" descr="Chart, box and whisker chart&#10;&#10;Description automatically generated">
               <a:extLst>
                 <a:ext uri="{FF2B5EF4-FFF2-40B4-BE49-F238E27FC236}">
-                  <a16:creationId xmlns:a16="http://schemas.microsoft.com/office/drawing/2014/main" id="{5C513194-726E-4C05-A159-64B232BD35F1}"/>
+                  <a16:creationId xmlns:a16="http://schemas.microsoft.com/office/drawing/2014/main" xmlns="" id="{5C513194-726E-4C05-A159-64B232BD35F1}"/>
                 </a:ext>
               </a:extLst>
             </p:cNvPr>
@@ -7654,7 +9312,7 @@
             <p:cNvPr id="26" name="Picture 25" descr="Chart, box and whisker chart&#10;&#10;Description automatically generated">
               <a:extLst>
                 <a:ext uri="{FF2B5EF4-FFF2-40B4-BE49-F238E27FC236}">
-                  <a16:creationId xmlns:a16="http://schemas.microsoft.com/office/drawing/2014/main" id="{98D73D2C-E720-4DE5-90C7-6F10D173FB57}"/>
+                  <a16:creationId xmlns:a16="http://schemas.microsoft.com/office/drawing/2014/main" xmlns="" id="{98D73D2C-E720-4DE5-90C7-6F10D173FB57}"/>
                 </a:ext>
               </a:extLst>
             </p:cNvPr>
@@ -7690,7 +9348,7 @@
           <p:cNvPr id="28" name="Straight Connector 27">
             <a:extLst>
               <a:ext uri="{FF2B5EF4-FFF2-40B4-BE49-F238E27FC236}">
-                <a16:creationId xmlns:a16="http://schemas.microsoft.com/office/drawing/2014/main" id="{F96EA76C-187B-4B1E-9587-E68E98EA9523}"/>
+                <a16:creationId xmlns:a16="http://schemas.microsoft.com/office/drawing/2014/main" xmlns="" id="{F96EA76C-187B-4B1E-9587-E68E98EA9523}"/>
               </a:ext>
             </a:extLst>
           </p:cNvPr>
@@ -7731,7 +9389,7 @@
           <p:cNvPr id="29" name="TextBox 28">
             <a:extLst>
               <a:ext uri="{FF2B5EF4-FFF2-40B4-BE49-F238E27FC236}">
-                <a16:creationId xmlns:a16="http://schemas.microsoft.com/office/drawing/2014/main" id="{6B133913-A437-4F65-952F-A288488004B5}"/>
+                <a16:creationId xmlns:a16="http://schemas.microsoft.com/office/drawing/2014/main" xmlns="" id="{6B133913-A437-4F65-952F-A288488004B5}"/>
               </a:ext>
             </a:extLst>
           </p:cNvPr>
@@ -7819,7 +9477,7 @@
           <p:cNvPr id="30" name="TextBox 29">
             <a:extLst>
               <a:ext uri="{FF2B5EF4-FFF2-40B4-BE49-F238E27FC236}">
-                <a16:creationId xmlns:a16="http://schemas.microsoft.com/office/drawing/2014/main" id="{8442063C-D6ED-4F59-B63D-D4511BE42FE3}"/>
+                <a16:creationId xmlns:a16="http://schemas.microsoft.com/office/drawing/2014/main" xmlns="" id="{8442063C-D6ED-4F59-B63D-D4511BE42FE3}"/>
               </a:ext>
             </a:extLst>
           </p:cNvPr>
@@ -7907,7 +9565,7 @@
           <p:cNvPr id="31" name="TextBox 30">
             <a:extLst>
               <a:ext uri="{FF2B5EF4-FFF2-40B4-BE49-F238E27FC236}">
-                <a16:creationId xmlns:a16="http://schemas.microsoft.com/office/drawing/2014/main" id="{2EE93834-47E6-4D7E-A7C3-483BE5B57F97}"/>
+                <a16:creationId xmlns:a16="http://schemas.microsoft.com/office/drawing/2014/main" xmlns="" id="{2EE93834-47E6-4D7E-A7C3-483BE5B57F97}"/>
               </a:ext>
             </a:extLst>
           </p:cNvPr>
@@ -7993,7 +9651,7 @@
           <p:cNvPr id="32" name="Straight Arrow Connector 31">
             <a:extLst>
               <a:ext uri="{FF2B5EF4-FFF2-40B4-BE49-F238E27FC236}">
-                <a16:creationId xmlns:a16="http://schemas.microsoft.com/office/drawing/2014/main" id="{E69297C1-62D8-406D-AD1B-9BDBD512F904}"/>
+                <a16:creationId xmlns:a16="http://schemas.microsoft.com/office/drawing/2014/main" xmlns="" id="{E69297C1-62D8-406D-AD1B-9BDBD512F904}"/>
               </a:ext>
             </a:extLst>
           </p:cNvPr>
@@ -8035,7 +9693,7 @@
           <p:cNvPr id="33" name="Straight Arrow Connector 32">
             <a:extLst>
               <a:ext uri="{FF2B5EF4-FFF2-40B4-BE49-F238E27FC236}">
-                <a16:creationId xmlns:a16="http://schemas.microsoft.com/office/drawing/2014/main" id="{561BB5E2-2014-481B-9E0D-ECEAC65B35B9}"/>
+                <a16:creationId xmlns:a16="http://schemas.microsoft.com/office/drawing/2014/main" xmlns="" id="{561BB5E2-2014-481B-9E0D-ECEAC65B35B9}"/>
               </a:ext>
             </a:extLst>
           </p:cNvPr>
@@ -8079,7 +9737,7 @@
           <p:cNvPr id="34" name="Straight Arrow Connector 33">
             <a:extLst>
               <a:ext uri="{FF2B5EF4-FFF2-40B4-BE49-F238E27FC236}">
-                <a16:creationId xmlns:a16="http://schemas.microsoft.com/office/drawing/2014/main" id="{3B0C139E-CE83-4BE7-BB47-2C8B1C2A60DC}"/>
+                <a16:creationId xmlns:a16="http://schemas.microsoft.com/office/drawing/2014/main" xmlns="" id="{3B0C139E-CE83-4BE7-BB47-2C8B1C2A60DC}"/>
               </a:ext>
             </a:extLst>
           </p:cNvPr>
@@ -8192,7 +9850,7 @@
           <p:cNvPr id="35" name="Rectangle 34">
             <a:extLst>
               <a:ext uri="{FF2B5EF4-FFF2-40B4-BE49-F238E27FC236}">
-                <a16:creationId xmlns:a16="http://schemas.microsoft.com/office/drawing/2014/main" id="{09163732-3E2A-4B7A-A191-E0F628315F3A}"/>
+                <a16:creationId xmlns:a16="http://schemas.microsoft.com/office/drawing/2014/main" xmlns="" id="{09163732-3E2A-4B7A-A191-E0F628315F3A}"/>
               </a:ext>
             </a:extLst>
           </p:cNvPr>
@@ -8248,7 +9906,7 @@
           <p:cNvPr id="36" name="Rectangle 35">
             <a:extLst>
               <a:ext uri="{FF2B5EF4-FFF2-40B4-BE49-F238E27FC236}">
-                <a16:creationId xmlns:a16="http://schemas.microsoft.com/office/drawing/2014/main" id="{AD715300-74E3-40B9-897F-F32415C21CFB}"/>
+                <a16:creationId xmlns:a16="http://schemas.microsoft.com/office/drawing/2014/main" xmlns="" id="{AD715300-74E3-40B9-897F-F32415C21CFB}"/>
               </a:ext>
             </a:extLst>
           </p:cNvPr>
@@ -8783,7 +10441,7 @@
           <p:cNvPr id="6" name="Rectangle 5">
             <a:extLst>
               <a:ext uri="{FF2B5EF4-FFF2-40B4-BE49-F238E27FC236}">
-                <a16:creationId xmlns:a16="http://schemas.microsoft.com/office/drawing/2014/main" id="{9053D898-A56E-4AE6-ACBE-C725024DC05E}"/>
+                <a16:creationId xmlns:a16="http://schemas.microsoft.com/office/drawing/2014/main" xmlns="" id="{9053D898-A56E-4AE6-ACBE-C725024DC05E}"/>
               </a:ext>
             </a:extLst>
           </p:cNvPr>
@@ -8887,7 +10545,7 @@
           <p:cNvPr id="7" name="Rectangle 6">
             <a:extLst>
               <a:ext uri="{FF2B5EF4-FFF2-40B4-BE49-F238E27FC236}">
-                <a16:creationId xmlns:a16="http://schemas.microsoft.com/office/drawing/2014/main" id="{4B5BE07C-AB80-4551-81C0-0C6EED82FE62}"/>
+                <a16:creationId xmlns:a16="http://schemas.microsoft.com/office/drawing/2014/main" xmlns="" id="{4B5BE07C-AB80-4551-81C0-0C6EED82FE62}"/>
               </a:ext>
             </a:extLst>
           </p:cNvPr>
@@ -8967,7 +10625,7 @@
           <p:cNvPr id="8" name="Rectangle 7">
             <a:extLst>
               <a:ext uri="{FF2B5EF4-FFF2-40B4-BE49-F238E27FC236}">
-                <a16:creationId xmlns:a16="http://schemas.microsoft.com/office/drawing/2014/main" id="{C4E6BD45-7D07-41ED-8FB3-89FE6FFF8427}"/>
+                <a16:creationId xmlns:a16="http://schemas.microsoft.com/office/drawing/2014/main" xmlns="" id="{C4E6BD45-7D07-41ED-8FB3-89FE6FFF8427}"/>
               </a:ext>
             </a:extLst>
           </p:cNvPr>
@@ -9035,7 +10693,7 @@
           <p:cNvPr id="3" name="Picture 10">
             <a:extLst>
               <a:ext uri="{FF2B5EF4-FFF2-40B4-BE49-F238E27FC236}">
-                <a16:creationId xmlns:a16="http://schemas.microsoft.com/office/drawing/2014/main" id="{313F9B4E-F518-4485-AFBE-203C85C7CC2A}"/>
+                <a16:creationId xmlns:a16="http://schemas.microsoft.com/office/drawing/2014/main" xmlns="" id="{313F9B4E-F518-4485-AFBE-203C85C7CC2A}"/>
               </a:ext>
             </a:extLst>
           </p:cNvPr>
@@ -9105,7 +10763,7 @@
           <p:cNvPr id="4" name="Rectangle 3">
             <a:extLst>
               <a:ext uri="{FF2B5EF4-FFF2-40B4-BE49-F238E27FC236}">
-                <a16:creationId xmlns:a16="http://schemas.microsoft.com/office/drawing/2014/main" id="{AE339B8D-EADD-456A-A0D1-7A5D80BE2642}"/>
+                <a16:creationId xmlns:a16="http://schemas.microsoft.com/office/drawing/2014/main" xmlns="" id="{AE339B8D-EADD-456A-A0D1-7A5D80BE2642}"/>
               </a:ext>
             </a:extLst>
           </p:cNvPr>
@@ -9145,7 +10803,7 @@
           <p:cNvPr id="5" name="TextBox 4">
             <a:extLst>
               <a:ext uri="{FF2B5EF4-FFF2-40B4-BE49-F238E27FC236}">
-                <a16:creationId xmlns:a16="http://schemas.microsoft.com/office/drawing/2014/main" id="{9C26F37F-8E28-4DF1-B8A3-A009E7DEBBE5}"/>
+                <a16:creationId xmlns:a16="http://schemas.microsoft.com/office/drawing/2014/main" xmlns="" id="{9C26F37F-8E28-4DF1-B8A3-A009E7DEBBE5}"/>
               </a:ext>
             </a:extLst>
           </p:cNvPr>
@@ -9180,7 +10838,7 @@
           <p:cNvPr id="6" name="TextBox 5">
             <a:extLst>
               <a:ext uri="{FF2B5EF4-FFF2-40B4-BE49-F238E27FC236}">
-                <a16:creationId xmlns:a16="http://schemas.microsoft.com/office/drawing/2014/main" id="{9AB10A21-A233-4262-A4CB-7F342D3E5C34}"/>
+                <a16:creationId xmlns:a16="http://schemas.microsoft.com/office/drawing/2014/main" xmlns="" id="{9AB10A21-A233-4262-A4CB-7F342D3E5C34}"/>
               </a:ext>
             </a:extLst>
           </p:cNvPr>
@@ -9215,7 +10873,7 @@
           <p:cNvPr id="7" name="TextBox 6">
             <a:extLst>
               <a:ext uri="{FF2B5EF4-FFF2-40B4-BE49-F238E27FC236}">
-                <a16:creationId xmlns:a16="http://schemas.microsoft.com/office/drawing/2014/main" id="{A0C1B235-7BE9-4F46-A930-140419BDEC59}"/>
+                <a16:creationId xmlns:a16="http://schemas.microsoft.com/office/drawing/2014/main" xmlns="" id="{A0C1B235-7BE9-4F46-A930-140419BDEC59}"/>
               </a:ext>
             </a:extLst>
           </p:cNvPr>
@@ -9254,7 +10912,7 @@
           <p:cNvPr id="8" name="Rectangle 7">
             <a:extLst>
               <a:ext uri="{FF2B5EF4-FFF2-40B4-BE49-F238E27FC236}">
-                <a16:creationId xmlns:a16="http://schemas.microsoft.com/office/drawing/2014/main" id="{A53A936D-7E83-44CC-A145-85F5DC449921}"/>
+                <a16:creationId xmlns:a16="http://schemas.microsoft.com/office/drawing/2014/main" xmlns="" id="{A53A936D-7E83-44CC-A145-85F5DC449921}"/>
               </a:ext>
             </a:extLst>
           </p:cNvPr>
@@ -9360,7 +11018,7 @@
           <p:cNvPr id="9" name="Rectangle 8">
             <a:extLst>
               <a:ext uri="{FF2B5EF4-FFF2-40B4-BE49-F238E27FC236}">
-                <a16:creationId xmlns:a16="http://schemas.microsoft.com/office/drawing/2014/main" id="{EF931514-6ACE-4794-87C2-C933B57C4529}"/>
+                <a16:creationId xmlns:a16="http://schemas.microsoft.com/office/drawing/2014/main" xmlns="" id="{EF931514-6ACE-4794-87C2-C933B57C4529}"/>
               </a:ext>
             </a:extLst>
           </p:cNvPr>
@@ -9416,7 +11074,7 @@
           <p:cNvPr id="10" name="Rectangle 9">
             <a:extLst>
               <a:ext uri="{FF2B5EF4-FFF2-40B4-BE49-F238E27FC236}">
-                <a16:creationId xmlns:a16="http://schemas.microsoft.com/office/drawing/2014/main" id="{85F40CF8-59DF-4B2C-980F-6A294F21F153}"/>
+                <a16:creationId xmlns:a16="http://schemas.microsoft.com/office/drawing/2014/main" xmlns="" id="{85F40CF8-59DF-4B2C-980F-6A294F21F153}"/>
               </a:ext>
             </a:extLst>
           </p:cNvPr>
@@ -9501,7 +11159,7 @@
           <p:cNvPr id="2" name="Rectangle 1">
             <a:extLst>
               <a:ext uri="{FF2B5EF4-FFF2-40B4-BE49-F238E27FC236}">
-                <a16:creationId xmlns:a16="http://schemas.microsoft.com/office/drawing/2014/main" id="{C078E5E2-FA2E-49FC-93B5-58716B348FAA}"/>
+                <a16:creationId xmlns:a16="http://schemas.microsoft.com/office/drawing/2014/main" xmlns="" id="{C078E5E2-FA2E-49FC-93B5-58716B348FAA}"/>
               </a:ext>
             </a:extLst>
           </p:cNvPr>
@@ -9568,7 +11226,7 @@
           <p:cNvPr id="3" name="Rectangle 2">
             <a:extLst>
               <a:ext uri="{FF2B5EF4-FFF2-40B4-BE49-F238E27FC236}">
-                <a16:creationId xmlns:a16="http://schemas.microsoft.com/office/drawing/2014/main" id="{DDC772E5-7DB7-43DD-8C34-37851083C848}"/>
+                <a16:creationId xmlns:a16="http://schemas.microsoft.com/office/drawing/2014/main" xmlns="" id="{DDC772E5-7DB7-43DD-8C34-37851083C848}"/>
               </a:ext>
             </a:extLst>
           </p:cNvPr>
@@ -9788,7 +11446,7 @@
           <p:cNvPr id="4" name="Rectangle 3">
             <a:extLst>
               <a:ext uri="{FF2B5EF4-FFF2-40B4-BE49-F238E27FC236}">
-                <a16:creationId xmlns:a16="http://schemas.microsoft.com/office/drawing/2014/main" id="{42EA6283-A584-48F1-9D40-5F11CE03818A}"/>
+                <a16:creationId xmlns:a16="http://schemas.microsoft.com/office/drawing/2014/main" xmlns="" id="{42EA6283-A584-48F1-9D40-5F11CE03818A}"/>
               </a:ext>
             </a:extLst>
           </p:cNvPr>
@@ -9894,7 +11552,7 @@
           <p:cNvPr id="5" name="Rectangle 4">
             <a:extLst>
               <a:ext uri="{FF2B5EF4-FFF2-40B4-BE49-F238E27FC236}">
-                <a16:creationId xmlns:a16="http://schemas.microsoft.com/office/drawing/2014/main" id="{BB52A812-811F-485B-AE8D-0740D96AF123}"/>
+                <a16:creationId xmlns:a16="http://schemas.microsoft.com/office/drawing/2014/main" xmlns="" id="{BB52A812-811F-485B-AE8D-0740D96AF123}"/>
               </a:ext>
             </a:extLst>
           </p:cNvPr>
@@ -9989,7 +11647,7 @@
           <p:cNvPr id="2" name="Rectangle 1">
             <a:extLst>
               <a:ext uri="{FF2B5EF4-FFF2-40B4-BE49-F238E27FC236}">
-                <a16:creationId xmlns:a16="http://schemas.microsoft.com/office/drawing/2014/main" id="{C4F20D22-9641-4957-B870-9790A8A83F1E}"/>
+                <a16:creationId xmlns:a16="http://schemas.microsoft.com/office/drawing/2014/main" xmlns="" id="{C4F20D22-9641-4957-B870-9790A8A83F1E}"/>
               </a:ext>
             </a:extLst>
           </p:cNvPr>
@@ -10112,7 +11770,7 @@
           <p:cNvPr id="3" name="Group 2">
             <a:extLst>
               <a:ext uri="{FF2B5EF4-FFF2-40B4-BE49-F238E27FC236}">
-                <a16:creationId xmlns:a16="http://schemas.microsoft.com/office/drawing/2014/main" id="{0D433B13-943D-4141-ABCB-C826AD506FDB}"/>
+                <a16:creationId xmlns:a16="http://schemas.microsoft.com/office/drawing/2014/main" xmlns="" id="{0D433B13-943D-4141-ABCB-C826AD506FDB}"/>
               </a:ext>
             </a:extLst>
           </p:cNvPr>
@@ -10132,7 +11790,7 @@
             <p:cNvPr id="4" name="Picture 8">
               <a:extLst>
                 <a:ext uri="{FF2B5EF4-FFF2-40B4-BE49-F238E27FC236}">
-                  <a16:creationId xmlns:a16="http://schemas.microsoft.com/office/drawing/2014/main" id="{41B99EB1-5002-4215-B700-2ADDFD28C104}"/>
+                  <a16:creationId xmlns:a16="http://schemas.microsoft.com/office/drawing/2014/main" xmlns="" id="{41B99EB1-5002-4215-B700-2ADDFD28C104}"/>
                 </a:ext>
               </a:extLst>
             </p:cNvPr>
@@ -10200,7 +11858,7 @@
             <p:cNvPr id="5" name="Picture 9">
               <a:extLst>
                 <a:ext uri="{FF2B5EF4-FFF2-40B4-BE49-F238E27FC236}">
-                  <a16:creationId xmlns:a16="http://schemas.microsoft.com/office/drawing/2014/main" id="{4163DB8C-1DDB-4B51-91EB-0C3C03FEF88C}"/>
+                  <a16:creationId xmlns:a16="http://schemas.microsoft.com/office/drawing/2014/main" xmlns="" id="{4163DB8C-1DDB-4B51-91EB-0C3C03FEF88C}"/>
                 </a:ext>
               </a:extLst>
             </p:cNvPr>
@@ -10268,7 +11926,7 @@
             <p:cNvPr id="6" name="Picture 10">
               <a:extLst>
                 <a:ext uri="{FF2B5EF4-FFF2-40B4-BE49-F238E27FC236}">
-                  <a16:creationId xmlns:a16="http://schemas.microsoft.com/office/drawing/2014/main" id="{3009D2B3-F8EA-4ADD-ADB8-BD601F6CA97F}"/>
+                  <a16:creationId xmlns:a16="http://schemas.microsoft.com/office/drawing/2014/main" xmlns="" id="{3009D2B3-F8EA-4ADD-ADB8-BD601F6CA97F}"/>
                 </a:ext>
               </a:extLst>
             </p:cNvPr>
@@ -10336,7 +11994,7 @@
             <p:cNvPr id="7" name="Picture 7">
               <a:extLst>
                 <a:ext uri="{FF2B5EF4-FFF2-40B4-BE49-F238E27FC236}">
-                  <a16:creationId xmlns:a16="http://schemas.microsoft.com/office/drawing/2014/main" id="{0DF85E9F-50E1-4E78-A182-E6FFB0501761}"/>
+                  <a16:creationId xmlns:a16="http://schemas.microsoft.com/office/drawing/2014/main" xmlns="" id="{0DF85E9F-50E1-4E78-A182-E6FFB0501761}"/>
                 </a:ext>
               </a:extLst>
             </p:cNvPr>
@@ -10404,7 +12062,7 @@
             <p:cNvPr id="8" name="Picture 7">
               <a:extLst>
                 <a:ext uri="{FF2B5EF4-FFF2-40B4-BE49-F238E27FC236}">
-                  <a16:creationId xmlns:a16="http://schemas.microsoft.com/office/drawing/2014/main" id="{4131E7D4-B5A9-43A9-8F30-42E73932B9CC}"/>
+                  <a16:creationId xmlns:a16="http://schemas.microsoft.com/office/drawing/2014/main" xmlns="" id="{4131E7D4-B5A9-43A9-8F30-42E73932B9CC}"/>
                 </a:ext>
               </a:extLst>
             </p:cNvPr>
@@ -10472,7 +12130,7 @@
             <p:cNvPr id="9" name="Picture 8">
               <a:extLst>
                 <a:ext uri="{FF2B5EF4-FFF2-40B4-BE49-F238E27FC236}">
-                  <a16:creationId xmlns:a16="http://schemas.microsoft.com/office/drawing/2014/main" id="{CEB7B261-90FF-4D34-AEB4-17BD36733507}"/>
+                  <a16:creationId xmlns:a16="http://schemas.microsoft.com/office/drawing/2014/main" xmlns="" id="{CEB7B261-90FF-4D34-AEB4-17BD36733507}"/>
                 </a:ext>
               </a:extLst>
             </p:cNvPr>
@@ -10482,7 +12140,7 @@
             <p:nvPr/>
           </p:nvPicPr>
           <p:blipFill rotWithShape="1">
-            <a:blip r:embed="rId2" cstate="print">
+            <a:blip r:embed="rId6" cstate="print">
               <a:extLst>
                 <a:ext uri="{28A0092B-C50C-407E-A947-70E740481C1C}">
                   <a14:useLocalDpi xmlns:a14="http://schemas.microsoft.com/office/drawing/2010/main" val="0"/>
@@ -10540,7 +12198,7 @@
             <p:cNvPr id="10" name="Picture 9">
               <a:extLst>
                 <a:ext uri="{FF2B5EF4-FFF2-40B4-BE49-F238E27FC236}">
-                  <a16:creationId xmlns:a16="http://schemas.microsoft.com/office/drawing/2014/main" id="{50343FE9-6D5C-40E8-ADDE-7E4EE57C2AD8}"/>
+                  <a16:creationId xmlns:a16="http://schemas.microsoft.com/office/drawing/2014/main" xmlns="" id="{50343FE9-6D5C-40E8-ADDE-7E4EE57C2AD8}"/>
                 </a:ext>
               </a:extLst>
             </p:cNvPr>
@@ -10608,7 +12266,7 @@
             <p:cNvPr id="11" name="Picture 10">
               <a:extLst>
                 <a:ext uri="{FF2B5EF4-FFF2-40B4-BE49-F238E27FC236}">
-                  <a16:creationId xmlns:a16="http://schemas.microsoft.com/office/drawing/2014/main" id="{33D7DA18-E1C4-4DFC-8606-D41FD4EF8B1F}"/>
+                  <a16:creationId xmlns:a16="http://schemas.microsoft.com/office/drawing/2014/main" xmlns="" id="{33D7DA18-E1C4-4DFC-8606-D41FD4EF8B1F}"/>
                 </a:ext>
               </a:extLst>
             </p:cNvPr>
@@ -10677,7 +12335,7 @@
           <p:cNvPr id="12" name="Picture 13">
             <a:extLst>
               <a:ext uri="{FF2B5EF4-FFF2-40B4-BE49-F238E27FC236}">
-                <a16:creationId xmlns:a16="http://schemas.microsoft.com/office/drawing/2014/main" id="{733A3C66-DEB0-4CE9-8295-370B03CAF74F}"/>
+                <a16:creationId xmlns:a16="http://schemas.microsoft.com/office/drawing/2014/main" xmlns="" id="{733A3C66-DEB0-4CE9-8295-370B03CAF74F}"/>
               </a:ext>
             </a:extLst>
           </p:cNvPr>
@@ -10687,7 +12345,7 @@
           <p:nvPr/>
         </p:nvPicPr>
         <p:blipFill rotWithShape="1">
-          <a:blip r:embed="rId6">
+          <a:blip r:embed="rId7">
             <a:extLst>
               <a:ext uri="{28A0092B-C50C-407E-A947-70E740481C1C}">
                 <a14:useLocalDpi xmlns:a14="http://schemas.microsoft.com/office/drawing/2010/main" val="0"/>
@@ -10745,7 +12403,7 @@
           <p:cNvPr id="13" name="Picture 2">
             <a:extLst>
               <a:ext uri="{FF2B5EF4-FFF2-40B4-BE49-F238E27FC236}">
-                <a16:creationId xmlns:a16="http://schemas.microsoft.com/office/drawing/2014/main" id="{1CB240E6-107B-4241-8E42-8F615C8775AD}"/>
+                <a16:creationId xmlns:a16="http://schemas.microsoft.com/office/drawing/2014/main" xmlns="" id="{1CB240E6-107B-4241-8E42-8F615C8775AD}"/>
               </a:ext>
             </a:extLst>
           </p:cNvPr>
@@ -10755,7 +12413,7 @@
           <p:nvPr/>
         </p:nvPicPr>
         <p:blipFill>
-          <a:blip r:embed="rId7" cstate="print">
+          <a:blip r:embed="rId8" cstate="print">
             <a:extLst>
               <a:ext uri="{28A0092B-C50C-407E-A947-70E740481C1C}">
                 <a14:useLocalDpi xmlns:a14="http://schemas.microsoft.com/office/drawing/2010/main" val="0"/>
@@ -10815,7 +12473,7 @@
           <p:cNvPr id="14" name="Picture 3">
             <a:extLst>
               <a:ext uri="{FF2B5EF4-FFF2-40B4-BE49-F238E27FC236}">
-                <a16:creationId xmlns:a16="http://schemas.microsoft.com/office/drawing/2014/main" id="{57E04A06-7665-49BD-BE8D-D79ADB7BC501}"/>
+                <a16:creationId xmlns:a16="http://schemas.microsoft.com/office/drawing/2014/main" xmlns="" id="{57E04A06-7665-49BD-BE8D-D79ADB7BC501}"/>
               </a:ext>
             </a:extLst>
           </p:cNvPr>
@@ -10825,7 +12483,7 @@
           <p:nvPr/>
         </p:nvPicPr>
         <p:blipFill>
-          <a:blip r:embed="rId8" cstate="print">
+          <a:blip r:embed="rId9" cstate="print">
             <a:extLst>
               <a:ext uri="{28A0092B-C50C-407E-A947-70E740481C1C}">
                 <a14:useLocalDpi xmlns:a14="http://schemas.microsoft.com/office/drawing/2010/main" val="0"/>
@@ -10885,7 +12543,7 @@
           <p:cNvPr id="15" name="Picture 4">
             <a:extLst>
               <a:ext uri="{FF2B5EF4-FFF2-40B4-BE49-F238E27FC236}">
-                <a16:creationId xmlns:a16="http://schemas.microsoft.com/office/drawing/2014/main" id="{377F7B58-2511-4216-9AE0-070451721804}"/>
+                <a16:creationId xmlns:a16="http://schemas.microsoft.com/office/drawing/2014/main" xmlns="" id="{377F7B58-2511-4216-9AE0-070451721804}"/>
               </a:ext>
             </a:extLst>
           </p:cNvPr>
@@ -10895,7 +12553,7 @@
           <p:nvPr/>
         </p:nvPicPr>
         <p:blipFill>
-          <a:blip r:embed="rId9" cstate="print">
+          <a:blip r:embed="rId10" cstate="print">
             <a:extLst>
               <a:ext uri="{28A0092B-C50C-407E-A947-70E740481C1C}">
                 <a14:useLocalDpi xmlns:a14="http://schemas.microsoft.com/office/drawing/2010/main" val="0"/>
@@ -10955,7 +12613,7 @@
           <p:cNvPr id="16" name="Picture 5">
             <a:extLst>
               <a:ext uri="{FF2B5EF4-FFF2-40B4-BE49-F238E27FC236}">
-                <a16:creationId xmlns:a16="http://schemas.microsoft.com/office/drawing/2014/main" id="{94890D34-3F54-4C8F-B12D-30592DC249A6}"/>
+                <a16:creationId xmlns:a16="http://schemas.microsoft.com/office/drawing/2014/main" xmlns="" id="{94890D34-3F54-4C8F-B12D-30592DC249A6}"/>
               </a:ext>
             </a:extLst>
           </p:cNvPr>
@@ -10965,7 +12623,7 @@
           <p:nvPr/>
         </p:nvPicPr>
         <p:blipFill>
-          <a:blip r:embed="rId10" cstate="print">
+          <a:blip r:embed="rId11" cstate="print">
             <a:extLst>
               <a:ext uri="{28A0092B-C50C-407E-A947-70E740481C1C}">
                 <a14:useLocalDpi xmlns:a14="http://schemas.microsoft.com/office/drawing/2010/main" val="0"/>
@@ -11025,7 +12683,7 @@
           <p:cNvPr id="17" name="Picture 9">
             <a:extLst>
               <a:ext uri="{FF2B5EF4-FFF2-40B4-BE49-F238E27FC236}">
-                <a16:creationId xmlns:a16="http://schemas.microsoft.com/office/drawing/2014/main" id="{02A50BA3-A667-4A80-B6F8-E906F40E3788}"/>
+                <a16:creationId xmlns:a16="http://schemas.microsoft.com/office/drawing/2014/main" xmlns="" id="{02A50BA3-A667-4A80-B6F8-E906F40E3788}"/>
               </a:ext>
             </a:extLst>
           </p:cNvPr>
@@ -11035,7 +12693,7 @@
           <p:nvPr/>
         </p:nvPicPr>
         <p:blipFill>
-          <a:blip r:embed="rId11">
+          <a:blip r:embed="rId12">
             <a:extLst>
               <a:ext uri="{28A0092B-C50C-407E-A947-70E740481C1C}">
                 <a14:useLocalDpi xmlns:a14="http://schemas.microsoft.com/office/drawing/2010/main" val="0"/>
@@ -11095,7 +12753,7 @@
           <p:cNvPr id="18" name="TextBox 17">
             <a:extLst>
               <a:ext uri="{FF2B5EF4-FFF2-40B4-BE49-F238E27FC236}">
-                <a16:creationId xmlns:a16="http://schemas.microsoft.com/office/drawing/2014/main" id="{960F3A51-7513-432D-80ED-BD35241554AF}"/>
+                <a16:creationId xmlns:a16="http://schemas.microsoft.com/office/drawing/2014/main" xmlns="" id="{960F3A51-7513-432D-80ED-BD35241554AF}"/>
               </a:ext>
             </a:extLst>
           </p:cNvPr>
@@ -11142,7 +12800,7 @@
           <p:cNvPr id="19" name="Rectangle 18">
             <a:extLst>
               <a:ext uri="{FF2B5EF4-FFF2-40B4-BE49-F238E27FC236}">
-                <a16:creationId xmlns:a16="http://schemas.microsoft.com/office/drawing/2014/main" id="{3367921A-80CA-4DC2-B38E-E606DA4F787F}"/>
+                <a16:creationId xmlns:a16="http://schemas.microsoft.com/office/drawing/2014/main" xmlns="" id="{3367921A-80CA-4DC2-B38E-E606DA4F787F}"/>
               </a:ext>
             </a:extLst>
           </p:cNvPr>
@@ -11196,7 +12854,7 @@
           <p:cNvPr id="20" name="Rectangle 19">
             <a:extLst>
               <a:ext uri="{FF2B5EF4-FFF2-40B4-BE49-F238E27FC236}">
-                <a16:creationId xmlns:a16="http://schemas.microsoft.com/office/drawing/2014/main" id="{8799149F-09C1-47CF-AE6F-20A5C14D0B00}"/>
+                <a16:creationId xmlns:a16="http://schemas.microsoft.com/office/drawing/2014/main" xmlns="" id="{8799149F-09C1-47CF-AE6F-20A5C14D0B00}"/>
               </a:ext>
             </a:extLst>
           </p:cNvPr>
@@ -11271,7 +12929,7 @@
           <p:cNvPr id="21" name="Picture 20">
             <a:extLst>
               <a:ext uri="{FF2B5EF4-FFF2-40B4-BE49-F238E27FC236}">
-                <a16:creationId xmlns:a16="http://schemas.microsoft.com/office/drawing/2014/main" id="{F9577EAF-3232-478F-8B4A-A1F351E7CBD9}"/>
+                <a16:creationId xmlns:a16="http://schemas.microsoft.com/office/drawing/2014/main" xmlns="" id="{F9577EAF-3232-478F-8B4A-A1F351E7CBD9}"/>
               </a:ext>
             </a:extLst>
           </p:cNvPr>
@@ -11281,7 +12939,7 @@
           <p:nvPr/>
         </p:nvPicPr>
         <p:blipFill rotWithShape="1">
-          <a:blip r:embed="rId12">
+          <a:blip r:embed="rId13">
             <a:extLst>
               <a:ext uri="{28A0092B-C50C-407E-A947-70E740481C1C}">
                 <a14:useLocalDpi xmlns:a14="http://schemas.microsoft.com/office/drawing/2010/main" val="0"/>
@@ -11616,7 +13274,7 @@
           <p:cNvPr id="8" name="Rectangle 7">
             <a:extLst>
               <a:ext uri="{FF2B5EF4-FFF2-40B4-BE49-F238E27FC236}">
-                <a16:creationId xmlns:a16="http://schemas.microsoft.com/office/drawing/2014/main" id="{6835F6AA-79A3-43F0-BD7C-D6D0EA0972C4}"/>
+                <a16:creationId xmlns:a16="http://schemas.microsoft.com/office/drawing/2014/main" xmlns="" id="{6835F6AA-79A3-43F0-BD7C-D6D0EA0972C4}"/>
               </a:ext>
             </a:extLst>
           </p:cNvPr>
@@ -11695,7 +13353,7 @@
           <p:cNvPr id="2" name="Picture 6">
             <a:extLst>
               <a:ext uri="{FF2B5EF4-FFF2-40B4-BE49-F238E27FC236}">
-                <a16:creationId xmlns:a16="http://schemas.microsoft.com/office/drawing/2014/main" id="{50B119AF-C060-49CA-AF3D-5A557A1CAA20}"/>
+                <a16:creationId xmlns:a16="http://schemas.microsoft.com/office/drawing/2014/main" xmlns="" id="{50B119AF-C060-49CA-AF3D-5A557A1CAA20}"/>
               </a:ext>
             </a:extLst>
           </p:cNvPr>
@@ -11765,7 +13423,7 @@
           <p:cNvPr id="3" name="Picture 7">
             <a:extLst>
               <a:ext uri="{FF2B5EF4-FFF2-40B4-BE49-F238E27FC236}">
-                <a16:creationId xmlns:a16="http://schemas.microsoft.com/office/drawing/2014/main" id="{9FDA4E43-CF94-4ACC-9820-DFCC3A82A558}"/>
+                <a16:creationId xmlns:a16="http://schemas.microsoft.com/office/drawing/2014/main" xmlns="" id="{9FDA4E43-CF94-4ACC-9820-DFCC3A82A558}"/>
               </a:ext>
             </a:extLst>
           </p:cNvPr>
@@ -11835,7 +13493,7 @@
           <p:cNvPr id="4" name="Rectangle 3">
             <a:extLst>
               <a:ext uri="{FF2B5EF4-FFF2-40B4-BE49-F238E27FC236}">
-                <a16:creationId xmlns:a16="http://schemas.microsoft.com/office/drawing/2014/main" id="{2A95DFFB-8B9F-4C51-9C55-A18CC883C675}"/>
+                <a16:creationId xmlns:a16="http://schemas.microsoft.com/office/drawing/2014/main" xmlns="" id="{2A95DFFB-8B9F-4C51-9C55-A18CC883C675}"/>
               </a:ext>
             </a:extLst>
           </p:cNvPr>
@@ -11895,7 +13553,7 @@
           <p:cNvPr id="5" name="Rectangle 4">
             <a:extLst>
               <a:ext uri="{FF2B5EF4-FFF2-40B4-BE49-F238E27FC236}">
-                <a16:creationId xmlns:a16="http://schemas.microsoft.com/office/drawing/2014/main" id="{063B25D3-85EC-4E4E-BF07-1045DEFF267B}"/>
+                <a16:creationId xmlns:a16="http://schemas.microsoft.com/office/drawing/2014/main" xmlns="" id="{063B25D3-85EC-4E4E-BF07-1045DEFF267B}"/>
               </a:ext>
             </a:extLst>
           </p:cNvPr>
@@ -12023,7 +13681,7 @@
     </a:clrScheme>
     <a:fontScheme name="Office">
       <a:majorFont>
-        <a:latin typeface="Calibri Light" panose="020F0302020204030204"/>
+        <a:latin typeface="Calibri Light"/>
         <a:ea typeface=""/>
         <a:cs typeface=""/>
         <a:font script="Jpan" typeface="游ゴシック Light"/>
@@ -12075,7 +13733,7 @@
         <a:font script="Tfng" typeface="Ebrima"/>
       </a:majorFont>
       <a:minorFont>
-        <a:latin typeface="Calibri" panose="020F0502020204030204"/>
+        <a:latin typeface="Calibri"/>
         <a:ea typeface=""/>
         <a:cs typeface=""/>
         <a:font script="Jpan" typeface="游ゴシック"/>
@@ -12269,7 +13927,7 @@
   <a:extraClrSchemeLst/>
   <a:extLst>
     <a:ext uri="{05A4C25C-085E-4340-85A3-A5531E510DB2}">
-      <thm15:themeFamily xmlns:thm15="http://schemas.microsoft.com/office/thememl/2012/main" name="Office Theme" id="{62F939B6-93AF-4DB8-9C6B-D6C7DFDC589F}" vid="{4A3C46E8-61CC-4603-A589-7422A47A8E4A}"/>
+      <thm15:themeFamily xmlns:thm15="http://schemas.microsoft.com/office/thememl/2012/main" xmlns="" name="Office Theme" id="{62F939B6-93AF-4DB8-9C6B-D6C7DFDC589F}" vid="{4A3C46E8-61CC-4603-A589-7422A47A8E4A}"/>
     </a:ext>
   </a:extLst>
 </a:theme>
@@ -12318,7 +13976,7 @@
     </a:clrScheme>
     <a:fontScheme name="Office">
       <a:majorFont>
-        <a:latin typeface="Calibri Light" panose="020F0302020204030204"/>
+        <a:latin typeface="Calibri Light"/>
         <a:ea typeface=""/>
         <a:cs typeface=""/>
         <a:font script="Jpan" typeface="游ゴシック Light"/>
@@ -12370,7 +14028,7 @@
         <a:font script="Tfng" typeface="Ebrima"/>
       </a:majorFont>
       <a:minorFont>
-        <a:latin typeface="Calibri" panose="020F0502020204030204"/>
+        <a:latin typeface="Calibri"/>
         <a:ea typeface=""/>
         <a:cs typeface=""/>
         <a:font script="Jpan" typeface="游ゴシック"/>
@@ -12564,24 +14222,26 @@
   <a:extraClrSchemeLst/>
   <a:extLst>
     <a:ext uri="{05A4C25C-085E-4340-85A3-A5531E510DB2}">
-      <thm15:themeFamily xmlns:thm15="http://schemas.microsoft.com/office/thememl/2012/main" name="Office Theme" id="{62F939B6-93AF-4DB8-9C6B-D6C7DFDC589F}" vid="{4A3C46E8-61CC-4603-A589-7422A47A8E4A}"/>
+      <thm15:themeFamily xmlns:thm15="http://schemas.microsoft.com/office/thememl/2012/main" xmlns="" name="Office Theme" id="{62F939B6-93AF-4DB8-9C6B-D6C7DFDC589F}" vid="{4A3C46E8-61CC-4603-A589-7422A47A8E4A}"/>
     </a:ext>
   </a:extLst>
 </a:theme>
 </file>
 
 <file path=customXml/item1.xml><?xml version="1.0" encoding="utf-8"?>
-<?mso-contentType ?>
-<FormTemplates xmlns="http://schemas.microsoft.com/sharepoint/v3/contenttype/forms">
-  <Display>DocumentLibraryForm</Display>
-  <Edit>DocumentLibraryForm</Edit>
-  <New>DocumentLibraryForm</New>
-</FormTemplates>
+<p:properties xmlns:p="http://schemas.microsoft.com/office/2006/metadata/properties" xmlns:xsi="http://www.w3.org/2001/XMLSchema-instance" xmlns:pc="http://schemas.microsoft.com/office/infopath/2007/PartnerControls">
+  <documentManagement>
+    <TaxCatchAll xmlns="814e9f69-708b-42d1-b772-2ece2c1b39da" xsi:nil="true"/>
+    <lcf76f155ced4ddcb4097134ff3c332f xmlns="c547a812-ac17-4a6a-8bd9-a75acfa31021">
+      <Terms xmlns="http://schemas.microsoft.com/office/infopath/2007/PartnerControls"/>
+    </lcf76f155ced4ddcb4097134ff3c332f>
+  </documentManagement>
+</p:properties>
 </file>
 
 <file path=customXml/item2.xml><?xml version="1.0" encoding="utf-8"?>
-<ct:contentTypeSchema xmlns:ct="http://schemas.microsoft.com/office/2006/metadata/contentType" xmlns:ma="http://schemas.microsoft.com/office/2006/metadata/properties/metaAttributes" ct:_="" ma:_="" ma:contentTypeName="Document" ma:contentTypeID="0x0101000E412483FFC35649B797435CD3F0398D" ma:contentTypeVersion="16" ma:contentTypeDescription="Een nieuw document maken." ma:contentTypeScope="" ma:versionID="1c2232b652a71ca10ebaf5bc6edef6f5">
-  <xsd:schema xmlns:xsd="http://www.w3.org/2001/XMLSchema" xmlns:xs="http://www.w3.org/2001/XMLSchema" xmlns:p="http://schemas.microsoft.com/office/2006/metadata/properties" xmlns:ns2="c547a812-ac17-4a6a-8bd9-a75acfa31021" xmlns:ns3="814e9f69-708b-42d1-b772-2ece2c1b39da" targetNamespace="http://schemas.microsoft.com/office/2006/metadata/properties" ma:root="true" ma:fieldsID="3ec2858cdacf539a2f54720df29b1216" ns2:_="" ns3:_="">
+<ct:contentTypeSchema xmlns:ct="http://schemas.microsoft.com/office/2006/metadata/contentType" xmlns:ma="http://schemas.microsoft.com/office/2006/metadata/properties/metaAttributes" ct:_="" ma:_="" ma:contentTypeName="Document" ma:contentTypeID="0x0101000E412483FFC35649B797435CD3F0398D" ma:contentTypeVersion="16" ma:contentTypeDescription="Create a new document." ma:contentTypeScope="" ma:versionID="d1ef06f25ed612914346073c669f3d57">
+  <xsd:schema xmlns:xsd="http://www.w3.org/2001/XMLSchema" xmlns:xs="http://www.w3.org/2001/XMLSchema" xmlns:p="http://schemas.microsoft.com/office/2006/metadata/properties" xmlns:ns2="c547a812-ac17-4a6a-8bd9-a75acfa31021" xmlns:ns3="814e9f69-708b-42d1-b772-2ece2c1b39da" targetNamespace="http://schemas.microsoft.com/office/2006/metadata/properties" ma:root="true" ma:fieldsID="8df51d0651151a8208a9da934d0771e3" ns2:_="" ns3:_="">
     <xsd:import namespace="c547a812-ac17-4a6a-8bd9-a75acfa31021"/>
     <xsd:import namespace="814e9f69-708b-42d1-b772-2ece2c1b39da"/>
     <xsd:element name="properties">
@@ -12674,7 +14334,7 @@
         <xsd:restriction base="dms:Unknown"/>
       </xsd:simpleType>
     </xsd:element>
-    <xsd:element name="lcf76f155ced4ddcb4097134ff3c332f" ma:index="22" nillable="true" ma:taxonomy="true" ma:internalName="lcf76f155ced4ddcb4097134ff3c332f" ma:taxonomyFieldName="MediaServiceImageTags" ma:displayName="Afbeeldingtags" ma:readOnly="false" ma:fieldId="{5cf76f15-5ced-4ddc-b409-7134ff3c332f}" ma:taxonomyMulti="true" ma:sspId="5ec99919-4982-4388-8a64-83a11d2ca210" ma:termSetId="09814cd3-568e-fe90-9814-8d621ff8fb84" ma:anchorId="fba54fb3-c3e1-fe81-a776-ca4b69148c4d" ma:open="true" ma:isKeyword="false">
+    <xsd:element name="lcf76f155ced4ddcb4097134ff3c332f" ma:index="22" nillable="true" ma:taxonomy="true" ma:internalName="lcf76f155ced4ddcb4097134ff3c332f" ma:taxonomyFieldName="MediaServiceImageTags" ma:displayName="Image Tags" ma:readOnly="false" ma:fieldId="{5cf76f15-5ced-4ddc-b409-7134ff3c332f}" ma:taxonomyMulti="true" ma:sspId="5ec99919-4982-4388-8a64-83a11d2ca210" ma:termSetId="09814cd3-568e-fe90-9814-8d621ff8fb84" ma:anchorId="fba54fb3-c3e1-fe81-a776-ca4b69148c4d" ma:open="true" ma:isKeyword="false">
       <xsd:complexType>
         <xsd:sequence>
           <xsd:element ref="pc:Terms" minOccurs="0" maxOccurs="1"/>
@@ -12685,7 +14345,7 @@
   <xsd:schema xmlns:xsd="http://www.w3.org/2001/XMLSchema" xmlns:xs="http://www.w3.org/2001/XMLSchema" xmlns:dms="http://schemas.microsoft.com/office/2006/documentManagement/types" xmlns:pc="http://schemas.microsoft.com/office/infopath/2007/PartnerControls" targetNamespace="814e9f69-708b-42d1-b772-2ece2c1b39da" elementFormDefault="qualified">
     <xsd:import namespace="http://schemas.microsoft.com/office/2006/documentManagement/types"/>
     <xsd:import namespace="http://schemas.microsoft.com/office/infopath/2007/PartnerControls"/>
-    <xsd:element name="SharedWithUsers" ma:index="17" nillable="true" ma:displayName="Gedeeld met" ma:internalName="SharedWithUsers" ma:readOnly="true">
+    <xsd:element name="SharedWithUsers" ma:index="17" nillable="true" ma:displayName="Shared With" ma:internalName="SharedWithUsers" ma:readOnly="true">
       <xsd:complexType>
         <xsd:complexContent>
           <xsd:extension base="dms:UserMulti">
@@ -12704,7 +14364,7 @@
         </xsd:complexContent>
       </xsd:complexType>
     </xsd:element>
-    <xsd:element name="SharedWithDetails" ma:index="18" nillable="true" ma:displayName="Gedeeld met details" ma:internalName="SharedWithDetails" ma:readOnly="true">
+    <xsd:element name="SharedWithDetails" ma:index="18" nillable="true" ma:displayName="Shared With Details" ma:internalName="SharedWithDetails" ma:readOnly="true">
       <xsd:simpleType>
         <xsd:restriction base="dms:Note">
           <xsd:maxLength value="255"/>
@@ -12732,8 +14392,8 @@
         <xsd:element ref="dc:creator" minOccurs="0" maxOccurs="1"/>
         <xsd:element ref="dcterms:created" minOccurs="0" maxOccurs="1"/>
         <xsd:element ref="dc:identifier" minOccurs="0" maxOccurs="1"/>
-        <xsd:element name="contentType" minOccurs="0" maxOccurs="1" type="xsd:string" ma:index="0" ma:displayName="Inhoudstype"/>
-        <xsd:element ref="dc:title" minOccurs="0" maxOccurs="1" ma:index="4" ma:displayName="Titel"/>
+        <xsd:element name="contentType" minOccurs="0" maxOccurs="1" type="xsd:string" ma:index="0" ma:displayName="Content Type"/>
+        <xsd:element ref="dc:title" minOccurs="0" maxOccurs="1" ma:index="4" ma:displayName="Title"/>
         <xsd:element ref="dc:subject" minOccurs="0" maxOccurs="1"/>
         <xsd:element ref="dc:description" minOccurs="0" maxOccurs="1"/>
         <xsd:element name="keywords" minOccurs="0" maxOccurs="1" type="xsd:string"/>
@@ -12823,44 +14483,15 @@
 </file>
 
 <file path=customXml/item3.xml><?xml version="1.0" encoding="utf-8"?>
-<p:properties xmlns:p="http://schemas.microsoft.com/office/2006/metadata/properties" xmlns:xsi="http://www.w3.org/2001/XMLSchema-instance" xmlns:pc="http://schemas.microsoft.com/office/infopath/2007/PartnerControls">
-  <documentManagement>
-    <TaxCatchAll xmlns="814e9f69-708b-42d1-b772-2ece2c1b39da" xsi:nil="true"/>
-    <lcf76f155ced4ddcb4097134ff3c332f xmlns="c547a812-ac17-4a6a-8bd9-a75acfa31021">
-      <Terms xmlns="http://schemas.microsoft.com/office/infopath/2007/PartnerControls"/>
-    </lcf76f155ced4ddcb4097134ff3c332f>
-  </documentManagement>
-</p:properties>
+<?mso-contentType ?>
+<FormTemplates xmlns="http://schemas.microsoft.com/sharepoint/v3/contenttype/forms">
+  <Display>DocumentLibraryForm</Display>
+  <Edit>DocumentLibraryForm</Edit>
+  <New>DocumentLibraryForm</New>
+</FormTemplates>
 </file>
 
 <file path=customXml/itemProps1.xml><?xml version="1.0" encoding="utf-8"?>
-<ds:datastoreItem xmlns:ds="http://schemas.openxmlformats.org/officeDocument/2006/customXml" ds:itemID="{CC1ECCD6-BFCF-4AA5-8AFA-3BFC77736A4E}">
-  <ds:schemaRefs>
-    <ds:schemaRef ds:uri="http://schemas.microsoft.com/sharepoint/v3/contenttype/forms"/>
-  </ds:schemaRefs>
-</ds:datastoreItem>
-</file>
-
-<file path=customXml/itemProps2.xml><?xml version="1.0" encoding="utf-8"?>
-<ds:datastoreItem xmlns:ds="http://schemas.openxmlformats.org/officeDocument/2006/customXml" ds:itemID="{61BBEE47-1C69-40FB-A7D2-3E2D16532FA3}">
-  <ds:schemaRefs>
-    <ds:schemaRef ds:uri="http://schemas.microsoft.com/office/2006/metadata/contentType"/>
-    <ds:schemaRef ds:uri="http://schemas.microsoft.com/office/2006/metadata/properties/metaAttributes"/>
-    <ds:schemaRef ds:uri="http://www.w3.org/2001/XMLSchema"/>
-    <ds:schemaRef ds:uri="http://schemas.microsoft.com/office/2006/metadata/properties"/>
-    <ds:schemaRef ds:uri="c547a812-ac17-4a6a-8bd9-a75acfa31021"/>
-    <ds:schemaRef ds:uri="814e9f69-708b-42d1-b772-2ece2c1b39da"/>
-    <ds:schemaRef ds:uri="http://schemas.microsoft.com/office/2006/documentManagement/types"/>
-    <ds:schemaRef ds:uri="http://schemas.microsoft.com/office/infopath/2007/PartnerControls"/>
-    <ds:schemaRef ds:uri="http://schemas.openxmlformats.org/package/2006/metadata/core-properties"/>
-    <ds:schemaRef ds:uri="http://purl.org/dc/elements/1.1/"/>
-    <ds:schemaRef ds:uri="http://purl.org/dc/terms/"/>
-    <ds:schemaRef ds:uri="http://schemas.microsoft.com/internal/obd"/>
-  </ds:schemaRefs>
-</ds:datastoreItem>
-</file>
-
-<file path=customXml/itemProps3.xml><?xml version="1.0" encoding="utf-8"?>
 <ds:datastoreItem xmlns:ds="http://schemas.openxmlformats.org/officeDocument/2006/customXml" ds:itemID="{3817FD2A-88CD-410B-87DA-A2F8EE31F5C3}">
   <ds:schemaRefs>
     <ds:schemaRef ds:uri="http://schemas.microsoft.com/office/2006/metadata/properties"/>
@@ -12869,4 +14500,16 @@
     <ds:schemaRef ds:uri="c547a812-ac17-4a6a-8bd9-a75acfa31021"/>
   </ds:schemaRefs>
 </ds:datastoreItem>
+</file>
+
+<file path=customXml/itemProps2.xml><?xml version="1.0" encoding="utf-8"?>
+<ds:datastoreItem xmlns:ds="http://schemas.openxmlformats.org/officeDocument/2006/customXml" ds:itemID="{92540F72-5FC3-4A94-A6B1-7D23369721C2}"/>
+</file>
+
+<file path=customXml/itemProps3.xml><?xml version="1.0" encoding="utf-8"?>
+<ds:datastoreItem xmlns:ds="http://schemas.openxmlformats.org/officeDocument/2006/customXml" ds:itemID="{CC1ECCD6-BFCF-4AA5-8AFA-3BFC77736A4E}">
+  <ds:schemaRefs>
+    <ds:schemaRef ds:uri="http://schemas.microsoft.com/sharepoint/v3/contenttype/forms"/>
+  </ds:schemaRefs>
+</ds:datastoreItem>
 </file>
</xml_diff>